<commit_message>
A few updates to 30_JavaScript materials
</commit_message>
<xml_diff>
--- a/30_JavaScript/JavaScriptAdvanced.pptx
+++ b/30_JavaScript/JavaScriptAdvanced.pptx
@@ -16,41 +16,42 @@
     <p:sldId id="273" r:id="rId10"/>
     <p:sldId id="268" r:id="rId11"/>
     <p:sldId id="269" r:id="rId12"/>
-    <p:sldId id="271" r:id="rId13"/>
-    <p:sldId id="274" r:id="rId14"/>
-    <p:sldId id="270" r:id="rId15"/>
-    <p:sldId id="275" r:id="rId16"/>
-    <p:sldId id="276" r:id="rId17"/>
-    <p:sldId id="277" r:id="rId18"/>
-    <p:sldId id="278" r:id="rId19"/>
-    <p:sldId id="279" r:id="rId20"/>
-    <p:sldId id="280" r:id="rId21"/>
-    <p:sldId id="281" r:id="rId22"/>
-    <p:sldId id="282" r:id="rId23"/>
-    <p:sldId id="283" r:id="rId24"/>
-    <p:sldId id="284" r:id="rId25"/>
-    <p:sldId id="285" r:id="rId26"/>
-    <p:sldId id="286" r:id="rId27"/>
-    <p:sldId id="288" r:id="rId28"/>
-    <p:sldId id="287" r:id="rId29"/>
-    <p:sldId id="290" r:id="rId30"/>
-    <p:sldId id="289" r:id="rId31"/>
-    <p:sldId id="291" r:id="rId32"/>
-    <p:sldId id="292" r:id="rId33"/>
-    <p:sldId id="293" r:id="rId34"/>
-    <p:sldId id="294" r:id="rId35"/>
-    <p:sldId id="295" r:id="rId36"/>
-    <p:sldId id="296" r:id="rId37"/>
-    <p:sldId id="297" r:id="rId38"/>
-    <p:sldId id="298" r:id="rId39"/>
-    <p:sldId id="299" r:id="rId40"/>
-    <p:sldId id="300" r:id="rId41"/>
-    <p:sldId id="301" r:id="rId42"/>
-    <p:sldId id="302" r:id="rId43"/>
-    <p:sldId id="303" r:id="rId44"/>
-    <p:sldId id="304" r:id="rId45"/>
-    <p:sldId id="305" r:id="rId46"/>
-    <p:sldId id="306" r:id="rId47"/>
+    <p:sldId id="307" r:id="rId13"/>
+    <p:sldId id="271" r:id="rId14"/>
+    <p:sldId id="274" r:id="rId15"/>
+    <p:sldId id="270" r:id="rId16"/>
+    <p:sldId id="275" r:id="rId17"/>
+    <p:sldId id="276" r:id="rId18"/>
+    <p:sldId id="277" r:id="rId19"/>
+    <p:sldId id="278" r:id="rId20"/>
+    <p:sldId id="279" r:id="rId21"/>
+    <p:sldId id="280" r:id="rId22"/>
+    <p:sldId id="281" r:id="rId23"/>
+    <p:sldId id="282" r:id="rId24"/>
+    <p:sldId id="283" r:id="rId25"/>
+    <p:sldId id="284" r:id="rId26"/>
+    <p:sldId id="285" r:id="rId27"/>
+    <p:sldId id="286" r:id="rId28"/>
+    <p:sldId id="288" r:id="rId29"/>
+    <p:sldId id="287" r:id="rId30"/>
+    <p:sldId id="290" r:id="rId31"/>
+    <p:sldId id="289" r:id="rId32"/>
+    <p:sldId id="291" r:id="rId33"/>
+    <p:sldId id="292" r:id="rId34"/>
+    <p:sldId id="293" r:id="rId35"/>
+    <p:sldId id="294" r:id="rId36"/>
+    <p:sldId id="295" r:id="rId37"/>
+    <p:sldId id="296" r:id="rId38"/>
+    <p:sldId id="297" r:id="rId39"/>
+    <p:sldId id="298" r:id="rId40"/>
+    <p:sldId id="299" r:id="rId41"/>
+    <p:sldId id="300" r:id="rId42"/>
+    <p:sldId id="301" r:id="rId43"/>
+    <p:sldId id="302" r:id="rId44"/>
+    <p:sldId id="303" r:id="rId45"/>
+    <p:sldId id="304" r:id="rId46"/>
+    <p:sldId id="305" r:id="rId47"/>
+    <p:sldId id="306" r:id="rId48"/>
   </p:sldIdLst>
   <p:sldSz cx="12192000" cy="6858000"/>
   <p:notesSz cx="6858000" cy="9144000"/>
@@ -3513,6 +3514,25 @@
   <p:clrMapOvr>
     <a:masterClrMapping/>
   </p:clrMapOvr>
+  <mc:AlternateContent xmlns:mc="http://schemas.openxmlformats.org/markup-compatibility/2006">
+    <mc:Choice xmlns:p14="http://schemas.microsoft.com/office/powerpoint/2010/main" Requires="p14">
+      <p:transition spd="med" p14:dur="700">
+        <p:fade/>
+      </p:transition>
+    </mc:Choice>
+    <mc:Fallback>
+      <p:transition spd="med">
+        <p:fade/>
+      </p:transition>
+    </mc:Fallback>
+  </mc:AlternateContent>
+  <p:timing>
+    <p:tnLst>
+      <p:par>
+        <p:cTn id="1" dur="indefinite" restart="never" nodeType="tmRoot"/>
+      </p:par>
+    </p:tnLst>
+  </p:timing>
 </p:sld>
 </file>
 
@@ -4011,66 +4031,6 @@
           </a:fontRef>
         </p:style>
       </p:cxnSp>
-      <p:sp>
-        <p:nvSpPr>
-          <p:cNvPr id="29" name="Afrundet rektangulær billedforklaring 28"/>
-          <p:cNvSpPr/>
-          <p:nvPr/>
-        </p:nvSpPr>
-        <p:spPr>
-          <a:xfrm>
-            <a:off x="4917989" y="4783479"/>
-            <a:ext cx="1569308" cy="1444326"/>
-          </a:xfrm>
-          <a:prstGeom prst="wedgeRoundRectCallout">
-            <a:avLst>
-              <a:gd name="adj1" fmla="val 76411"/>
-              <a:gd name="adj2" fmla="val -127002"/>
-              <a:gd name="adj3" fmla="val 16667"/>
-            </a:avLst>
-          </a:prstGeom>
-          <a:solidFill>
-            <a:schemeClr val="accent6">
-              <a:lumMod val="50000"/>
-            </a:schemeClr>
-          </a:solidFill>
-        </p:spPr>
-        <p:style>
-          <a:lnRef idx="2">
-            <a:schemeClr val="accent1">
-              <a:shade val="50000"/>
-            </a:schemeClr>
-          </a:lnRef>
-          <a:fillRef idx="1">
-            <a:schemeClr val="accent1"/>
-          </a:fillRef>
-          <a:effectRef idx="0">
-            <a:schemeClr val="accent1"/>
-          </a:effectRef>
-          <a:fontRef idx="minor">
-            <a:schemeClr val="lt1"/>
-          </a:fontRef>
-        </p:style>
-        <p:txBody>
-          <a:bodyPr rtlCol="0" anchor="ctr"/>
-          <a:lstStyle/>
-          <a:p>
-            <a:pPr algn="ctr"/>
-            <a:r>
-              <a:rPr lang="da-DK" sz="2400" b="1" smtClean="0"/>
-              <a:t>Outer</a:t>
-            </a:r>
-          </a:p>
-          <a:p>
-            <a:pPr algn="ctr"/>
-            <a:r>
-              <a:rPr lang="da-DK" sz="2400" b="1" smtClean="0"/>
-              <a:t>Environ-ment</a:t>
-            </a:r>
-            <a:endParaRPr lang="da-DK" sz="2400" b="1"/>
-          </a:p>
-        </p:txBody>
-      </p:sp>
       <p:cxnSp>
         <p:nvCxnSpPr>
           <p:cNvPr id="30" name="Vinklet forbindelse 29"/>
@@ -4151,66 +4111,6 @@
           </a:fontRef>
         </p:style>
       </p:cxnSp>
-      <p:sp>
-        <p:nvSpPr>
-          <p:cNvPr id="37" name="Afrundet rektangulær billedforklaring 36"/>
-          <p:cNvSpPr/>
-          <p:nvPr/>
-        </p:nvSpPr>
-        <p:spPr>
-          <a:xfrm>
-            <a:off x="10414686" y="1136822"/>
-            <a:ext cx="1569308" cy="901488"/>
-          </a:xfrm>
-          <a:prstGeom prst="wedgeRoundRectCallout">
-            <a:avLst>
-              <a:gd name="adj1" fmla="val -75558"/>
-              <a:gd name="adj2" fmla="val 48448"/>
-              <a:gd name="adj3" fmla="val 16667"/>
-            </a:avLst>
-          </a:prstGeom>
-          <a:solidFill>
-            <a:schemeClr val="accent6">
-              <a:lumMod val="75000"/>
-            </a:schemeClr>
-          </a:solidFill>
-        </p:spPr>
-        <p:style>
-          <a:lnRef idx="2">
-            <a:schemeClr val="accent1">
-              <a:shade val="50000"/>
-            </a:schemeClr>
-          </a:lnRef>
-          <a:fillRef idx="1">
-            <a:schemeClr val="accent1"/>
-          </a:fillRef>
-          <a:effectRef idx="0">
-            <a:schemeClr val="accent1"/>
-          </a:effectRef>
-          <a:fontRef idx="minor">
-            <a:schemeClr val="lt1"/>
-          </a:fontRef>
-        </p:style>
-        <p:txBody>
-          <a:bodyPr rtlCol="0" anchor="ctr"/>
-          <a:lstStyle/>
-          <a:p>
-            <a:pPr algn="ctr"/>
-            <a:r>
-              <a:rPr lang="da-DK" sz="2400" b="1" smtClean="0"/>
-              <a:t>Exec.</a:t>
-            </a:r>
-          </a:p>
-          <a:p>
-            <a:pPr algn="ctr"/>
-            <a:r>
-              <a:rPr lang="da-DK" sz="2400" b="1" smtClean="0"/>
-              <a:t>stack</a:t>
-            </a:r>
-            <a:endParaRPr lang="da-DK" sz="2400" b="1"/>
-          </a:p>
-        </p:txBody>
-      </p:sp>
     </p:spTree>
     <p:extLst>
       <p:ext uri="{BB962C8B-B14F-4D97-AF65-F5344CB8AC3E}">
@@ -4221,6 +4121,13 @@
   <p:clrMapOvr>
     <a:masterClrMapping/>
   </p:clrMapOvr>
+  <p:timing>
+    <p:tnLst>
+      <p:par>
+        <p:cTn id="1" dur="indefinite" restart="never" nodeType="tmRoot"/>
+      </p:par>
+    </p:tnLst>
+  </p:timing>
 </p:sld>
 </file>
 
@@ -4766,14 +4673,14 @@
             <a:pPr algn="ctr"/>
             <a:r>
               <a:rPr lang="da-DK" sz="2400" b="1" smtClean="0"/>
-              <a:t>Scope</a:t>
+              <a:t>Outer</a:t>
             </a:r>
           </a:p>
           <a:p>
             <a:pPr algn="ctr"/>
             <a:r>
               <a:rPr lang="da-DK" sz="2400" b="1" smtClean="0"/>
-              <a:t>Chain</a:t>
+              <a:t>Environ-ment</a:t>
             </a:r>
             <a:endParaRPr lang="da-DK" sz="2400" b="1"/>
           </a:p>
@@ -4861,6 +4768,733 @@
       </p:cxnSp>
       <p:sp>
         <p:nvSpPr>
+          <p:cNvPr id="37" name="Afrundet rektangulær billedforklaring 36"/>
+          <p:cNvSpPr/>
+          <p:nvPr/>
+        </p:nvSpPr>
+        <p:spPr>
+          <a:xfrm>
+            <a:off x="10414686" y="1136822"/>
+            <a:ext cx="1569308" cy="901488"/>
+          </a:xfrm>
+          <a:prstGeom prst="wedgeRoundRectCallout">
+            <a:avLst>
+              <a:gd name="adj1" fmla="val -75558"/>
+              <a:gd name="adj2" fmla="val 48448"/>
+              <a:gd name="adj3" fmla="val 16667"/>
+            </a:avLst>
+          </a:prstGeom>
+          <a:solidFill>
+            <a:schemeClr val="accent6">
+              <a:lumMod val="75000"/>
+            </a:schemeClr>
+          </a:solidFill>
+        </p:spPr>
+        <p:style>
+          <a:lnRef idx="2">
+            <a:schemeClr val="accent1">
+              <a:shade val="50000"/>
+            </a:schemeClr>
+          </a:lnRef>
+          <a:fillRef idx="1">
+            <a:schemeClr val="accent1"/>
+          </a:fillRef>
+          <a:effectRef idx="0">
+            <a:schemeClr val="accent1"/>
+          </a:effectRef>
+          <a:fontRef idx="minor">
+            <a:schemeClr val="lt1"/>
+          </a:fontRef>
+        </p:style>
+        <p:txBody>
+          <a:bodyPr rtlCol="0" anchor="ctr"/>
+          <a:lstStyle/>
+          <a:p>
+            <a:pPr algn="ctr"/>
+            <a:r>
+              <a:rPr lang="da-DK" sz="2400" b="1" smtClean="0"/>
+              <a:t>Exec.</a:t>
+            </a:r>
+          </a:p>
+          <a:p>
+            <a:pPr algn="ctr"/>
+            <a:r>
+              <a:rPr lang="da-DK" sz="2400" b="1" smtClean="0"/>
+              <a:t>stack</a:t>
+            </a:r>
+            <a:endParaRPr lang="da-DK" sz="2400" b="1"/>
+          </a:p>
+        </p:txBody>
+      </p:sp>
+    </p:spTree>
+    <p:extLst>
+      <p:ext uri="{BB962C8B-B14F-4D97-AF65-F5344CB8AC3E}">
+        <p14:creationId xmlns:p14="http://schemas.microsoft.com/office/powerpoint/2010/main" val="2156433213"/>
+      </p:ext>
+    </p:extLst>
+  </p:cSld>
+  <p:clrMapOvr>
+    <a:masterClrMapping/>
+  </p:clrMapOvr>
+  <mc:AlternateContent xmlns:mc="http://schemas.openxmlformats.org/markup-compatibility/2006">
+    <mc:Choice xmlns:p14="http://schemas.microsoft.com/office/powerpoint/2010/main" Requires="p14">
+      <p:transition spd="med" p14:dur="700">
+        <p:fade/>
+      </p:transition>
+    </mc:Choice>
+    <mc:Fallback>
+      <p:transition spd="med">
+        <p:fade/>
+      </p:transition>
+    </mc:Fallback>
+  </mc:AlternateContent>
+  <p:timing>
+    <p:tnLst>
+      <p:par>
+        <p:cTn id="1" dur="indefinite" restart="never" nodeType="tmRoot"/>
+      </p:par>
+    </p:tnLst>
+  </p:timing>
+</p:sld>
+</file>
+
+<file path=ppt/slides/slide13.xml><?xml version="1.0" encoding="utf-8"?>
+<p:sld xmlns:a="http://schemas.openxmlformats.org/drawingml/2006/main" xmlns:r="http://schemas.openxmlformats.org/officeDocument/2006/relationships" xmlns:p="http://schemas.openxmlformats.org/presentationml/2006/main">
+  <p:cSld>
+    <p:spTree>
+      <p:nvGrpSpPr>
+        <p:cNvPr id="1" name=""/>
+        <p:cNvGrpSpPr/>
+        <p:nvPr/>
+      </p:nvGrpSpPr>
+      <p:grpSpPr>
+        <a:xfrm>
+          <a:off x="0" y="0"/>
+          <a:ext cx="0" cy="0"/>
+          <a:chOff x="0" y="0"/>
+          <a:chExt cx="0" cy="0"/>
+        </a:xfrm>
+      </p:grpSpPr>
+      <p:sp>
+        <p:nvSpPr>
+          <p:cNvPr id="2" name="Rektangel 1"/>
+          <p:cNvSpPr/>
+          <p:nvPr/>
+        </p:nvSpPr>
+        <p:spPr>
+          <a:xfrm>
+            <a:off x="6765325" y="767533"/>
+            <a:ext cx="2829697" cy="1185604"/>
+          </a:xfrm>
+          <a:prstGeom prst="rect">
+            <a:avLst/>
+          </a:prstGeom>
+          <a:solidFill>
+            <a:srgbClr val="0070C0"/>
+          </a:solidFill>
+        </p:spPr>
+        <p:style>
+          <a:lnRef idx="2">
+            <a:schemeClr val="accent1">
+              <a:shade val="50000"/>
+            </a:schemeClr>
+          </a:lnRef>
+          <a:fillRef idx="1">
+            <a:schemeClr val="accent1"/>
+          </a:fillRef>
+          <a:effectRef idx="0">
+            <a:schemeClr val="accent1"/>
+          </a:effectRef>
+          <a:fontRef idx="minor">
+            <a:schemeClr val="lt1"/>
+          </a:fontRef>
+        </p:style>
+        <p:txBody>
+          <a:bodyPr rtlCol="0" anchor="t"/>
+          <a:lstStyle/>
+          <a:p>
+            <a:r>
+              <a:rPr lang="da-DK" smtClean="0">
+                <a:solidFill>
+                  <a:srgbClr val="FFFF00"/>
+                </a:solidFill>
+              </a:rPr>
+              <a:t>Global</a:t>
+            </a:r>
+            <a:r>
+              <a:rPr lang="da-DK" smtClean="0"/>
+              <a:t> Ex. Cont.</a:t>
+            </a:r>
+            <a:endParaRPr lang="da-DK"/>
+          </a:p>
+        </p:txBody>
+      </p:sp>
+      <p:sp>
+        <p:nvSpPr>
+          <p:cNvPr id="5" name="Rektangel 4"/>
+          <p:cNvSpPr/>
+          <p:nvPr/>
+        </p:nvSpPr>
+        <p:spPr>
+          <a:xfrm>
+            <a:off x="7346092" y="2354022"/>
+            <a:ext cx="2829697" cy="1185604"/>
+          </a:xfrm>
+          <a:prstGeom prst="rect">
+            <a:avLst/>
+          </a:prstGeom>
+          <a:solidFill>
+            <a:srgbClr val="0070C0"/>
+          </a:solidFill>
+        </p:spPr>
+        <p:style>
+          <a:lnRef idx="2">
+            <a:schemeClr val="accent1">
+              <a:shade val="50000"/>
+            </a:schemeClr>
+          </a:lnRef>
+          <a:fillRef idx="1">
+            <a:schemeClr val="accent1"/>
+          </a:fillRef>
+          <a:effectRef idx="0">
+            <a:schemeClr val="accent1"/>
+          </a:effectRef>
+          <a:fontRef idx="minor">
+            <a:schemeClr val="lt1"/>
+          </a:fontRef>
+        </p:style>
+        <p:txBody>
+          <a:bodyPr rtlCol="0" anchor="t"/>
+          <a:lstStyle/>
+          <a:p>
+            <a:r>
+              <a:rPr lang="da-DK" smtClean="0">
+                <a:solidFill>
+                  <a:srgbClr val="FFFF00"/>
+                </a:solidFill>
+              </a:rPr>
+              <a:t>myFuncG()</a:t>
+            </a:r>
+            <a:r>
+              <a:rPr lang="da-DK" smtClean="0"/>
+              <a:t> Ex. Cont.</a:t>
+            </a:r>
+            <a:endParaRPr lang="da-DK"/>
+          </a:p>
+        </p:txBody>
+      </p:sp>
+      <p:sp>
+        <p:nvSpPr>
+          <p:cNvPr id="8" name="Rektangel 7"/>
+          <p:cNvSpPr/>
+          <p:nvPr/>
+        </p:nvSpPr>
+        <p:spPr>
+          <a:xfrm>
+            <a:off x="8062784" y="3912328"/>
+            <a:ext cx="2829697" cy="1185604"/>
+          </a:xfrm>
+          <a:prstGeom prst="rect">
+            <a:avLst/>
+          </a:prstGeom>
+          <a:solidFill>
+            <a:srgbClr val="0070C0"/>
+          </a:solidFill>
+        </p:spPr>
+        <p:style>
+          <a:lnRef idx="2">
+            <a:schemeClr val="accent1">
+              <a:shade val="50000"/>
+            </a:schemeClr>
+          </a:lnRef>
+          <a:fillRef idx="1">
+            <a:schemeClr val="accent1"/>
+          </a:fillRef>
+          <a:effectRef idx="0">
+            <a:schemeClr val="accent1"/>
+          </a:effectRef>
+          <a:fontRef idx="minor">
+            <a:schemeClr val="lt1"/>
+          </a:fontRef>
+        </p:style>
+        <p:txBody>
+          <a:bodyPr rtlCol="0" anchor="t"/>
+          <a:lstStyle/>
+          <a:p>
+            <a:r>
+              <a:rPr lang="da-DK" smtClean="0">
+                <a:solidFill>
+                  <a:srgbClr val="FFFF00"/>
+                </a:solidFill>
+              </a:rPr>
+              <a:t>myFuncF()</a:t>
+            </a:r>
+            <a:r>
+              <a:rPr lang="da-DK" smtClean="0"/>
+              <a:t> Ex. Cont.</a:t>
+            </a:r>
+            <a:endParaRPr lang="da-DK"/>
+          </a:p>
+        </p:txBody>
+      </p:sp>
+      <p:sp>
+        <p:nvSpPr>
+          <p:cNvPr id="11" name="Rektangel 10"/>
+          <p:cNvSpPr/>
+          <p:nvPr/>
+        </p:nvSpPr>
+        <p:spPr>
+          <a:xfrm>
+            <a:off x="418071" y="767533"/>
+            <a:ext cx="2829697" cy="1185604"/>
+          </a:xfrm>
+          <a:prstGeom prst="rect">
+            <a:avLst/>
+          </a:prstGeom>
+          <a:solidFill>
+            <a:srgbClr val="C00000"/>
+          </a:solidFill>
+        </p:spPr>
+        <p:style>
+          <a:lnRef idx="2">
+            <a:schemeClr val="accent1">
+              <a:shade val="50000"/>
+            </a:schemeClr>
+          </a:lnRef>
+          <a:fillRef idx="1">
+            <a:schemeClr val="accent1"/>
+          </a:fillRef>
+          <a:effectRef idx="0">
+            <a:schemeClr val="accent1"/>
+          </a:effectRef>
+          <a:fontRef idx="minor">
+            <a:schemeClr val="lt1"/>
+          </a:fontRef>
+        </p:style>
+        <p:txBody>
+          <a:bodyPr rtlCol="0" anchor="t"/>
+          <a:lstStyle/>
+          <a:p>
+            <a:r>
+              <a:rPr lang="da-DK" smtClean="0">
+                <a:solidFill>
+                  <a:srgbClr val="FFFF00"/>
+                </a:solidFill>
+              </a:rPr>
+              <a:t>Global</a:t>
+            </a:r>
+            <a:r>
+              <a:rPr lang="da-DK" smtClean="0"/>
+              <a:t> Lex. Env.</a:t>
+            </a:r>
+            <a:endParaRPr lang="da-DK"/>
+          </a:p>
+        </p:txBody>
+      </p:sp>
+      <p:sp>
+        <p:nvSpPr>
+          <p:cNvPr id="12" name="Rektangel 11"/>
+          <p:cNvSpPr/>
+          <p:nvPr/>
+        </p:nvSpPr>
+        <p:spPr>
+          <a:xfrm>
+            <a:off x="1085336" y="3912328"/>
+            <a:ext cx="2829697" cy="1185604"/>
+          </a:xfrm>
+          <a:prstGeom prst="rect">
+            <a:avLst/>
+          </a:prstGeom>
+          <a:solidFill>
+            <a:srgbClr val="C00000"/>
+          </a:solidFill>
+        </p:spPr>
+        <p:style>
+          <a:lnRef idx="2">
+            <a:schemeClr val="accent1">
+              <a:shade val="50000"/>
+            </a:schemeClr>
+          </a:lnRef>
+          <a:fillRef idx="1">
+            <a:schemeClr val="accent1"/>
+          </a:fillRef>
+          <a:effectRef idx="0">
+            <a:schemeClr val="accent1"/>
+          </a:effectRef>
+          <a:fontRef idx="minor">
+            <a:schemeClr val="lt1"/>
+          </a:fontRef>
+        </p:style>
+        <p:txBody>
+          <a:bodyPr rtlCol="0" anchor="t"/>
+          <a:lstStyle/>
+          <a:p>
+            <a:r>
+              <a:rPr lang="da-DK" smtClean="0">
+                <a:solidFill>
+                  <a:srgbClr val="FFFF00"/>
+                </a:solidFill>
+              </a:rPr>
+              <a:t>myFuncG</a:t>
+            </a:r>
+            <a:r>
+              <a:rPr lang="da-DK" smtClean="0"/>
+              <a:t> </a:t>
+            </a:r>
+            <a:r>
+              <a:rPr lang="da-DK"/>
+              <a:t>Lex. Env.</a:t>
+            </a:r>
+          </a:p>
+        </p:txBody>
+      </p:sp>
+      <p:sp>
+        <p:nvSpPr>
+          <p:cNvPr id="13" name="Rektangel 12"/>
+          <p:cNvSpPr/>
+          <p:nvPr/>
+        </p:nvSpPr>
+        <p:spPr>
+          <a:xfrm>
+            <a:off x="1085336" y="2354023"/>
+            <a:ext cx="2829697" cy="1185604"/>
+          </a:xfrm>
+          <a:prstGeom prst="rect">
+            <a:avLst/>
+          </a:prstGeom>
+          <a:solidFill>
+            <a:srgbClr val="C00000"/>
+          </a:solidFill>
+        </p:spPr>
+        <p:style>
+          <a:lnRef idx="2">
+            <a:schemeClr val="accent1">
+              <a:shade val="50000"/>
+            </a:schemeClr>
+          </a:lnRef>
+          <a:fillRef idx="1">
+            <a:schemeClr val="accent1"/>
+          </a:fillRef>
+          <a:effectRef idx="0">
+            <a:schemeClr val="accent1"/>
+          </a:effectRef>
+          <a:fontRef idx="minor">
+            <a:schemeClr val="lt1"/>
+          </a:fontRef>
+        </p:style>
+        <p:txBody>
+          <a:bodyPr rtlCol="0" anchor="t"/>
+          <a:lstStyle/>
+          <a:p>
+            <a:r>
+              <a:rPr lang="da-DK" smtClean="0">
+                <a:solidFill>
+                  <a:srgbClr val="FFFF00"/>
+                </a:solidFill>
+              </a:rPr>
+              <a:t>myFuncF </a:t>
+            </a:r>
+            <a:r>
+              <a:rPr lang="da-DK"/>
+              <a:t>Lex. Env.</a:t>
+            </a:r>
+          </a:p>
+        </p:txBody>
+      </p:sp>
+      <p:cxnSp>
+        <p:nvCxnSpPr>
+          <p:cNvPr id="4" name="Vinklet forbindelse 3"/>
+          <p:cNvCxnSpPr>
+            <a:endCxn id="13" idx="1"/>
+          </p:cNvCxnSpPr>
+          <p:nvPr/>
+        </p:nvCxnSpPr>
+        <p:spPr>
+          <a:xfrm rot="16200000" flipH="1">
+            <a:off x="348564" y="2210052"/>
+            <a:ext cx="993689" cy="479855"/>
+          </a:xfrm>
+          <a:prstGeom prst="bentConnector2">
+            <a:avLst/>
+          </a:prstGeom>
+          <a:ln w="76200">
+            <a:solidFill>
+              <a:schemeClr val="tx1"/>
+            </a:solidFill>
+            <a:tailEnd type="triangle"/>
+          </a:ln>
+        </p:spPr>
+        <p:style>
+          <a:lnRef idx="1">
+            <a:schemeClr val="accent1"/>
+          </a:lnRef>
+          <a:fillRef idx="0">
+            <a:schemeClr val="accent1"/>
+          </a:fillRef>
+          <a:effectRef idx="0">
+            <a:schemeClr val="accent1"/>
+          </a:effectRef>
+          <a:fontRef idx="minor">
+            <a:schemeClr val="tx1"/>
+          </a:fontRef>
+        </p:style>
+      </p:cxnSp>
+      <p:cxnSp>
+        <p:nvCxnSpPr>
+          <p:cNvPr id="16" name="Vinklet forbindelse 15"/>
+          <p:cNvCxnSpPr>
+            <a:endCxn id="12" idx="1"/>
+          </p:cNvCxnSpPr>
+          <p:nvPr/>
+        </p:nvCxnSpPr>
+        <p:spPr>
+          <a:xfrm rot="16200000" flipH="1">
+            <a:off x="-430589" y="2989204"/>
+            <a:ext cx="2551995" cy="479856"/>
+          </a:xfrm>
+          <a:prstGeom prst="bentConnector2">
+            <a:avLst/>
+          </a:prstGeom>
+          <a:ln w="76200">
+            <a:solidFill>
+              <a:schemeClr val="tx1"/>
+            </a:solidFill>
+            <a:tailEnd type="triangle"/>
+          </a:ln>
+        </p:spPr>
+        <p:style>
+          <a:lnRef idx="1">
+            <a:schemeClr val="accent1"/>
+          </a:lnRef>
+          <a:fillRef idx="0">
+            <a:schemeClr val="accent1"/>
+          </a:fillRef>
+          <a:effectRef idx="0">
+            <a:schemeClr val="accent1"/>
+          </a:effectRef>
+          <a:fontRef idx="minor">
+            <a:schemeClr val="tx1"/>
+          </a:fontRef>
+        </p:style>
+      </p:cxnSp>
+      <p:cxnSp>
+        <p:nvCxnSpPr>
+          <p:cNvPr id="19" name="Vinklet forbindelse 18"/>
+          <p:cNvCxnSpPr>
+            <a:stCxn id="8" idx="1"/>
+          </p:cNvCxnSpPr>
+          <p:nvPr/>
+        </p:nvCxnSpPr>
+        <p:spPr>
+          <a:xfrm rot="10800000">
+            <a:off x="6932142" y="1953134"/>
+            <a:ext cx="1130642" cy="2551996"/>
+          </a:xfrm>
+          <a:prstGeom prst="bentConnector2">
+            <a:avLst/>
+          </a:prstGeom>
+          <a:ln w="76200">
+            <a:solidFill>
+              <a:schemeClr val="tx1"/>
+            </a:solidFill>
+            <a:tailEnd type="triangle"/>
+          </a:ln>
+        </p:spPr>
+        <p:style>
+          <a:lnRef idx="1">
+            <a:schemeClr val="accent1"/>
+          </a:lnRef>
+          <a:fillRef idx="0">
+            <a:schemeClr val="accent1"/>
+          </a:fillRef>
+          <a:effectRef idx="0">
+            <a:schemeClr val="accent1"/>
+          </a:effectRef>
+          <a:fontRef idx="minor">
+            <a:schemeClr val="tx1"/>
+          </a:fontRef>
+        </p:style>
+      </p:cxnSp>
+      <p:cxnSp>
+        <p:nvCxnSpPr>
+          <p:cNvPr id="22" name="Vinklet forbindelse 21"/>
+          <p:cNvCxnSpPr>
+            <a:stCxn id="5" idx="1"/>
+          </p:cNvCxnSpPr>
+          <p:nvPr/>
+        </p:nvCxnSpPr>
+        <p:spPr>
+          <a:xfrm rot="10800000">
+            <a:off x="6932142" y="1953134"/>
+            <a:ext cx="413951" cy="993690"/>
+          </a:xfrm>
+          <a:prstGeom prst="bentConnector2">
+            <a:avLst/>
+          </a:prstGeom>
+          <a:ln w="76200">
+            <a:solidFill>
+              <a:schemeClr val="tx1"/>
+            </a:solidFill>
+            <a:tailEnd type="triangle"/>
+          </a:ln>
+        </p:spPr>
+        <p:style>
+          <a:lnRef idx="1">
+            <a:schemeClr val="accent1"/>
+          </a:lnRef>
+          <a:fillRef idx="0">
+            <a:schemeClr val="accent1"/>
+          </a:fillRef>
+          <a:effectRef idx="0">
+            <a:schemeClr val="accent1"/>
+          </a:effectRef>
+          <a:fontRef idx="minor">
+            <a:schemeClr val="tx1"/>
+          </a:fontRef>
+        </p:style>
+      </p:cxnSp>
+      <p:sp>
+        <p:nvSpPr>
+          <p:cNvPr id="29" name="Afrundet rektangulær billedforklaring 28"/>
+          <p:cNvSpPr/>
+          <p:nvPr/>
+        </p:nvSpPr>
+        <p:spPr>
+          <a:xfrm>
+            <a:off x="4917989" y="4783479"/>
+            <a:ext cx="1569308" cy="1444326"/>
+          </a:xfrm>
+          <a:prstGeom prst="wedgeRoundRectCallout">
+            <a:avLst>
+              <a:gd name="adj1" fmla="val 76411"/>
+              <a:gd name="adj2" fmla="val -127002"/>
+              <a:gd name="adj3" fmla="val 16667"/>
+            </a:avLst>
+          </a:prstGeom>
+          <a:solidFill>
+            <a:schemeClr val="accent6">
+              <a:lumMod val="50000"/>
+            </a:schemeClr>
+          </a:solidFill>
+        </p:spPr>
+        <p:style>
+          <a:lnRef idx="2">
+            <a:schemeClr val="accent1">
+              <a:shade val="50000"/>
+            </a:schemeClr>
+          </a:lnRef>
+          <a:fillRef idx="1">
+            <a:schemeClr val="accent1"/>
+          </a:fillRef>
+          <a:effectRef idx="0">
+            <a:schemeClr val="accent1"/>
+          </a:effectRef>
+          <a:fontRef idx="minor">
+            <a:schemeClr val="lt1"/>
+          </a:fontRef>
+        </p:style>
+        <p:txBody>
+          <a:bodyPr rtlCol="0" anchor="ctr"/>
+          <a:lstStyle/>
+          <a:p>
+            <a:pPr algn="ctr"/>
+            <a:r>
+              <a:rPr lang="da-DK" sz="2400" b="1" smtClean="0"/>
+              <a:t>Scope</a:t>
+            </a:r>
+          </a:p>
+          <a:p>
+            <a:pPr algn="ctr"/>
+            <a:r>
+              <a:rPr lang="da-DK" sz="2400" b="1" smtClean="0"/>
+              <a:t>Chain</a:t>
+            </a:r>
+            <a:endParaRPr lang="da-DK" sz="2400" b="1"/>
+          </a:p>
+        </p:txBody>
+      </p:sp>
+      <p:cxnSp>
+        <p:nvCxnSpPr>
+          <p:cNvPr id="30" name="Vinklet forbindelse 29"/>
+          <p:cNvCxnSpPr>
+            <a:stCxn id="2" idx="3"/>
+          </p:cNvCxnSpPr>
+          <p:nvPr/>
+        </p:nvCxnSpPr>
+        <p:spPr>
+          <a:xfrm>
+            <a:off x="9595022" y="1360335"/>
+            <a:ext cx="339810" cy="993687"/>
+          </a:xfrm>
+          <a:prstGeom prst="bentConnector2">
+            <a:avLst/>
+          </a:prstGeom>
+          <a:ln w="76200">
+            <a:solidFill>
+              <a:schemeClr val="bg1">
+                <a:lumMod val="50000"/>
+              </a:schemeClr>
+            </a:solidFill>
+            <a:tailEnd type="triangle"/>
+          </a:ln>
+        </p:spPr>
+        <p:style>
+          <a:lnRef idx="1">
+            <a:schemeClr val="accent1"/>
+          </a:lnRef>
+          <a:fillRef idx="0">
+            <a:schemeClr val="accent1"/>
+          </a:fillRef>
+          <a:effectRef idx="0">
+            <a:schemeClr val="accent1"/>
+          </a:effectRef>
+          <a:fontRef idx="minor">
+            <a:schemeClr val="tx1"/>
+          </a:fontRef>
+        </p:style>
+      </p:cxnSp>
+      <p:cxnSp>
+        <p:nvCxnSpPr>
+          <p:cNvPr id="34" name="Vinklet forbindelse 33"/>
+          <p:cNvCxnSpPr>
+            <a:stCxn id="5" idx="3"/>
+          </p:cNvCxnSpPr>
+          <p:nvPr/>
+        </p:nvCxnSpPr>
+        <p:spPr>
+          <a:xfrm>
+            <a:off x="10175789" y="2946824"/>
+            <a:ext cx="358346" cy="965504"/>
+          </a:xfrm>
+          <a:prstGeom prst="bentConnector2">
+            <a:avLst/>
+          </a:prstGeom>
+          <a:ln w="76200">
+            <a:solidFill>
+              <a:schemeClr val="bg1">
+                <a:lumMod val="50000"/>
+              </a:schemeClr>
+            </a:solidFill>
+            <a:tailEnd type="triangle"/>
+          </a:ln>
+        </p:spPr>
+        <p:style>
+          <a:lnRef idx="1">
+            <a:schemeClr val="accent1"/>
+          </a:lnRef>
+          <a:fillRef idx="0">
+            <a:schemeClr val="accent1"/>
+          </a:fillRef>
+          <a:effectRef idx="0">
+            <a:schemeClr val="accent1"/>
+          </a:effectRef>
+          <a:fontRef idx="minor">
+            <a:schemeClr val="tx1"/>
+          </a:fontRef>
+        </p:style>
+      </p:cxnSp>
+      <p:sp>
+        <p:nvSpPr>
           <p:cNvPr id="17" name="Rektangel 16"/>
           <p:cNvSpPr/>
           <p:nvPr/>
@@ -5257,10 +5891,29 @@
   <p:clrMapOvr>
     <a:masterClrMapping/>
   </p:clrMapOvr>
+  <mc:AlternateContent xmlns:mc="http://schemas.openxmlformats.org/markup-compatibility/2006">
+    <mc:Choice xmlns:p14="http://schemas.microsoft.com/office/powerpoint/2010/main" Requires="p14">
+      <p:transition spd="med" p14:dur="700">
+        <p:fade/>
+      </p:transition>
+    </mc:Choice>
+    <mc:Fallback>
+      <p:transition spd="med">
+        <p:fade/>
+      </p:transition>
+    </mc:Fallback>
+  </mc:AlternateContent>
+  <p:timing>
+    <p:tnLst>
+      <p:par>
+        <p:cTn id="1" dur="indefinite" restart="never" nodeType="tmRoot"/>
+      </p:par>
+    </p:tnLst>
+  </p:timing>
 </p:sld>
 </file>
 
-<file path=ppt/slides/slide13.xml><?xml version="1.0" encoding="utf-8"?>
+<file path=ppt/slides/slide14.xml><?xml version="1.0" encoding="utf-8"?>
 <p:sld xmlns:a="http://schemas.openxmlformats.org/drawingml/2006/main" xmlns:r="http://schemas.openxmlformats.org/officeDocument/2006/relationships" xmlns:p="http://schemas.openxmlformats.org/presentationml/2006/main">
   <p:cSld>
     <p:spTree>
@@ -5329,113 +5982,6 @@
     <p:extLst>
       <p:ext uri="{BB962C8B-B14F-4D97-AF65-F5344CB8AC3E}">
         <p14:creationId xmlns:p14="http://schemas.microsoft.com/office/powerpoint/2010/main" val="3128370608"/>
-      </p:ext>
-    </p:extLst>
-  </p:cSld>
-  <p:clrMapOvr>
-    <a:masterClrMapping/>
-  </p:clrMapOvr>
-</p:sld>
-</file>
-
-<file path=ppt/slides/slide14.xml><?xml version="1.0" encoding="utf-8"?>
-<p:sld xmlns:a="http://schemas.openxmlformats.org/drawingml/2006/main" xmlns:r="http://schemas.openxmlformats.org/officeDocument/2006/relationships" xmlns:p="http://schemas.openxmlformats.org/presentationml/2006/main">
-  <p:cSld>
-    <p:spTree>
-      <p:nvGrpSpPr>
-        <p:cNvPr id="1" name=""/>
-        <p:cNvGrpSpPr/>
-        <p:nvPr/>
-      </p:nvGrpSpPr>
-      <p:grpSpPr>
-        <a:xfrm>
-          <a:off x="0" y="0"/>
-          <a:ext cx="0" cy="0"/>
-          <a:chOff x="0" y="0"/>
-          <a:chExt cx="0" cy="0"/>
-        </a:xfrm>
-      </p:grpSpPr>
-      <p:sp>
-        <p:nvSpPr>
-          <p:cNvPr id="2" name="Titel 1"/>
-          <p:cNvSpPr>
-            <a:spLocks noGrp="1"/>
-          </p:cNvSpPr>
-          <p:nvPr>
-            <p:ph type="title"/>
-          </p:nvPr>
-        </p:nvSpPr>
-        <p:spPr/>
-        <p:txBody>
-          <a:bodyPr/>
-          <a:lstStyle/>
-          <a:p>
-            <a:r>
-              <a:rPr lang="da-DK" b="1" smtClean="0"/>
-              <a:t>JS Advanced – Part 1</a:t>
-            </a:r>
-            <a:endParaRPr lang="da-DK" b="1"/>
-          </a:p>
-        </p:txBody>
-      </p:sp>
-      <p:sp>
-        <p:nvSpPr>
-          <p:cNvPr id="3" name="Pladsholder til indhold 2"/>
-          <p:cNvSpPr>
-            <a:spLocks noGrp="1"/>
-          </p:cNvSpPr>
-          <p:nvPr>
-            <p:ph idx="1"/>
-          </p:nvPr>
-        </p:nvSpPr>
-        <p:spPr>
-          <a:xfrm>
-            <a:off x="838200" y="1825625"/>
-            <a:ext cx="8837141" cy="4351338"/>
-          </a:xfrm>
-        </p:spPr>
-        <p:txBody>
-          <a:bodyPr>
-            <a:normAutofit/>
-          </a:bodyPr>
-          <a:lstStyle/>
-          <a:p>
-            <a:r>
-              <a:rPr lang="da-DK" sz="3200" smtClean="0"/>
-              <a:t>When a variable is not in the local execution context, JS looks in the ”outer environment”</a:t>
-            </a:r>
-          </a:p>
-          <a:p>
-            <a:r>
-              <a:rPr lang="da-DK" sz="3200" smtClean="0"/>
-              <a:t>”outer environment” is a reference to the execution context corresponding to the </a:t>
-            </a:r>
-            <a:r>
-              <a:rPr lang="da-DK" sz="3200" u="sng" smtClean="0"/>
-              <a:t>lexical</a:t>
-            </a:r>
-            <a:r>
-              <a:rPr lang="da-DK" sz="3200" smtClean="0"/>
-              <a:t> outer environment.</a:t>
-            </a:r>
-          </a:p>
-          <a:p>
-            <a:r>
-              <a:rPr lang="da-DK" sz="3200" smtClean="0"/>
-              <a:t>This is called </a:t>
-            </a:r>
-            <a:r>
-              <a:rPr lang="da-DK" sz="3200" b="1" smtClean="0"/>
-              <a:t>following the Scope Chain</a:t>
-            </a:r>
-            <a:endParaRPr lang="da-DK" sz="3200" b="1"/>
-          </a:p>
-        </p:txBody>
-      </p:sp>
-    </p:spTree>
-    <p:extLst>
-      <p:ext uri="{BB962C8B-B14F-4D97-AF65-F5344CB8AC3E}">
-        <p14:creationId xmlns:p14="http://schemas.microsoft.com/office/powerpoint/2010/main" val="2482676164"/>
       </p:ext>
     </p:extLst>
   </p:cSld>
@@ -5486,7 +6032,7 @@
           <a:p>
             <a:r>
               <a:rPr lang="da-DK" b="1" smtClean="0"/>
-              <a:t>JS Advanced – Part 2</a:t>
+              <a:t>JS Advanced – Part 1</a:t>
             </a:r>
             <a:endParaRPr lang="da-DK" b="1"/>
           </a:p>
@@ -5505,7 +6051,7 @@
         <p:spPr>
           <a:xfrm>
             <a:off x="838200" y="1825625"/>
-            <a:ext cx="9868930" cy="4351338"/>
+            <a:ext cx="8837141" cy="4351338"/>
           </a:xfrm>
         </p:spPr>
         <p:txBody>
@@ -5515,38 +6061,41 @@
           <a:lstStyle/>
           <a:p>
             <a:r>
+              <a:rPr lang="da-DK" sz="3200" smtClean="0"/>
+              <a:t>When a variable is not in the local execution context, JS looks in the ”outer environment”</a:t>
+            </a:r>
+          </a:p>
+          <a:p>
+            <a:r>
+              <a:rPr lang="da-DK" sz="3200" smtClean="0"/>
+              <a:t>”outer environment” is a reference to the execution context corresponding to the </a:t>
+            </a:r>
+            <a:r>
+              <a:rPr lang="da-DK" sz="3200" u="sng" smtClean="0"/>
+              <a:t>lexical</a:t>
+            </a:r>
+            <a:r>
+              <a:rPr lang="da-DK" sz="3200" smtClean="0"/>
+              <a:t> outer environment.</a:t>
+            </a:r>
+          </a:p>
+          <a:p>
+            <a:r>
+              <a:rPr lang="da-DK" sz="3200" smtClean="0"/>
+              <a:t>This is called </a:t>
+            </a:r>
+            <a:r>
               <a:rPr lang="da-DK" sz="3200" b="1" smtClean="0"/>
-              <a:t>What are objects?</a:t>
-            </a:r>
-            <a:endParaRPr lang="da-DK" sz="3200" smtClean="0"/>
-          </a:p>
-          <a:p>
-            <a:r>
-              <a:rPr lang="da-DK" sz="3200" b="1" smtClean="0"/>
-              <a:t>Function constructors</a:t>
-            </a:r>
-            <a:endParaRPr lang="da-DK" sz="3200" smtClean="0"/>
-          </a:p>
-          <a:p>
-            <a:r>
-              <a:rPr lang="da-DK" sz="3200" b="1" smtClean="0"/>
-              <a:t>Prototypical inheritance</a:t>
-            </a:r>
-            <a:endParaRPr lang="da-DK" sz="3200" smtClean="0"/>
-          </a:p>
-          <a:p>
-            <a:r>
-              <a:rPr lang="da-DK" sz="3200" b="1" smtClean="0"/>
-              <a:t>ES6 object construction (classes)</a:t>
-            </a:r>
-            <a:endParaRPr lang="da-DK" sz="3200" smtClean="0"/>
+              <a:t>following the Scope Chain</a:t>
+            </a:r>
+            <a:endParaRPr lang="da-DK" sz="3200" b="1"/>
           </a:p>
         </p:txBody>
       </p:sp>
     </p:spTree>
     <p:extLst>
       <p:ext uri="{BB962C8B-B14F-4D97-AF65-F5344CB8AC3E}">
-        <p14:creationId xmlns:p14="http://schemas.microsoft.com/office/powerpoint/2010/main" val="1518020154"/>
+        <p14:creationId xmlns:p14="http://schemas.microsoft.com/office/powerpoint/2010/main" val="2482676164"/>
       </p:ext>
     </p:extLst>
   </p:cSld>
@@ -5633,59 +6182,31 @@
           </a:p>
           <a:p>
             <a:r>
-              <a:rPr lang="da-DK" sz="3200" smtClean="0"/>
-              <a:t>Objects are (just) a collection of name/value pairs</a:t>
-            </a:r>
-          </a:p>
-          <a:p>
-            <a:r>
-              <a:rPr lang="da-DK" sz="3200" smtClean="0"/>
-              <a:t>A value may be </a:t>
-            </a:r>
-          </a:p>
-          <a:p>
-            <a:pPr lvl="1"/>
-            <a:r>
-              <a:rPr lang="da-DK" sz="2800" smtClean="0"/>
-              <a:t>Of a simple type (</a:t>
-            </a:r>
-            <a:r>
-              <a:rPr lang="da-DK" sz="2800" i="1" smtClean="0"/>
-              <a:t>string</a:t>
-            </a:r>
-            <a:r>
-              <a:rPr lang="da-DK" sz="2800" smtClean="0"/>
-              <a:t>, </a:t>
-            </a:r>
-            <a:r>
-              <a:rPr lang="da-DK" sz="2800" i="1" smtClean="0"/>
-              <a:t>number</a:t>
-            </a:r>
-            <a:r>
-              <a:rPr lang="da-DK" sz="2800" smtClean="0"/>
-              <a:t>,…)</a:t>
-            </a:r>
-          </a:p>
-          <a:p>
-            <a:pPr lvl="1"/>
-            <a:r>
-              <a:rPr lang="da-DK" sz="2800" smtClean="0"/>
-              <a:t>A function definition</a:t>
-            </a:r>
-          </a:p>
-          <a:p>
-            <a:pPr lvl="1"/>
-            <a:r>
-              <a:rPr lang="da-DK" sz="2800" smtClean="0"/>
-              <a:t>An object (hello, recursion!)</a:t>
-            </a:r>
+              <a:rPr lang="da-DK" sz="3200" b="1" smtClean="0"/>
+              <a:t>Function constructors</a:t>
+            </a:r>
+            <a:endParaRPr lang="da-DK" sz="3200" smtClean="0"/>
+          </a:p>
+          <a:p>
+            <a:r>
+              <a:rPr lang="da-DK" sz="3200" b="1" smtClean="0"/>
+              <a:t>Prototypical inheritance</a:t>
+            </a:r>
+            <a:endParaRPr lang="da-DK" sz="3200" smtClean="0"/>
+          </a:p>
+          <a:p>
+            <a:r>
+              <a:rPr lang="da-DK" sz="3200" b="1" smtClean="0"/>
+              <a:t>ES6 object construction (classes)</a:t>
+            </a:r>
+            <a:endParaRPr lang="da-DK" sz="3200" smtClean="0"/>
           </a:p>
         </p:txBody>
       </p:sp>
     </p:spTree>
     <p:extLst>
       <p:ext uri="{BB962C8B-B14F-4D97-AF65-F5344CB8AC3E}">
-        <p14:creationId xmlns:p14="http://schemas.microsoft.com/office/powerpoint/2010/main" val="238437873"/>
+        <p14:creationId xmlns:p14="http://schemas.microsoft.com/office/powerpoint/2010/main" val="1518020154"/>
       </p:ext>
     </p:extLst>
   </p:cSld>
@@ -5742,34 +6263,89 @@
           </a:p>
         </p:txBody>
       </p:sp>
-      <p:pic>
-        <p:nvPicPr>
-          <p:cNvPr id="4" name="Billede 3"/>
-          <p:cNvPicPr>
-            <a:picLocks noChangeAspect="1"/>
-          </p:cNvPicPr>
-          <p:nvPr/>
-        </p:nvPicPr>
-        <p:blipFill>
-          <a:blip r:embed="rId2"/>
-          <a:stretch>
-            <a:fillRect/>
-          </a:stretch>
-        </p:blipFill>
-        <p:spPr>
-          <a:xfrm>
-            <a:off x="1186892" y="2011319"/>
-            <a:ext cx="4714875" cy="3181350"/>
-          </a:xfrm>
-          <a:prstGeom prst="rect">
-            <a:avLst/>
-          </a:prstGeom>
-        </p:spPr>
-      </p:pic>
+      <p:sp>
+        <p:nvSpPr>
+          <p:cNvPr id="3" name="Pladsholder til indhold 2"/>
+          <p:cNvSpPr>
+            <a:spLocks noGrp="1"/>
+          </p:cNvSpPr>
+          <p:nvPr>
+            <p:ph idx="1"/>
+          </p:nvPr>
+        </p:nvSpPr>
+        <p:spPr>
+          <a:xfrm>
+            <a:off x="838200" y="1825625"/>
+            <a:ext cx="9868930" cy="4351338"/>
+          </a:xfrm>
+        </p:spPr>
+        <p:txBody>
+          <a:bodyPr>
+            <a:normAutofit/>
+          </a:bodyPr>
+          <a:lstStyle/>
+          <a:p>
+            <a:r>
+              <a:rPr lang="da-DK" sz="3200" b="1" smtClean="0"/>
+              <a:t>What are objects?</a:t>
+            </a:r>
+            <a:endParaRPr lang="da-DK" sz="3200" smtClean="0"/>
+          </a:p>
+          <a:p>
+            <a:r>
+              <a:rPr lang="da-DK" sz="3200" smtClean="0"/>
+              <a:t>Objects are (just) a collection of name/value pairs</a:t>
+            </a:r>
+          </a:p>
+          <a:p>
+            <a:r>
+              <a:rPr lang="da-DK" sz="3200" smtClean="0"/>
+              <a:t>A value may be </a:t>
+            </a:r>
+          </a:p>
+          <a:p>
+            <a:pPr lvl="1"/>
+            <a:r>
+              <a:rPr lang="da-DK" sz="2800" smtClean="0"/>
+              <a:t>Of a simple type (</a:t>
+            </a:r>
+            <a:r>
+              <a:rPr lang="da-DK" sz="2800" i="1" smtClean="0"/>
+              <a:t>string</a:t>
+            </a:r>
+            <a:r>
+              <a:rPr lang="da-DK" sz="2800" smtClean="0"/>
+              <a:t>, </a:t>
+            </a:r>
+            <a:r>
+              <a:rPr lang="da-DK" sz="2800" i="1" smtClean="0"/>
+              <a:t>number</a:t>
+            </a:r>
+            <a:r>
+              <a:rPr lang="da-DK" sz="2800" smtClean="0"/>
+              <a:t>,…)</a:t>
+            </a:r>
+          </a:p>
+          <a:p>
+            <a:pPr lvl="1"/>
+            <a:r>
+              <a:rPr lang="da-DK" sz="2800" smtClean="0"/>
+              <a:t>A function definition</a:t>
+            </a:r>
+          </a:p>
+          <a:p>
+            <a:pPr lvl="1"/>
+            <a:r>
+              <a:rPr lang="da-DK" sz="2800" smtClean="0"/>
+              <a:t>An object (hello, recursion!)</a:t>
+            </a:r>
+          </a:p>
+        </p:txBody>
+      </p:sp>
     </p:spTree>
     <p:extLst>
       <p:ext uri="{BB962C8B-B14F-4D97-AF65-F5344CB8AC3E}">
-        <p14:creationId xmlns:p14="http://schemas.microsoft.com/office/powerpoint/2010/main" val="559113334"/>
+        <p14:creationId xmlns:p14="http://schemas.microsoft.com/office/powerpoint/2010/main" val="238437873"/>
       </p:ext>
     </p:extLst>
   </p:cSld>
@@ -5826,81 +6402,34 @@
           </a:p>
         </p:txBody>
       </p:sp>
-      <p:sp>
-        <p:nvSpPr>
-          <p:cNvPr id="3" name="Pladsholder til indhold 2"/>
-          <p:cNvSpPr>
-            <a:spLocks noGrp="1"/>
-          </p:cNvSpPr>
-          <p:nvPr>
-            <p:ph idx="1"/>
-          </p:nvPr>
-        </p:nvSpPr>
-        <p:spPr>
-          <a:xfrm>
-            <a:off x="838200" y="1825625"/>
-            <a:ext cx="9868930" cy="4351338"/>
-          </a:xfrm>
-        </p:spPr>
-        <p:txBody>
-          <a:bodyPr>
-            <a:normAutofit/>
-          </a:bodyPr>
-          <a:lstStyle/>
-          <a:p>
-            <a:r>
-              <a:rPr lang="da-DK" sz="3200" smtClean="0"/>
-              <a:t>Object literals: simple, but repetitive</a:t>
-            </a:r>
-          </a:p>
-          <a:p>
-            <a:pPr lvl="1"/>
-            <a:r>
-              <a:rPr lang="da-DK" sz="2800" smtClean="0"/>
-              <a:t>OK for properties (values are individual)</a:t>
-            </a:r>
-          </a:p>
-          <a:p>
-            <a:pPr lvl="1"/>
-            <a:r>
-              <a:rPr lang="da-DK" sz="2800" smtClean="0"/>
-              <a:t>Bad for functions (same for all objects of same type)</a:t>
-            </a:r>
-          </a:p>
-          <a:p>
-            <a:r>
-              <a:rPr lang="da-DK" sz="3200" smtClean="0"/>
-              <a:t>How can we ”build” objects from a definition?</a:t>
-            </a:r>
-          </a:p>
-          <a:p>
-            <a:pPr lvl="1"/>
-            <a:r>
-              <a:rPr lang="da-DK" sz="2800" smtClean="0"/>
-              <a:t>Functional constructors</a:t>
-            </a:r>
-          </a:p>
-          <a:p>
-            <a:pPr lvl="1"/>
-            <a:r>
-              <a:rPr lang="da-DK" sz="2800" smtClean="0"/>
-              <a:t>Prototypical inheritance</a:t>
-            </a:r>
-          </a:p>
-          <a:p>
-            <a:pPr lvl="1"/>
-            <a:r>
-              <a:rPr lang="da-DK" sz="2800" smtClean="0"/>
-              <a:t>Class definitions (ES6)</a:t>
-            </a:r>
-            <a:endParaRPr lang="da-DK" smtClean="0"/>
-          </a:p>
-        </p:txBody>
-      </p:sp>
+      <p:pic>
+        <p:nvPicPr>
+          <p:cNvPr id="4" name="Billede 3"/>
+          <p:cNvPicPr>
+            <a:picLocks noChangeAspect="1"/>
+          </p:cNvPicPr>
+          <p:nvPr/>
+        </p:nvPicPr>
+        <p:blipFill>
+          <a:blip r:embed="rId2"/>
+          <a:stretch>
+            <a:fillRect/>
+          </a:stretch>
+        </p:blipFill>
+        <p:spPr>
+          <a:xfrm>
+            <a:off x="1186892" y="2011319"/>
+            <a:ext cx="4714875" cy="3181350"/>
+          </a:xfrm>
+          <a:prstGeom prst="rect">
+            <a:avLst/>
+          </a:prstGeom>
+        </p:spPr>
+      </p:pic>
     </p:spTree>
     <p:extLst>
       <p:ext uri="{BB962C8B-B14F-4D97-AF65-F5344CB8AC3E}">
-        <p14:creationId xmlns:p14="http://schemas.microsoft.com/office/powerpoint/2010/main" val="4201087489"/>
+        <p14:creationId xmlns:p14="http://schemas.microsoft.com/office/powerpoint/2010/main" val="559113334"/>
       </p:ext>
     </p:extLst>
   </p:cSld>
@@ -5970,7 +6499,7 @@
         <p:spPr>
           <a:xfrm>
             <a:off x="838200" y="1825625"/>
-            <a:ext cx="6551141" cy="4351338"/>
+            <a:ext cx="9868930" cy="4351338"/>
           </a:xfrm>
         </p:spPr>
         <p:txBody>
@@ -5981,104 +6510,57 @@
           <a:p>
             <a:r>
               <a:rPr lang="da-DK" sz="3200" smtClean="0"/>
-              <a:t>Function constructors</a:t>
+              <a:t>Object literals: simple, but repetitive</a:t>
             </a:r>
           </a:p>
           <a:p>
             <a:pPr lvl="1"/>
             <a:r>
               <a:rPr lang="da-DK" sz="2800" smtClean="0"/>
-              <a:t>Remember: FUNCTIONS ARE OBJECTS!</a:t>
+              <a:t>OK for properties (values are individual)</a:t>
             </a:r>
           </a:p>
           <a:p>
             <a:pPr lvl="1"/>
             <a:r>
               <a:rPr lang="da-DK" sz="2800" smtClean="0"/>
-              <a:t>Syntax: </a:t>
-            </a:r>
-            <a:r>
-              <a:rPr lang="da-DK" sz="2800" b="1" smtClean="0"/>
-              <a:t>function</a:t>
-            </a:r>
+              <a:t>Bad for functions (same for all objects of same type)</a:t>
+            </a:r>
+          </a:p>
+          <a:p>
+            <a:r>
+              <a:rPr lang="da-DK" sz="3200" smtClean="0"/>
+              <a:t>How can we ”build” objects from a definition?</a:t>
+            </a:r>
+          </a:p>
+          <a:p>
+            <a:pPr lvl="1"/>
             <a:r>
               <a:rPr lang="da-DK" sz="2800" smtClean="0"/>
-              <a:t> </a:t>
-            </a:r>
-            <a:r>
-              <a:rPr lang="da-DK" sz="2800" i="1" smtClean="0"/>
-              <a:t>nameOfType</a:t>
-            </a:r>
+              <a:t>Functional constructors</a:t>
+            </a:r>
+          </a:p>
+          <a:p>
+            <a:pPr lvl="1"/>
             <a:r>
               <a:rPr lang="da-DK" sz="2800" smtClean="0"/>
-              <a:t> (…) {}</a:t>
+              <a:t>Prototypical inheritance</a:t>
             </a:r>
           </a:p>
           <a:p>
             <a:pPr lvl="1"/>
             <a:r>
               <a:rPr lang="da-DK" sz="2800" smtClean="0"/>
-              <a:t>Use of functional constructor:</a:t>
-            </a:r>
-          </a:p>
-          <a:p>
-            <a:pPr lvl="1"/>
-            <a:r>
-              <a:rPr lang="da-DK" sz="2800" b="1" smtClean="0"/>
-              <a:t>var</a:t>
-            </a:r>
-            <a:r>
-              <a:rPr lang="da-DK" sz="2800" smtClean="0"/>
-              <a:t> sp = </a:t>
-            </a:r>
-            <a:r>
-              <a:rPr lang="da-DK" sz="2800" b="1" smtClean="0"/>
-              <a:t>new</a:t>
-            </a:r>
-            <a:r>
-              <a:rPr lang="da-DK" sz="2800" smtClean="0"/>
-              <a:t> </a:t>
-            </a:r>
-            <a:r>
-              <a:rPr lang="da-DK" sz="2800" i="1" smtClean="0"/>
-              <a:t>SimplifiedPerson</a:t>
-            </a:r>
-            <a:r>
-              <a:rPr lang="da-DK" sz="2800" smtClean="0"/>
-              <a:t>(…);</a:t>
+              <a:t>Class definitions (ES6)</a:t>
             </a:r>
             <a:endParaRPr lang="da-DK" smtClean="0"/>
           </a:p>
         </p:txBody>
       </p:sp>
-      <p:pic>
-        <p:nvPicPr>
-          <p:cNvPr id="4" name="Billede 3"/>
-          <p:cNvPicPr>
-            <a:picLocks noChangeAspect="1"/>
-          </p:cNvPicPr>
-          <p:nvPr/>
-        </p:nvPicPr>
-        <p:blipFill>
-          <a:blip r:embed="rId2"/>
-          <a:stretch>
-            <a:fillRect/>
-          </a:stretch>
-        </p:blipFill>
-        <p:spPr>
-          <a:xfrm>
-            <a:off x="7974870" y="2184314"/>
-            <a:ext cx="3495675" cy="2724150"/>
-          </a:xfrm>
-          <a:prstGeom prst="rect">
-            <a:avLst/>
-          </a:prstGeom>
-        </p:spPr>
-      </p:pic>
     </p:spTree>
     <p:extLst>
       <p:ext uri="{BB962C8B-B14F-4D97-AF65-F5344CB8AC3E}">
-        <p14:creationId xmlns:p14="http://schemas.microsoft.com/office/powerpoint/2010/main" val="2531831910"/>
+        <p14:creationId xmlns:p14="http://schemas.microsoft.com/office/powerpoint/2010/main" val="4201087489"/>
       </p:ext>
     </p:extLst>
   </p:cSld>
@@ -6271,7 +6753,7 @@
         <p:spPr>
           <a:xfrm>
             <a:off x="838200" y="1825625"/>
-            <a:ext cx="8763000" cy="4351338"/>
+            <a:ext cx="6551141" cy="4351338"/>
           </a:xfrm>
         </p:spPr>
         <p:txBody>
@@ -6282,52 +6764,104 @@
           <a:p>
             <a:r>
               <a:rPr lang="da-DK" sz="3200" smtClean="0"/>
-              <a:t>Function constructors – fine w.r.t. properties, but still problem with functions</a:t>
+              <a:t>Function constructors</a:t>
             </a:r>
           </a:p>
           <a:p>
             <a:pPr lvl="1"/>
             <a:r>
               <a:rPr lang="da-DK" sz="2800" smtClean="0"/>
-              <a:t>Adding functions </a:t>
-            </a:r>
-            <a:r>
-              <a:rPr lang="da-DK" sz="2800" u="sng" smtClean="0"/>
-              <a:t>directly to objects</a:t>
-            </a:r>
+              <a:t>Remember: FUNCTIONS ARE OBJECTS!</a:t>
+            </a:r>
+          </a:p>
+          <a:p>
+            <a:pPr lvl="1"/>
             <a:r>
               <a:rPr lang="da-DK" sz="2800" smtClean="0"/>
-              <a:t>: works, but again repetitive [CODE]</a:t>
+              <a:t>Syntax: </a:t>
+            </a:r>
+            <a:r>
+              <a:rPr lang="da-DK" sz="2800" b="1" smtClean="0"/>
+              <a:t>function</a:t>
+            </a:r>
+            <a:r>
+              <a:rPr lang="da-DK" sz="2800" smtClean="0"/>
+              <a:t> </a:t>
+            </a:r>
+            <a:r>
+              <a:rPr lang="da-DK" sz="2800" i="1" smtClean="0"/>
+              <a:t>nameOfType</a:t>
+            </a:r>
+            <a:r>
+              <a:rPr lang="da-DK" sz="2800" smtClean="0"/>
+              <a:t> (…) {}</a:t>
             </a:r>
           </a:p>
           <a:p>
             <a:pPr lvl="1"/>
             <a:r>
               <a:rPr lang="da-DK" sz="2800" smtClean="0"/>
-              <a:t>Adding functions </a:t>
-            </a:r>
-            <a:r>
-              <a:rPr lang="da-DK" sz="2800" u="sng" smtClean="0"/>
-              <a:t>to prototype</a:t>
+              <a:t>Use of functional constructor:</a:t>
+            </a:r>
+          </a:p>
+          <a:p>
+            <a:pPr lvl="1"/>
+            <a:r>
+              <a:rPr lang="da-DK" sz="2800" b="1" smtClean="0"/>
+              <a:t>var</a:t>
             </a:r>
             <a:r>
               <a:rPr lang="da-DK" sz="2800" smtClean="0"/>
-              <a:t>: better </a:t>
-            </a:r>
-            <a:r>
-              <a:rPr lang="da-DK" sz="2800" smtClean="0">
-                <a:sym typeface="Wingdings" panose="05000000000000000000" pitchFamily="2" charset="2"/>
-              </a:rPr>
-              <a:t> [CODE]</a:t>
-            </a:r>
-            <a:endParaRPr lang="da-DK" sz="2800" smtClean="0"/>
-          </a:p>
-        </p:txBody>
-      </p:sp>
+              <a:t> sp = </a:t>
+            </a:r>
+            <a:r>
+              <a:rPr lang="da-DK" sz="2800" b="1" smtClean="0"/>
+              <a:t>new</a:t>
+            </a:r>
+            <a:r>
+              <a:rPr lang="da-DK" sz="2800" smtClean="0"/>
+              <a:t> </a:t>
+            </a:r>
+            <a:r>
+              <a:rPr lang="da-DK" sz="2800" i="1" smtClean="0"/>
+              <a:t>SimplifiedPerson</a:t>
+            </a:r>
+            <a:r>
+              <a:rPr lang="da-DK" sz="2800" smtClean="0"/>
+              <a:t>(…);</a:t>
+            </a:r>
+            <a:endParaRPr lang="da-DK" smtClean="0"/>
+          </a:p>
+        </p:txBody>
+      </p:sp>
+      <p:pic>
+        <p:nvPicPr>
+          <p:cNvPr id="4" name="Billede 3"/>
+          <p:cNvPicPr>
+            <a:picLocks noChangeAspect="1"/>
+          </p:cNvPicPr>
+          <p:nvPr/>
+        </p:nvPicPr>
+        <p:blipFill>
+          <a:blip r:embed="rId2"/>
+          <a:stretch>
+            <a:fillRect/>
+          </a:stretch>
+        </p:blipFill>
+        <p:spPr>
+          <a:xfrm>
+            <a:off x="7974870" y="2184314"/>
+            <a:ext cx="3495675" cy="2724150"/>
+          </a:xfrm>
+          <a:prstGeom prst="rect">
+            <a:avLst/>
+          </a:prstGeom>
+        </p:spPr>
+      </p:pic>
     </p:spTree>
     <p:extLst>
       <p:ext uri="{BB962C8B-B14F-4D97-AF65-F5344CB8AC3E}">
-        <p14:creationId xmlns:p14="http://schemas.microsoft.com/office/powerpoint/2010/main" val="2736703107"/>
+        <p14:creationId xmlns:p14="http://schemas.microsoft.com/office/powerpoint/2010/main" val="2531831910"/>
       </p:ext>
     </p:extLst>
   </p:cSld>
@@ -6384,34 +6918,76 @@
           </a:p>
         </p:txBody>
       </p:sp>
-      <p:pic>
-        <p:nvPicPr>
-          <p:cNvPr id="5" name="Billede 4"/>
-          <p:cNvPicPr>
-            <a:picLocks noChangeAspect="1"/>
-          </p:cNvPicPr>
-          <p:nvPr/>
-        </p:nvPicPr>
-        <p:blipFill>
-          <a:blip r:embed="rId2"/>
-          <a:stretch>
-            <a:fillRect/>
-          </a:stretch>
-        </p:blipFill>
-        <p:spPr>
-          <a:xfrm>
-            <a:off x="957649" y="1622413"/>
-            <a:ext cx="8697740" cy="4582224"/>
-          </a:xfrm>
-          <a:prstGeom prst="rect">
-            <a:avLst/>
-          </a:prstGeom>
-        </p:spPr>
-      </p:pic>
+      <p:sp>
+        <p:nvSpPr>
+          <p:cNvPr id="3" name="Pladsholder til indhold 2"/>
+          <p:cNvSpPr>
+            <a:spLocks noGrp="1"/>
+          </p:cNvSpPr>
+          <p:nvPr>
+            <p:ph idx="1"/>
+          </p:nvPr>
+        </p:nvSpPr>
+        <p:spPr>
+          <a:xfrm>
+            <a:off x="838200" y="1825625"/>
+            <a:ext cx="8763000" cy="4351338"/>
+          </a:xfrm>
+        </p:spPr>
+        <p:txBody>
+          <a:bodyPr>
+            <a:normAutofit/>
+          </a:bodyPr>
+          <a:lstStyle/>
+          <a:p>
+            <a:r>
+              <a:rPr lang="da-DK" sz="3200" smtClean="0"/>
+              <a:t>Function constructors – fine w.r.t. properties, but still problem with functions</a:t>
+            </a:r>
+          </a:p>
+          <a:p>
+            <a:pPr lvl="1"/>
+            <a:r>
+              <a:rPr lang="da-DK" sz="2800" smtClean="0"/>
+              <a:t>Adding functions </a:t>
+            </a:r>
+            <a:r>
+              <a:rPr lang="da-DK" sz="2800" u="sng" smtClean="0"/>
+              <a:t>directly to objects</a:t>
+            </a:r>
+            <a:r>
+              <a:rPr lang="da-DK" sz="2800" smtClean="0"/>
+              <a:t>: works, but again repetitive [CODE]</a:t>
+            </a:r>
+          </a:p>
+          <a:p>
+            <a:pPr lvl="1"/>
+            <a:r>
+              <a:rPr lang="da-DK" sz="2800" smtClean="0"/>
+              <a:t>Adding functions </a:t>
+            </a:r>
+            <a:r>
+              <a:rPr lang="da-DK" sz="2800" u="sng" smtClean="0"/>
+              <a:t>to prototype</a:t>
+            </a:r>
+            <a:r>
+              <a:rPr lang="da-DK" sz="2800" smtClean="0"/>
+              <a:t>: better </a:t>
+            </a:r>
+            <a:r>
+              <a:rPr lang="da-DK" sz="2800" smtClean="0">
+                <a:sym typeface="Wingdings" panose="05000000000000000000" pitchFamily="2" charset="2"/>
+              </a:rPr>
+              <a:t> [CODE]</a:t>
+            </a:r>
+            <a:endParaRPr lang="da-DK" sz="2800" smtClean="0"/>
+          </a:p>
+        </p:txBody>
+      </p:sp>
     </p:spTree>
     <p:extLst>
       <p:ext uri="{BB962C8B-B14F-4D97-AF65-F5344CB8AC3E}">
-        <p14:creationId xmlns:p14="http://schemas.microsoft.com/office/powerpoint/2010/main" val="3151055677"/>
+        <p14:creationId xmlns:p14="http://schemas.microsoft.com/office/powerpoint/2010/main" val="2736703107"/>
       </p:ext>
     </p:extLst>
   </p:cSld>
@@ -6468,102 +7044,34 @@
           </a:p>
         </p:txBody>
       </p:sp>
-      <p:sp>
-        <p:nvSpPr>
-          <p:cNvPr id="3" name="Pladsholder til indhold 2"/>
-          <p:cNvSpPr>
-            <a:spLocks noGrp="1"/>
-          </p:cNvSpPr>
-          <p:nvPr>
-            <p:ph idx="1"/>
-          </p:nvPr>
-        </p:nvSpPr>
-        <p:spPr>
-          <a:xfrm>
-            <a:off x="838200" y="1825625"/>
-            <a:ext cx="9813324" cy="4351338"/>
-          </a:xfrm>
-        </p:spPr>
-        <p:txBody>
-          <a:bodyPr>
-            <a:normAutofit/>
-          </a:bodyPr>
-          <a:lstStyle/>
-          <a:p>
-            <a:r>
-              <a:rPr lang="da-DK" sz="3200" smtClean="0"/>
-              <a:t>Now </a:t>
-            </a:r>
-            <a:r>
-              <a:rPr lang="da-DK" sz="3200" b="1" smtClean="0"/>
-              <a:t>SimplifiedPerson</a:t>
-            </a:r>
-            <a:r>
-              <a:rPr lang="da-DK" sz="3200" smtClean="0"/>
-              <a:t> is (almost) like a class definition</a:t>
-            </a:r>
-          </a:p>
-          <a:p>
-            <a:pPr lvl="1"/>
-            <a:r>
-              <a:rPr lang="da-DK" sz="2800" smtClean="0"/>
-              <a:t>Function constructor for setting object-specific property values</a:t>
-            </a:r>
-          </a:p>
-          <a:p>
-            <a:pPr lvl="1"/>
-            <a:r>
-              <a:rPr lang="da-DK" sz="2800" smtClean="0"/>
-              <a:t>Functions added to </a:t>
-            </a:r>
-            <a:r>
-              <a:rPr lang="da-DK" sz="2800" b="1"/>
-              <a:t>SimplifiedPerson </a:t>
-            </a:r>
-            <a:r>
-              <a:rPr lang="da-DK" sz="2800" smtClean="0"/>
-              <a:t>prototype, thereby available to all objects of ”type”</a:t>
-            </a:r>
-            <a:r>
-              <a:rPr lang="da-DK" sz="2800" b="1"/>
-              <a:t> </a:t>
-            </a:r>
-            <a:r>
-              <a:rPr lang="da-DK" sz="2800" b="1" smtClean="0"/>
-              <a:t>SimplifiedPerson</a:t>
-            </a:r>
-          </a:p>
-          <a:p>
-            <a:r>
-              <a:rPr lang="da-DK" sz="3200" smtClean="0"/>
-              <a:t>But what about inheritance…? </a:t>
-            </a:r>
-          </a:p>
-          <a:p>
-            <a:r>
-              <a:rPr lang="da-DK" sz="3200" b="1" smtClean="0"/>
-              <a:t>Person </a:t>
-            </a:r>
-            <a:r>
-              <a:rPr lang="da-DK" sz="3200" smtClean="0"/>
-              <a:t>= </a:t>
-            </a:r>
-            <a:r>
-              <a:rPr lang="da-DK" sz="3200" b="1" smtClean="0"/>
-              <a:t>SimplifiedPerson </a:t>
-            </a:r>
-            <a:r>
-              <a:rPr lang="da-DK" sz="3200" smtClean="0"/>
-              <a:t>+ address properties. How…?</a:t>
-            </a:r>
-            <a:endParaRPr lang="da-DK" smtClean="0"/>
-          </a:p>
-        </p:txBody>
-      </p:sp>
+      <p:pic>
+        <p:nvPicPr>
+          <p:cNvPr id="5" name="Billede 4"/>
+          <p:cNvPicPr>
+            <a:picLocks noChangeAspect="1"/>
+          </p:cNvPicPr>
+          <p:nvPr/>
+        </p:nvPicPr>
+        <p:blipFill>
+          <a:blip r:embed="rId2"/>
+          <a:stretch>
+            <a:fillRect/>
+          </a:stretch>
+        </p:blipFill>
+        <p:spPr>
+          <a:xfrm>
+            <a:off x="957649" y="1622413"/>
+            <a:ext cx="8697740" cy="4582224"/>
+          </a:xfrm>
+          <a:prstGeom prst="rect">
+            <a:avLst/>
+          </a:prstGeom>
+        </p:spPr>
+      </p:pic>
     </p:spTree>
     <p:extLst>
       <p:ext uri="{BB962C8B-B14F-4D97-AF65-F5344CB8AC3E}">
-        <p14:creationId xmlns:p14="http://schemas.microsoft.com/office/powerpoint/2010/main" val="4112077595"/>
+        <p14:creationId xmlns:p14="http://schemas.microsoft.com/office/powerpoint/2010/main" val="3151055677"/>
       </p:ext>
     </p:extLst>
   </p:cSld>
@@ -6632,8 +7140,8 @@
         </p:nvSpPr>
         <p:spPr>
           <a:xfrm>
-            <a:off x="838200" y="1825624"/>
-            <a:ext cx="9813324" cy="4643137"/>
+            <a:off x="838200" y="1825625"/>
+            <a:ext cx="9813324" cy="4351338"/>
           </a:xfrm>
         </p:spPr>
         <p:txBody>
@@ -6644,100 +7152,78 @@
           <a:p>
             <a:r>
               <a:rPr lang="da-DK" sz="3200" smtClean="0"/>
-              <a:t>JS offers </a:t>
+              <a:t>Now </a:t>
             </a:r>
             <a:r>
               <a:rPr lang="da-DK" sz="3200" b="1" smtClean="0"/>
-              <a:t>prototypical inheritance</a:t>
-            </a:r>
-          </a:p>
-          <a:p>
+              <a:t>SimplifiedPerson</a:t>
+            </a:r>
             <a:r>
               <a:rPr lang="da-DK" sz="3200" smtClean="0"/>
-              <a:t>Slightly convoluted…</a:t>
+              <a:t> is (almost) like a class definition</a:t>
             </a:r>
           </a:p>
           <a:p>
             <a:pPr lvl="1"/>
             <a:r>
               <a:rPr lang="da-DK" sz="2800" smtClean="0"/>
-              <a:t>Create function constructor for ”derived” type (</a:t>
+              <a:t>Function constructor for setting object-specific property values</a:t>
+            </a:r>
+          </a:p>
+          <a:p>
+            <a:pPr lvl="1"/>
+            <a:r>
+              <a:rPr lang="da-DK" sz="2800" smtClean="0"/>
+              <a:t>Functions added to </a:t>
+            </a:r>
+            <a:r>
+              <a:rPr lang="da-DK" sz="2800" b="1"/>
+              <a:t>SimplifiedPerson </a:t>
+            </a:r>
+            <a:r>
+              <a:rPr lang="da-DK" sz="2800" smtClean="0"/>
+              <a:t>prototype, thereby available to all objects of ”type”</a:t>
+            </a:r>
+            <a:r>
+              <a:rPr lang="da-DK" sz="2800" b="1"/>
+              <a:t> </a:t>
             </a:r>
             <a:r>
               <a:rPr lang="da-DK" sz="2800" b="1" smtClean="0"/>
-              <a:t>Person</a:t>
-            </a:r>
-            <a:r>
-              <a:rPr lang="da-DK" sz="2800" smtClean="0"/>
-              <a:t>)</a:t>
-            </a:r>
-          </a:p>
-          <a:p>
-            <a:pPr lvl="1"/>
-            <a:r>
-              <a:rPr lang="da-DK" sz="2800" smtClean="0"/>
-              <a:t>Inside new function constructor, call the ”base” function constructor (</a:t>
-            </a:r>
-            <a:r>
-              <a:rPr lang="da-DK" sz="2800" b="1" smtClean="0"/>
-              <a:t>SimplifiedPerson.call</a:t>
-            </a:r>
-            <a:r>
-              <a:rPr lang="da-DK" sz="2800" smtClean="0"/>
-              <a:t>(</a:t>
-            </a:r>
-            <a:r>
-              <a:rPr lang="da-DK" sz="2800" i="1" smtClean="0"/>
-              <a:t>this</a:t>
-            </a:r>
-            <a:r>
-              <a:rPr lang="da-DK" sz="2800" smtClean="0"/>
-              <a:t>,…))</a:t>
-            </a:r>
-          </a:p>
-          <a:p>
-            <a:pPr lvl="1"/>
-            <a:r>
-              <a:rPr lang="da-DK" sz="2800" smtClean="0"/>
-              <a:t>Do usual initialisation of properties in derived type</a:t>
-            </a:r>
-          </a:p>
-          <a:p>
-            <a:pPr lvl="1"/>
-            <a:r>
-              <a:rPr lang="da-DK" sz="2800" smtClean="0"/>
-              <a:t>AFTER </a:t>
-            </a:r>
-            <a:r>
-              <a:rPr lang="da-DK" sz="2800"/>
-              <a:t>function </a:t>
-            </a:r>
-            <a:r>
-              <a:rPr lang="da-DK" sz="2800" smtClean="0"/>
-              <a:t>constructor, set prototype of derived type to refer to prototype of base type, using </a:t>
-            </a:r>
-            <a:r>
-              <a:rPr lang="da-DK" sz="2800" b="1" smtClean="0"/>
-              <a:t>Object.create</a:t>
-            </a:r>
-            <a:r>
-              <a:rPr lang="da-DK" sz="2800" smtClean="0"/>
-              <a:t>(…)</a:t>
+              <a:t>SimplifiedPerson</a:t>
             </a:r>
           </a:p>
           <a:p>
             <a:r>
               <a:rPr lang="da-DK" sz="3200" smtClean="0"/>
-              <a:t>[CODE] </a:t>
-            </a:r>
-            <a:endParaRPr lang="da-DK" sz="3200"/>
+              <a:t>But what about inheritance…? </a:t>
+            </a:r>
+          </a:p>
+          <a:p>
+            <a:r>
+              <a:rPr lang="da-DK" sz="3200" b="1" smtClean="0"/>
+              <a:t>Person </a:t>
+            </a:r>
+            <a:r>
+              <a:rPr lang="da-DK" sz="3200" smtClean="0"/>
+              <a:t>= </a:t>
+            </a:r>
+            <a:r>
+              <a:rPr lang="da-DK" sz="3200" b="1" smtClean="0"/>
+              <a:t>SimplifiedPerson </a:t>
+            </a:r>
+            <a:r>
+              <a:rPr lang="da-DK" sz="3200" smtClean="0"/>
+              <a:t>+ address properties. How…?</a:t>
+            </a:r>
+            <a:endParaRPr lang="da-DK" smtClean="0"/>
           </a:p>
         </p:txBody>
       </p:sp>
     </p:spTree>
     <p:extLst>
       <p:ext uri="{BB962C8B-B14F-4D97-AF65-F5344CB8AC3E}">
-        <p14:creationId xmlns:p14="http://schemas.microsoft.com/office/powerpoint/2010/main" val="4087434526"/>
+        <p14:creationId xmlns:p14="http://schemas.microsoft.com/office/powerpoint/2010/main" val="4112077595"/>
       </p:ext>
     </p:extLst>
   </p:cSld>
@@ -6794,34 +7280,124 @@
           </a:p>
         </p:txBody>
       </p:sp>
-      <p:pic>
-        <p:nvPicPr>
-          <p:cNvPr id="5" name="Billede 4"/>
-          <p:cNvPicPr>
-            <a:picLocks noChangeAspect="1"/>
-          </p:cNvPicPr>
-          <p:nvPr/>
-        </p:nvPicPr>
-        <p:blipFill>
-          <a:blip r:embed="rId2"/>
-          <a:stretch>
-            <a:fillRect/>
-          </a:stretch>
-        </p:blipFill>
-        <p:spPr>
-          <a:xfrm>
-            <a:off x="2009775" y="2024062"/>
-            <a:ext cx="8172450" cy="2809875"/>
-          </a:xfrm>
-          <a:prstGeom prst="rect">
-            <a:avLst/>
-          </a:prstGeom>
-        </p:spPr>
-      </p:pic>
+      <p:sp>
+        <p:nvSpPr>
+          <p:cNvPr id="3" name="Pladsholder til indhold 2"/>
+          <p:cNvSpPr>
+            <a:spLocks noGrp="1"/>
+          </p:cNvSpPr>
+          <p:nvPr>
+            <p:ph idx="1"/>
+          </p:nvPr>
+        </p:nvSpPr>
+        <p:spPr>
+          <a:xfrm>
+            <a:off x="838200" y="1825624"/>
+            <a:ext cx="9813324" cy="4643137"/>
+          </a:xfrm>
+        </p:spPr>
+        <p:txBody>
+          <a:bodyPr>
+            <a:normAutofit/>
+          </a:bodyPr>
+          <a:lstStyle/>
+          <a:p>
+            <a:r>
+              <a:rPr lang="da-DK" sz="3200" smtClean="0"/>
+              <a:t>JS offers </a:t>
+            </a:r>
+            <a:r>
+              <a:rPr lang="da-DK" sz="3200" b="1" smtClean="0"/>
+              <a:t>prototypical inheritance</a:t>
+            </a:r>
+          </a:p>
+          <a:p>
+            <a:r>
+              <a:rPr lang="da-DK" sz="3200" smtClean="0"/>
+              <a:t>Slightly convoluted…</a:t>
+            </a:r>
+          </a:p>
+          <a:p>
+            <a:pPr lvl="1"/>
+            <a:r>
+              <a:rPr lang="da-DK" sz="2800" smtClean="0"/>
+              <a:t>Create function constructor for ”derived” type (</a:t>
+            </a:r>
+            <a:r>
+              <a:rPr lang="da-DK" sz="2800" b="1" smtClean="0"/>
+              <a:t>Person</a:t>
+            </a:r>
+            <a:r>
+              <a:rPr lang="da-DK" sz="2800" smtClean="0"/>
+              <a:t>)</a:t>
+            </a:r>
+          </a:p>
+          <a:p>
+            <a:pPr lvl="1"/>
+            <a:r>
+              <a:rPr lang="da-DK" sz="2800" smtClean="0"/>
+              <a:t>Inside new function constructor, call the ”base” function constructor (</a:t>
+            </a:r>
+            <a:r>
+              <a:rPr lang="da-DK" sz="2800" b="1" smtClean="0"/>
+              <a:t>SimplifiedPerson.call</a:t>
+            </a:r>
+            <a:r>
+              <a:rPr lang="da-DK" sz="2800" smtClean="0"/>
+              <a:t>(</a:t>
+            </a:r>
+            <a:r>
+              <a:rPr lang="da-DK" sz="2800" i="1" smtClean="0"/>
+              <a:t>this</a:t>
+            </a:r>
+            <a:r>
+              <a:rPr lang="da-DK" sz="2800" smtClean="0"/>
+              <a:t>,…))</a:t>
+            </a:r>
+          </a:p>
+          <a:p>
+            <a:pPr lvl="1"/>
+            <a:r>
+              <a:rPr lang="da-DK" sz="2800" smtClean="0"/>
+              <a:t>Do usual initialisation of properties in derived type</a:t>
+            </a:r>
+          </a:p>
+          <a:p>
+            <a:pPr lvl="1"/>
+            <a:r>
+              <a:rPr lang="da-DK" sz="2800" smtClean="0"/>
+              <a:t>AFTER </a:t>
+            </a:r>
+            <a:r>
+              <a:rPr lang="da-DK" sz="2800"/>
+              <a:t>function </a:t>
+            </a:r>
+            <a:r>
+              <a:rPr lang="da-DK" sz="2800" smtClean="0"/>
+              <a:t>constructor, set prototype of derived type to refer to prototype of base type, using </a:t>
+            </a:r>
+            <a:r>
+              <a:rPr lang="da-DK" sz="2800" b="1" smtClean="0"/>
+              <a:t>Object.create</a:t>
+            </a:r>
+            <a:r>
+              <a:rPr lang="da-DK" sz="2800" smtClean="0"/>
+              <a:t>(…)</a:t>
+            </a:r>
+          </a:p>
+          <a:p>
+            <a:r>
+              <a:rPr lang="da-DK" sz="3200" smtClean="0"/>
+              <a:t>[CODE] </a:t>
+            </a:r>
+            <a:endParaRPr lang="da-DK" sz="3200"/>
+          </a:p>
+        </p:txBody>
+      </p:sp>
     </p:spTree>
     <p:extLst>
       <p:ext uri="{BB962C8B-B14F-4D97-AF65-F5344CB8AC3E}">
-        <p14:creationId xmlns:p14="http://schemas.microsoft.com/office/powerpoint/2010/main" val="1972417421"/>
+        <p14:creationId xmlns:p14="http://schemas.microsoft.com/office/powerpoint/2010/main" val="4087434526"/>
       </p:ext>
     </p:extLst>
   </p:cSld>
@@ -6880,7 +7456,7 @@
       </p:sp>
       <p:pic>
         <p:nvPicPr>
-          <p:cNvPr id="3" name="Billede 2"/>
+          <p:cNvPr id="5" name="Billede 4"/>
           <p:cNvPicPr>
             <a:picLocks noChangeAspect="1"/>
           </p:cNvPicPr>
@@ -6894,8 +7470,8 @@
         </p:blipFill>
         <p:spPr>
           <a:xfrm>
-            <a:off x="1343023" y="2168482"/>
-            <a:ext cx="9201711" cy="2656832"/>
+            <a:off x="2009775" y="2024062"/>
+            <a:ext cx="8172450" cy="2809875"/>
           </a:xfrm>
           <a:prstGeom prst="rect">
             <a:avLst/>
@@ -6905,7 +7481,7 @@
     </p:spTree>
     <p:extLst>
       <p:ext uri="{BB962C8B-B14F-4D97-AF65-F5344CB8AC3E}">
-        <p14:creationId xmlns:p14="http://schemas.microsoft.com/office/powerpoint/2010/main" val="249708639"/>
+        <p14:creationId xmlns:p14="http://schemas.microsoft.com/office/powerpoint/2010/main" val="1972417421"/>
       </p:ext>
     </p:extLst>
   </p:cSld>
@@ -6962,68 +7538,34 @@
           </a:p>
         </p:txBody>
       </p:sp>
-      <p:sp>
-        <p:nvSpPr>
-          <p:cNvPr id="3" name="Pladsholder til indhold 2"/>
-          <p:cNvSpPr>
-            <a:spLocks noGrp="1"/>
-          </p:cNvSpPr>
-          <p:nvPr>
-            <p:ph idx="1"/>
-          </p:nvPr>
-        </p:nvSpPr>
-        <p:spPr>
-          <a:xfrm>
-            <a:off x="838200" y="1825624"/>
-            <a:ext cx="8798169" cy="4643137"/>
-          </a:xfrm>
-        </p:spPr>
-        <p:txBody>
-          <a:bodyPr>
-            <a:normAutofit/>
-          </a:bodyPr>
-          <a:lstStyle/>
-          <a:p>
-            <a:r>
-              <a:rPr lang="da-DK" sz="3200" smtClean="0"/>
-              <a:t>ES6/2015 now offers the </a:t>
-            </a:r>
-            <a:r>
-              <a:rPr lang="da-DK" sz="3200" b="1" smtClean="0"/>
-              <a:t>class</a:t>
-            </a:r>
-            <a:r>
-              <a:rPr lang="da-DK" sz="3200" smtClean="0"/>
-              <a:t> keyword (also the </a:t>
-            </a:r>
-            <a:r>
-              <a:rPr lang="da-DK" sz="3200" b="1" smtClean="0"/>
-              <a:t>extends</a:t>
-            </a:r>
-            <a:r>
-              <a:rPr lang="da-DK" sz="3200" smtClean="0"/>
-              <a:t> keyword)</a:t>
-            </a:r>
-          </a:p>
-          <a:p>
-            <a:r>
-              <a:rPr lang="da-DK" sz="3200" smtClean="0"/>
-              <a:t>Class definitions are now (syntactically) closer to e.g. class defintions in C#</a:t>
-            </a:r>
-          </a:p>
-          <a:p>
-            <a:r>
-              <a:rPr lang="da-DK" sz="3200" smtClean="0"/>
-              <a:t>NB: only ”syntactic sugar” – nothing has changed under the covers…</a:t>
-            </a:r>
-            <a:endParaRPr lang="da-DK" sz="3200"/>
-          </a:p>
-        </p:txBody>
-      </p:sp>
+      <p:pic>
+        <p:nvPicPr>
+          <p:cNvPr id="3" name="Billede 2"/>
+          <p:cNvPicPr>
+            <a:picLocks noChangeAspect="1"/>
+          </p:cNvPicPr>
+          <p:nvPr/>
+        </p:nvPicPr>
+        <p:blipFill>
+          <a:blip r:embed="rId2"/>
+          <a:stretch>
+            <a:fillRect/>
+          </a:stretch>
+        </p:blipFill>
+        <p:spPr>
+          <a:xfrm>
+            <a:off x="1343023" y="2168482"/>
+            <a:ext cx="9201711" cy="2656832"/>
+          </a:xfrm>
+          <a:prstGeom prst="rect">
+            <a:avLst/>
+          </a:prstGeom>
+        </p:spPr>
+      </p:pic>
     </p:spTree>
     <p:extLst>
       <p:ext uri="{BB962C8B-B14F-4D97-AF65-F5344CB8AC3E}">
-        <p14:creationId xmlns:p14="http://schemas.microsoft.com/office/powerpoint/2010/main" val="3373481062"/>
+        <p14:creationId xmlns:p14="http://schemas.microsoft.com/office/powerpoint/2010/main" val="249708639"/>
       </p:ext>
     </p:extLst>
   </p:cSld>
@@ -7093,7 +7635,7 @@
         <p:spPr>
           <a:xfrm>
             <a:off x="838200" y="1825624"/>
-            <a:ext cx="9024815" cy="4643137"/>
+            <a:ext cx="8798169" cy="4643137"/>
           </a:xfrm>
         </p:spPr>
         <p:txBody>
@@ -7104,63 +7646,44 @@
           <a:p>
             <a:r>
               <a:rPr lang="da-DK" sz="3200" smtClean="0"/>
-              <a:t>ES6 class definition</a:t>
-            </a:r>
-          </a:p>
-          <a:p>
-            <a:pPr lvl="1"/>
-            <a:r>
-              <a:rPr lang="da-DK" sz="2800" smtClean="0"/>
-              <a:t>Uses </a:t>
-            </a:r>
-            <a:r>
-              <a:rPr lang="da-DK" sz="2800" b="1" smtClean="0"/>
+              <a:t>ES6/2015 now offers the </a:t>
+            </a:r>
+            <a:r>
+              <a:rPr lang="da-DK" sz="3200" b="1" smtClean="0"/>
               <a:t>class</a:t>
             </a:r>
             <a:r>
-              <a:rPr lang="da-DK" sz="2800" smtClean="0"/>
-              <a:t> keyword</a:t>
-            </a:r>
-          </a:p>
-          <a:p>
-            <a:pPr lvl="1"/>
-            <a:r>
-              <a:rPr lang="da-DK" sz="2800" smtClean="0"/>
-              <a:t>Function constructor marked with </a:t>
-            </a:r>
-            <a:r>
-              <a:rPr lang="da-DK" sz="2800" b="1" smtClean="0"/>
-              <a:t>constructor</a:t>
-            </a:r>
-            <a:r>
-              <a:rPr lang="da-DK" sz="2800" smtClean="0"/>
-              <a:t> keyword</a:t>
-            </a:r>
-          </a:p>
-          <a:p>
-            <a:pPr lvl="1"/>
-            <a:r>
-              <a:rPr lang="da-DK" sz="2800" smtClean="0"/>
-              <a:t>No explicit properties – properties are typically added in the function constructor</a:t>
-            </a:r>
-          </a:p>
-          <a:p>
-            <a:pPr lvl="1"/>
-            <a:r>
-              <a:rPr lang="da-DK" sz="2800" smtClean="0"/>
-              <a:t>Methods added inside class definition, syntax is </a:t>
-            </a:r>
-            <a:r>
-              <a:rPr lang="da-DK" sz="2800" i="1" smtClean="0"/>
-              <a:t>nameOfMethod(…parameter list…) { body}</a:t>
-            </a:r>
+              <a:rPr lang="da-DK" sz="3200" smtClean="0"/>
+              <a:t> keyword (also the </a:t>
+            </a:r>
+            <a:r>
+              <a:rPr lang="da-DK" sz="3200" b="1" smtClean="0"/>
+              <a:t>extends</a:t>
+            </a:r>
+            <a:r>
+              <a:rPr lang="da-DK" sz="3200" smtClean="0"/>
+              <a:t> keyword)</a:t>
+            </a:r>
+          </a:p>
+          <a:p>
+            <a:r>
+              <a:rPr lang="da-DK" sz="3200" smtClean="0"/>
+              <a:t>Class definitions are now (syntactically) closer to e.g. class defintions in C#</a:t>
+            </a:r>
+          </a:p>
+          <a:p>
+            <a:r>
+              <a:rPr lang="da-DK" sz="3200" smtClean="0"/>
+              <a:t>NB: only ”syntactic sugar” – nothing has changed under the covers…</a:t>
+            </a:r>
+            <a:endParaRPr lang="da-DK" sz="3200"/>
           </a:p>
         </p:txBody>
       </p:sp>
     </p:spTree>
     <p:extLst>
       <p:ext uri="{BB962C8B-B14F-4D97-AF65-F5344CB8AC3E}">
-        <p14:creationId xmlns:p14="http://schemas.microsoft.com/office/powerpoint/2010/main" val="3473536490"/>
+        <p14:creationId xmlns:p14="http://schemas.microsoft.com/office/powerpoint/2010/main" val="3373481062"/>
       </p:ext>
     </p:extLst>
   </p:cSld>
@@ -7217,34 +7740,87 @@
           </a:p>
         </p:txBody>
       </p:sp>
-      <p:pic>
-        <p:nvPicPr>
-          <p:cNvPr id="4" name="Billede 3"/>
-          <p:cNvPicPr>
-            <a:picLocks noChangeAspect="1"/>
-          </p:cNvPicPr>
-          <p:nvPr/>
-        </p:nvPicPr>
-        <p:blipFill>
-          <a:blip r:embed="rId2"/>
-          <a:stretch>
-            <a:fillRect/>
-          </a:stretch>
-        </p:blipFill>
-        <p:spPr>
-          <a:xfrm>
-            <a:off x="2319459" y="1690688"/>
-            <a:ext cx="6918325" cy="4385916"/>
-          </a:xfrm>
-          <a:prstGeom prst="rect">
-            <a:avLst/>
-          </a:prstGeom>
-        </p:spPr>
-      </p:pic>
+      <p:sp>
+        <p:nvSpPr>
+          <p:cNvPr id="3" name="Pladsholder til indhold 2"/>
+          <p:cNvSpPr>
+            <a:spLocks noGrp="1"/>
+          </p:cNvSpPr>
+          <p:nvPr>
+            <p:ph idx="1"/>
+          </p:nvPr>
+        </p:nvSpPr>
+        <p:spPr>
+          <a:xfrm>
+            <a:off x="838200" y="1825624"/>
+            <a:ext cx="9024815" cy="4643137"/>
+          </a:xfrm>
+        </p:spPr>
+        <p:txBody>
+          <a:bodyPr>
+            <a:normAutofit/>
+          </a:bodyPr>
+          <a:lstStyle/>
+          <a:p>
+            <a:r>
+              <a:rPr lang="da-DK" sz="3200" smtClean="0"/>
+              <a:t>ES6 class definition</a:t>
+            </a:r>
+          </a:p>
+          <a:p>
+            <a:pPr lvl="1"/>
+            <a:r>
+              <a:rPr lang="da-DK" sz="2800" smtClean="0"/>
+              <a:t>Uses </a:t>
+            </a:r>
+            <a:r>
+              <a:rPr lang="da-DK" sz="2800" b="1" smtClean="0"/>
+              <a:t>class</a:t>
+            </a:r>
+            <a:r>
+              <a:rPr lang="da-DK" sz="2800" smtClean="0"/>
+              <a:t> keyword</a:t>
+            </a:r>
+          </a:p>
+          <a:p>
+            <a:pPr lvl="1"/>
+            <a:r>
+              <a:rPr lang="da-DK" sz="2800" smtClean="0"/>
+              <a:t>Function constructor marked with </a:t>
+            </a:r>
+            <a:r>
+              <a:rPr lang="da-DK" sz="2800" b="1" smtClean="0"/>
+              <a:t>constructor</a:t>
+            </a:r>
+            <a:r>
+              <a:rPr lang="da-DK" sz="2800" smtClean="0"/>
+              <a:t> keyword</a:t>
+            </a:r>
+          </a:p>
+          <a:p>
+            <a:pPr lvl="1"/>
+            <a:r>
+              <a:rPr lang="da-DK" sz="2800" smtClean="0"/>
+              <a:t>No explicit properties – properties are typically added in the function constructor</a:t>
+            </a:r>
+          </a:p>
+          <a:p>
+            <a:pPr lvl="1"/>
+            <a:r>
+              <a:rPr lang="da-DK" sz="2800" smtClean="0"/>
+              <a:t>Methods added inside class definition, syntax is </a:t>
+            </a:r>
+            <a:r>
+              <a:rPr lang="da-DK" sz="2800" i="1" smtClean="0"/>
+              <a:t>nameOfMethod(…parameter list…) { body}</a:t>
+            </a:r>
+          </a:p>
+        </p:txBody>
+      </p:sp>
     </p:spTree>
     <p:extLst>
       <p:ext uri="{BB962C8B-B14F-4D97-AF65-F5344CB8AC3E}">
-        <p14:creationId xmlns:p14="http://schemas.microsoft.com/office/powerpoint/2010/main" val="3405495008"/>
+        <p14:creationId xmlns:p14="http://schemas.microsoft.com/office/powerpoint/2010/main" val="3473536490"/>
       </p:ext>
     </p:extLst>
   </p:cSld>
@@ -7301,77 +7877,34 @@
           </a:p>
         </p:txBody>
       </p:sp>
-      <p:sp>
-        <p:nvSpPr>
-          <p:cNvPr id="3" name="Pladsholder til indhold 2"/>
-          <p:cNvSpPr>
-            <a:spLocks noGrp="1"/>
-          </p:cNvSpPr>
-          <p:nvPr>
-            <p:ph idx="1"/>
-          </p:nvPr>
-        </p:nvSpPr>
-        <p:spPr>
-          <a:xfrm>
-            <a:off x="838200" y="1825624"/>
-            <a:ext cx="9024815" cy="4643137"/>
-          </a:xfrm>
-        </p:spPr>
-        <p:txBody>
-          <a:bodyPr>
-            <a:normAutofit/>
-          </a:bodyPr>
-          <a:lstStyle/>
-          <a:p>
-            <a:r>
-              <a:rPr lang="da-DK" sz="3200" smtClean="0"/>
-              <a:t>ES6 class definition</a:t>
-            </a:r>
-          </a:p>
-          <a:p>
-            <a:pPr lvl="1"/>
-            <a:r>
-              <a:rPr lang="da-DK" sz="2800" smtClean="0"/>
-              <a:t>Inheritance by use of </a:t>
-            </a:r>
-            <a:r>
-              <a:rPr lang="da-DK" sz="2800" b="1" smtClean="0"/>
-              <a:t>extends</a:t>
-            </a:r>
-            <a:r>
-              <a:rPr lang="da-DK" sz="2800" smtClean="0"/>
-              <a:t> keyword</a:t>
-            </a:r>
-          </a:p>
-          <a:p>
-            <a:pPr lvl="1"/>
-            <a:r>
-              <a:rPr lang="da-DK" sz="2800" smtClean="0"/>
-              <a:t>Constructor will typically call ”super class” constructor, using the </a:t>
-            </a:r>
-            <a:r>
-              <a:rPr lang="da-DK" sz="2800" b="1" smtClean="0"/>
-              <a:t>super</a:t>
-            </a:r>
-            <a:r>
-              <a:rPr lang="da-DK" sz="2800" smtClean="0"/>
-              <a:t> keyword</a:t>
-            </a:r>
-          </a:p>
-          <a:p>
-            <a:pPr lvl="1"/>
-            <a:r>
-              <a:rPr lang="da-DK" sz="2800" smtClean="0"/>
-              <a:t>Prototype references are automatically set up</a:t>
-            </a:r>
-            <a:endParaRPr lang="da-DK" sz="2800"/>
-          </a:p>
-        </p:txBody>
-      </p:sp>
+      <p:pic>
+        <p:nvPicPr>
+          <p:cNvPr id="4" name="Billede 3"/>
+          <p:cNvPicPr>
+            <a:picLocks noChangeAspect="1"/>
+          </p:cNvPicPr>
+          <p:nvPr/>
+        </p:nvPicPr>
+        <p:blipFill>
+          <a:blip r:embed="rId2"/>
+          <a:stretch>
+            <a:fillRect/>
+          </a:stretch>
+        </p:blipFill>
+        <p:spPr>
+          <a:xfrm>
+            <a:off x="2319459" y="1690688"/>
+            <a:ext cx="6918325" cy="4385916"/>
+          </a:xfrm>
+          <a:prstGeom prst="rect">
+            <a:avLst/>
+          </a:prstGeom>
+        </p:spPr>
+      </p:pic>
     </p:spTree>
     <p:extLst>
       <p:ext uri="{BB962C8B-B14F-4D97-AF65-F5344CB8AC3E}">
-        <p14:creationId xmlns:p14="http://schemas.microsoft.com/office/powerpoint/2010/main" val="3605764801"/>
+        <p14:creationId xmlns:p14="http://schemas.microsoft.com/office/powerpoint/2010/main" val="3405495008"/>
       </p:ext>
     </p:extLst>
   </p:cSld>
@@ -7572,34 +8105,77 @@
           </a:p>
         </p:txBody>
       </p:sp>
-      <p:pic>
-        <p:nvPicPr>
-          <p:cNvPr id="3" name="Billede 2"/>
-          <p:cNvPicPr>
-            <a:picLocks noChangeAspect="1"/>
-          </p:cNvPicPr>
-          <p:nvPr/>
-        </p:nvPicPr>
-        <p:blipFill>
-          <a:blip r:embed="rId2"/>
-          <a:stretch>
-            <a:fillRect/>
-          </a:stretch>
-        </p:blipFill>
-        <p:spPr>
-          <a:xfrm>
-            <a:off x="774455" y="2278795"/>
-            <a:ext cx="10450855" cy="2605820"/>
-          </a:xfrm>
-          <a:prstGeom prst="rect">
-            <a:avLst/>
-          </a:prstGeom>
-        </p:spPr>
-      </p:pic>
+      <p:sp>
+        <p:nvSpPr>
+          <p:cNvPr id="3" name="Pladsholder til indhold 2"/>
+          <p:cNvSpPr>
+            <a:spLocks noGrp="1"/>
+          </p:cNvSpPr>
+          <p:nvPr>
+            <p:ph idx="1"/>
+          </p:nvPr>
+        </p:nvSpPr>
+        <p:spPr>
+          <a:xfrm>
+            <a:off x="838200" y="1825624"/>
+            <a:ext cx="9024815" cy="4643137"/>
+          </a:xfrm>
+        </p:spPr>
+        <p:txBody>
+          <a:bodyPr>
+            <a:normAutofit/>
+          </a:bodyPr>
+          <a:lstStyle/>
+          <a:p>
+            <a:r>
+              <a:rPr lang="da-DK" sz="3200" smtClean="0"/>
+              <a:t>ES6 class definition</a:t>
+            </a:r>
+          </a:p>
+          <a:p>
+            <a:pPr lvl="1"/>
+            <a:r>
+              <a:rPr lang="da-DK" sz="2800" smtClean="0"/>
+              <a:t>Inheritance by use of </a:t>
+            </a:r>
+            <a:r>
+              <a:rPr lang="da-DK" sz="2800" b="1" smtClean="0"/>
+              <a:t>extends</a:t>
+            </a:r>
+            <a:r>
+              <a:rPr lang="da-DK" sz="2800" smtClean="0"/>
+              <a:t> keyword</a:t>
+            </a:r>
+          </a:p>
+          <a:p>
+            <a:pPr lvl="1"/>
+            <a:r>
+              <a:rPr lang="da-DK" sz="2800" smtClean="0"/>
+              <a:t>Constructor will typically call ”super class” constructor, using the </a:t>
+            </a:r>
+            <a:r>
+              <a:rPr lang="da-DK" sz="2800" b="1" smtClean="0"/>
+              <a:t>super</a:t>
+            </a:r>
+            <a:r>
+              <a:rPr lang="da-DK" sz="2800" smtClean="0"/>
+              <a:t> keyword</a:t>
+            </a:r>
+          </a:p>
+          <a:p>
+            <a:pPr lvl="1"/>
+            <a:r>
+              <a:rPr lang="da-DK" sz="2800" smtClean="0"/>
+              <a:t>Prototype references are automatically set up</a:t>
+            </a:r>
+            <a:endParaRPr lang="da-DK" sz="2800"/>
+          </a:p>
+        </p:txBody>
+      </p:sp>
     </p:spTree>
     <p:extLst>
       <p:ext uri="{BB962C8B-B14F-4D97-AF65-F5344CB8AC3E}">
-        <p14:creationId xmlns:p14="http://schemas.microsoft.com/office/powerpoint/2010/main" val="2963343779"/>
+        <p14:creationId xmlns:p14="http://schemas.microsoft.com/office/powerpoint/2010/main" val="3605764801"/>
       </p:ext>
     </p:extLst>
   </p:cSld>
@@ -7658,7 +8234,7 @@
       </p:sp>
       <p:pic>
         <p:nvPicPr>
-          <p:cNvPr id="4" name="Billede 3"/>
+          <p:cNvPr id="3" name="Billede 2"/>
           <p:cNvPicPr>
             <a:picLocks noChangeAspect="1"/>
           </p:cNvPicPr>
@@ -7672,8 +8248,8 @@
         </p:blipFill>
         <p:spPr>
           <a:xfrm>
-            <a:off x="1373431" y="2067291"/>
-            <a:ext cx="9300596" cy="3372216"/>
+            <a:off x="774455" y="2278795"/>
+            <a:ext cx="10450855" cy="2605820"/>
           </a:xfrm>
           <a:prstGeom prst="rect">
             <a:avLst/>
@@ -7683,7 +8259,7 @@
     </p:spTree>
     <p:extLst>
       <p:ext uri="{BB962C8B-B14F-4D97-AF65-F5344CB8AC3E}">
-        <p14:creationId xmlns:p14="http://schemas.microsoft.com/office/powerpoint/2010/main" val="2930566762"/>
+        <p14:creationId xmlns:p14="http://schemas.microsoft.com/office/powerpoint/2010/main" val="2963343779"/>
       </p:ext>
     </p:extLst>
   </p:cSld>
@@ -7734,99 +8310,40 @@
           <a:p>
             <a:r>
               <a:rPr lang="da-DK" b="1" smtClean="0"/>
-              <a:t>JS Advanced – Part 3</a:t>
+              <a:t>JS Advanced – Part 2</a:t>
             </a:r>
             <a:endParaRPr lang="da-DK" b="1"/>
           </a:p>
         </p:txBody>
       </p:sp>
-      <p:sp>
-        <p:nvSpPr>
-          <p:cNvPr id="3" name="Pladsholder til indhold 2"/>
-          <p:cNvSpPr>
-            <a:spLocks noGrp="1"/>
-          </p:cNvSpPr>
-          <p:nvPr>
-            <p:ph idx="1"/>
-          </p:nvPr>
-        </p:nvSpPr>
-        <p:spPr>
-          <a:xfrm>
-            <a:off x="838200" y="1825625"/>
-            <a:ext cx="9868930" cy="4351338"/>
-          </a:xfrm>
-        </p:spPr>
-        <p:txBody>
-          <a:bodyPr>
-            <a:normAutofit/>
-          </a:bodyPr>
-          <a:lstStyle/>
-          <a:p>
-            <a:r>
-              <a:rPr lang="da-DK" sz="3200" b="1" smtClean="0"/>
-              <a:t>Array helper/query methods</a:t>
-            </a:r>
-            <a:endParaRPr lang="da-DK" sz="3200" smtClean="0"/>
-          </a:p>
-          <a:p>
-            <a:pPr lvl="1"/>
-            <a:r>
-              <a:rPr lang="da-DK" sz="2800" b="1" smtClean="0"/>
-              <a:t>forEach</a:t>
-            </a:r>
-            <a:endParaRPr lang="da-DK" sz="2800" smtClean="0"/>
-          </a:p>
-          <a:p>
-            <a:pPr lvl="1"/>
-            <a:r>
-              <a:rPr lang="da-DK" sz="2800" b="1" smtClean="0"/>
-              <a:t>map </a:t>
-            </a:r>
-            <a:r>
-              <a:rPr lang="da-DK" sz="2800" smtClean="0"/>
-              <a:t>and </a:t>
-            </a:r>
-            <a:r>
-              <a:rPr lang="da-DK" sz="2800" b="1" smtClean="0"/>
-              <a:t>filter</a:t>
-            </a:r>
-          </a:p>
-          <a:p>
-            <a:pPr lvl="1"/>
-            <a:r>
-              <a:rPr lang="da-DK" sz="2800" b="1" smtClean="0"/>
-              <a:t>reduce</a:t>
-            </a:r>
-          </a:p>
-          <a:p>
-            <a:pPr lvl="1"/>
-            <a:r>
-              <a:rPr lang="da-DK" sz="2800" b="1" smtClean="0"/>
-              <a:t>find</a:t>
-            </a:r>
-            <a:r>
-              <a:rPr lang="da-DK" sz="2800" smtClean="0"/>
-              <a:t>, </a:t>
-            </a:r>
-            <a:r>
-              <a:rPr lang="da-DK" sz="2800" b="1" smtClean="0"/>
-              <a:t>some</a:t>
-            </a:r>
-            <a:r>
-              <a:rPr lang="da-DK" sz="2800" smtClean="0"/>
-              <a:t> and </a:t>
-            </a:r>
-            <a:r>
-              <a:rPr lang="da-DK" sz="2800" b="1" smtClean="0"/>
-              <a:t>every</a:t>
-            </a:r>
-          </a:p>
-        </p:txBody>
-      </p:sp>
+      <p:pic>
+        <p:nvPicPr>
+          <p:cNvPr id="4" name="Billede 3"/>
+          <p:cNvPicPr>
+            <a:picLocks noChangeAspect="1"/>
+          </p:cNvPicPr>
+          <p:nvPr/>
+        </p:nvPicPr>
+        <p:blipFill>
+          <a:blip r:embed="rId2"/>
+          <a:stretch>
+            <a:fillRect/>
+          </a:stretch>
+        </p:blipFill>
+        <p:spPr>
+          <a:xfrm>
+            <a:off x="1373431" y="2067291"/>
+            <a:ext cx="9300596" cy="3372216"/>
+          </a:xfrm>
+          <a:prstGeom prst="rect">
+            <a:avLst/>
+          </a:prstGeom>
+        </p:spPr>
+      </p:pic>
     </p:spTree>
     <p:extLst>
       <p:ext uri="{BB962C8B-B14F-4D97-AF65-F5344CB8AC3E}">
-        <p14:creationId xmlns:p14="http://schemas.microsoft.com/office/powerpoint/2010/main" val="1746028050"/>
+        <p14:creationId xmlns:p14="http://schemas.microsoft.com/office/powerpoint/2010/main" val="2930566762"/>
       </p:ext>
     </p:extLst>
   </p:cSld>
@@ -7896,7 +8413,7 @@
         <p:spPr>
           <a:xfrm>
             <a:off x="838200" y="1825625"/>
-            <a:ext cx="7578969" cy="4351338"/>
+            <a:ext cx="9868930" cy="4351338"/>
           </a:xfrm>
         </p:spPr>
         <p:txBody>
@@ -7906,85 +8423,62 @@
           <a:lstStyle/>
           <a:p>
             <a:r>
-              <a:rPr lang="da-DK" sz="3200" smtClean="0"/>
-              <a:t>The </a:t>
-            </a:r>
-            <a:r>
               <a:rPr lang="da-DK" sz="3200" b="1" smtClean="0"/>
-              <a:t>forEach </a:t>
-            </a:r>
-            <a:r>
-              <a:rPr lang="da-DK" sz="3200" smtClean="0"/>
-              <a:t>method</a:t>
-            </a:r>
+              <a:t>Array helper/query methods</a:t>
+            </a:r>
+            <a:endParaRPr lang="da-DK" sz="3200" smtClean="0"/>
           </a:p>
           <a:p>
             <a:pPr lvl="1"/>
             <a:r>
+              <a:rPr lang="da-DK" sz="2800" b="1" smtClean="0"/>
+              <a:t>forEach</a:t>
+            </a:r>
+            <a:endParaRPr lang="da-DK" sz="2800" smtClean="0"/>
+          </a:p>
+          <a:p>
+            <a:pPr lvl="1"/>
+            <a:r>
+              <a:rPr lang="da-DK" sz="2800" b="1" smtClean="0"/>
+              <a:t>map </a:t>
+            </a:r>
+            <a:r>
               <a:rPr lang="da-DK" sz="2800" smtClean="0"/>
-              <a:t>Is applied to an array</a:t>
+              <a:t>and </a:t>
+            </a:r>
+            <a:r>
+              <a:rPr lang="da-DK" sz="2800" b="1" smtClean="0"/>
+              <a:t>filter</a:t>
             </a:r>
           </a:p>
           <a:p>
             <a:pPr lvl="1"/>
             <a:r>
+              <a:rPr lang="da-DK" sz="2800" b="1" smtClean="0"/>
+              <a:t>reduce</a:t>
+            </a:r>
+          </a:p>
+          <a:p>
+            <a:pPr lvl="1"/>
+            <a:r>
+              <a:rPr lang="da-DK" sz="2800" b="1" smtClean="0"/>
+              <a:t>find</a:t>
+            </a:r>
+            <a:r>
               <a:rPr lang="da-DK" sz="2800" smtClean="0"/>
-              <a:t>General syntax: </a:t>
-            </a:r>
-            <a:r>
-              <a:rPr lang="da-DK" sz="2800" i="1" smtClean="0"/>
-              <a:t>myArray.forEach(callBack)</a:t>
-            </a:r>
-          </a:p>
-          <a:p>
-            <a:pPr lvl="1"/>
-            <a:r>
-              <a:rPr lang="da-DK" sz="2800" i="1" smtClean="0"/>
-              <a:t>callBack: </a:t>
+              <a:t>, </a:t>
+            </a:r>
+            <a:r>
+              <a:rPr lang="da-DK" sz="2800" b="1" smtClean="0"/>
+              <a:t>some</a:t>
             </a:r>
             <a:r>
               <a:rPr lang="da-DK" sz="2800" smtClean="0"/>
-              <a:t>A function which is called for each element in the array</a:t>
-            </a:r>
-          </a:p>
-          <a:p>
-            <a:pPr lvl="1"/>
-            <a:r>
-              <a:rPr lang="da-DK" sz="2800" smtClean="0"/>
-              <a:t>Callback takes three parameters:</a:t>
-            </a:r>
-          </a:p>
-          <a:p>
-            <a:pPr lvl="2"/>
-            <a:r>
-              <a:rPr lang="da-DK" sz="2400" b="1" smtClean="0"/>
-              <a:t>item</a:t>
-            </a:r>
-            <a:r>
-              <a:rPr lang="da-DK" sz="2400" smtClean="0"/>
-              <a:t>: the item currently being processed</a:t>
-            </a:r>
-          </a:p>
-          <a:p>
-            <a:pPr lvl="2"/>
-            <a:r>
-              <a:rPr lang="da-DK" sz="2400" b="1" smtClean="0"/>
-              <a:t>index</a:t>
-            </a:r>
-            <a:r>
-              <a:rPr lang="da-DK" sz="2400" smtClean="0"/>
-              <a:t>: the index of the above item</a:t>
-            </a:r>
-          </a:p>
-          <a:p>
-            <a:pPr lvl="2"/>
-            <a:r>
-              <a:rPr lang="da-DK" sz="2400" b="1" smtClean="0"/>
-              <a:t>array</a:t>
-            </a:r>
-            <a:r>
-              <a:rPr lang="da-DK" sz="2400" smtClean="0"/>
-              <a:t>: the array itself</a:t>
+              <a:t> and </a:t>
+            </a:r>
+            <a:r>
+              <a:rPr lang="da-DK" sz="2800" b="1" smtClean="0"/>
+              <a:t>every</a:t>
             </a:r>
           </a:p>
         </p:txBody>
@@ -7992,7 +8486,7 @@
     </p:spTree>
     <p:extLst>
       <p:ext uri="{BB962C8B-B14F-4D97-AF65-F5344CB8AC3E}">
-        <p14:creationId xmlns:p14="http://schemas.microsoft.com/office/powerpoint/2010/main" val="2045640818"/>
+        <p14:creationId xmlns:p14="http://schemas.microsoft.com/office/powerpoint/2010/main" val="1746028050"/>
       </p:ext>
     </p:extLst>
   </p:cSld>
@@ -8049,34 +8543,116 @@
           </a:p>
         </p:txBody>
       </p:sp>
-      <p:pic>
-        <p:nvPicPr>
-          <p:cNvPr id="3" name="Billede 2"/>
-          <p:cNvPicPr>
-            <a:picLocks noChangeAspect="1"/>
-          </p:cNvPicPr>
-          <p:nvPr/>
-        </p:nvPicPr>
-        <p:blipFill>
-          <a:blip r:embed="rId2"/>
-          <a:stretch>
-            <a:fillRect/>
-          </a:stretch>
-        </p:blipFill>
-        <p:spPr>
-          <a:xfrm>
-            <a:off x="2316892" y="1613498"/>
-            <a:ext cx="6263974" cy="4586503"/>
-          </a:xfrm>
-          <a:prstGeom prst="rect">
-            <a:avLst/>
-          </a:prstGeom>
-        </p:spPr>
-      </p:pic>
+      <p:sp>
+        <p:nvSpPr>
+          <p:cNvPr id="3" name="Pladsholder til indhold 2"/>
+          <p:cNvSpPr>
+            <a:spLocks noGrp="1"/>
+          </p:cNvSpPr>
+          <p:nvPr>
+            <p:ph idx="1"/>
+          </p:nvPr>
+        </p:nvSpPr>
+        <p:spPr>
+          <a:xfrm>
+            <a:off x="838200" y="1825625"/>
+            <a:ext cx="7578969" cy="4351338"/>
+          </a:xfrm>
+        </p:spPr>
+        <p:txBody>
+          <a:bodyPr>
+            <a:normAutofit/>
+          </a:bodyPr>
+          <a:lstStyle/>
+          <a:p>
+            <a:r>
+              <a:rPr lang="da-DK" sz="3200" smtClean="0"/>
+              <a:t>The </a:t>
+            </a:r>
+            <a:r>
+              <a:rPr lang="da-DK" sz="3200" b="1" smtClean="0"/>
+              <a:t>forEach </a:t>
+            </a:r>
+            <a:r>
+              <a:rPr lang="da-DK" sz="3200" smtClean="0"/>
+              <a:t>method</a:t>
+            </a:r>
+          </a:p>
+          <a:p>
+            <a:pPr lvl="1"/>
+            <a:r>
+              <a:rPr lang="da-DK" sz="2800" smtClean="0"/>
+              <a:t>Is applied to an array</a:t>
+            </a:r>
+          </a:p>
+          <a:p>
+            <a:pPr lvl="1"/>
+            <a:r>
+              <a:rPr lang="da-DK" sz="2800" smtClean="0"/>
+              <a:t>General syntax: </a:t>
+            </a:r>
+            <a:r>
+              <a:rPr lang="da-DK" sz="2800" i="1" smtClean="0"/>
+              <a:t>myArray.forEach(callBack)</a:t>
+            </a:r>
+          </a:p>
+          <a:p>
+            <a:pPr lvl="1"/>
+            <a:r>
+              <a:rPr lang="da-DK" sz="2800" i="1" smtClean="0"/>
+              <a:t>callBack: </a:t>
+            </a:r>
+            <a:r>
+              <a:rPr lang="da-DK" sz="2800" smtClean="0"/>
+              <a:t>A function which is called for each element in the array</a:t>
+            </a:r>
+          </a:p>
+          <a:p>
+            <a:pPr lvl="1"/>
+            <a:r>
+              <a:rPr lang="da-DK" sz="2800" smtClean="0"/>
+              <a:t>Callback takes three parameters:</a:t>
+            </a:r>
+          </a:p>
+          <a:p>
+            <a:pPr lvl="2"/>
+            <a:r>
+              <a:rPr lang="da-DK" sz="2400" i="1" smtClean="0"/>
+              <a:t>item</a:t>
+            </a:r>
+            <a:r>
+              <a:rPr lang="da-DK" sz="2400" smtClean="0"/>
+              <a:t>: the item currently being processed</a:t>
+            </a:r>
+          </a:p>
+          <a:p>
+            <a:pPr lvl="2"/>
+            <a:r>
+              <a:rPr lang="da-DK" sz="2400" i="1" smtClean="0"/>
+              <a:t>index</a:t>
+            </a:r>
+            <a:r>
+              <a:rPr lang="da-DK" sz="2400" smtClean="0"/>
+              <a:t>: the index of the above item</a:t>
+            </a:r>
+          </a:p>
+          <a:p>
+            <a:pPr lvl="2"/>
+            <a:r>
+              <a:rPr lang="da-DK" sz="2400" i="1" smtClean="0"/>
+              <a:t>array</a:t>
+            </a:r>
+            <a:r>
+              <a:rPr lang="da-DK" sz="2400" smtClean="0"/>
+              <a:t>: the array itself</a:t>
+            </a:r>
+          </a:p>
+        </p:txBody>
+      </p:sp>
     </p:spTree>
     <p:extLst>
       <p:ext uri="{BB962C8B-B14F-4D97-AF65-F5344CB8AC3E}">
-        <p14:creationId xmlns:p14="http://schemas.microsoft.com/office/powerpoint/2010/main" val="2238698190"/>
+        <p14:creationId xmlns:p14="http://schemas.microsoft.com/office/powerpoint/2010/main" val="2045640818"/>
       </p:ext>
     </p:extLst>
   </p:cSld>
@@ -8133,104 +8709,34 @@
           </a:p>
         </p:txBody>
       </p:sp>
-      <p:sp>
-        <p:nvSpPr>
-          <p:cNvPr id="3" name="Pladsholder til indhold 2"/>
-          <p:cNvSpPr>
-            <a:spLocks noGrp="1"/>
-          </p:cNvSpPr>
-          <p:nvPr>
-            <p:ph idx="1"/>
-          </p:nvPr>
-        </p:nvSpPr>
-        <p:spPr>
-          <a:xfrm>
-            <a:off x="838200" y="1825625"/>
-            <a:ext cx="9312876" cy="4351338"/>
-          </a:xfrm>
-        </p:spPr>
-        <p:txBody>
-          <a:bodyPr>
-            <a:normAutofit/>
-          </a:bodyPr>
-          <a:lstStyle/>
-          <a:p>
-            <a:r>
-              <a:rPr lang="da-DK" sz="3200" smtClean="0"/>
-              <a:t>The </a:t>
-            </a:r>
-            <a:r>
-              <a:rPr lang="da-DK" sz="3200" b="1" smtClean="0"/>
-              <a:t>map </a:t>
-            </a:r>
-            <a:r>
-              <a:rPr lang="da-DK" sz="3200" smtClean="0"/>
-              <a:t>method</a:t>
-            </a:r>
-          </a:p>
-          <a:p>
-            <a:pPr lvl="1"/>
-            <a:r>
-              <a:rPr lang="da-DK" sz="2800" smtClean="0"/>
-              <a:t>General syntax: </a:t>
-            </a:r>
-            <a:r>
-              <a:rPr lang="da-DK" sz="2800" i="1" smtClean="0"/>
-              <a:t>myArray.map(callBack)</a:t>
-            </a:r>
-          </a:p>
-          <a:p>
-            <a:pPr lvl="1"/>
-            <a:r>
-              <a:rPr lang="da-DK" sz="2800" i="1" smtClean="0"/>
-              <a:t>callBack: </a:t>
-            </a:r>
-            <a:r>
-              <a:rPr lang="da-DK" sz="2800" smtClean="0"/>
-              <a:t>A function which is called for each element in the array, taking the element itself as a parameter</a:t>
-            </a:r>
-          </a:p>
-          <a:p>
-            <a:pPr lvl="1"/>
-            <a:r>
-              <a:rPr lang="da-DK" sz="2800" b="1" smtClean="0"/>
-              <a:t>NB</a:t>
-            </a:r>
-            <a:r>
-              <a:rPr lang="da-DK" sz="2800" smtClean="0"/>
-              <a:t>: The result of invoking </a:t>
-            </a:r>
-            <a:r>
-              <a:rPr lang="da-DK" sz="2800" b="1" smtClean="0"/>
-              <a:t>map</a:t>
-            </a:r>
-            <a:r>
-              <a:rPr lang="da-DK" sz="2800" smtClean="0"/>
-              <a:t> will be a </a:t>
-            </a:r>
-            <a:r>
-              <a:rPr lang="da-DK" sz="2800" u="sng" smtClean="0"/>
-              <a:t>new</a:t>
-            </a:r>
-            <a:r>
-              <a:rPr lang="da-DK" sz="2800" smtClean="0"/>
-              <a:t> array, with the same number of elements as the original array.</a:t>
-            </a:r>
-          </a:p>
-          <a:p>
-            <a:pPr lvl="1"/>
-            <a:r>
-              <a:rPr lang="da-DK" sz="2800" smtClean="0"/>
-              <a:t>Callback is often an anonymous function (=&gt;)</a:t>
-            </a:r>
-            <a:endParaRPr lang="da-DK" sz="2400" smtClean="0"/>
-          </a:p>
-        </p:txBody>
-      </p:sp>
+      <p:pic>
+        <p:nvPicPr>
+          <p:cNvPr id="3" name="Billede 2"/>
+          <p:cNvPicPr>
+            <a:picLocks noChangeAspect="1"/>
+          </p:cNvPicPr>
+          <p:nvPr/>
+        </p:nvPicPr>
+        <p:blipFill>
+          <a:blip r:embed="rId2"/>
+          <a:stretch>
+            <a:fillRect/>
+          </a:stretch>
+        </p:blipFill>
+        <p:spPr>
+          <a:xfrm>
+            <a:off x="2316892" y="1613498"/>
+            <a:ext cx="6263974" cy="4586503"/>
+          </a:xfrm>
+          <a:prstGeom prst="rect">
+            <a:avLst/>
+          </a:prstGeom>
+        </p:spPr>
+      </p:pic>
     </p:spTree>
     <p:extLst>
       <p:ext uri="{BB962C8B-B14F-4D97-AF65-F5344CB8AC3E}">
-        <p14:creationId xmlns:p14="http://schemas.microsoft.com/office/powerpoint/2010/main" val="2796312166"/>
+        <p14:creationId xmlns:p14="http://schemas.microsoft.com/office/powerpoint/2010/main" val="2238698190"/>
       </p:ext>
     </p:extLst>
   </p:cSld>
@@ -8287,34 +8793,104 @@
           </a:p>
         </p:txBody>
       </p:sp>
-      <p:pic>
-        <p:nvPicPr>
-          <p:cNvPr id="4" name="Billede 3"/>
-          <p:cNvPicPr>
-            <a:picLocks noChangeAspect="1"/>
-          </p:cNvPicPr>
-          <p:nvPr/>
-        </p:nvPicPr>
-        <p:blipFill>
-          <a:blip r:embed="rId2"/>
-          <a:stretch>
-            <a:fillRect/>
-          </a:stretch>
-        </p:blipFill>
-        <p:spPr>
-          <a:xfrm>
-            <a:off x="2299257" y="1930999"/>
-            <a:ext cx="7316712" cy="3703681"/>
-          </a:xfrm>
-          <a:prstGeom prst="rect">
-            <a:avLst/>
-          </a:prstGeom>
-        </p:spPr>
-      </p:pic>
+      <p:sp>
+        <p:nvSpPr>
+          <p:cNvPr id="3" name="Pladsholder til indhold 2"/>
+          <p:cNvSpPr>
+            <a:spLocks noGrp="1"/>
+          </p:cNvSpPr>
+          <p:nvPr>
+            <p:ph idx="1"/>
+          </p:nvPr>
+        </p:nvSpPr>
+        <p:spPr>
+          <a:xfrm>
+            <a:off x="838200" y="1825625"/>
+            <a:ext cx="9312876" cy="4351338"/>
+          </a:xfrm>
+        </p:spPr>
+        <p:txBody>
+          <a:bodyPr>
+            <a:normAutofit/>
+          </a:bodyPr>
+          <a:lstStyle/>
+          <a:p>
+            <a:r>
+              <a:rPr lang="da-DK" sz="3200" smtClean="0"/>
+              <a:t>The </a:t>
+            </a:r>
+            <a:r>
+              <a:rPr lang="da-DK" sz="3200" b="1" smtClean="0"/>
+              <a:t>map </a:t>
+            </a:r>
+            <a:r>
+              <a:rPr lang="da-DK" sz="3200" smtClean="0"/>
+              <a:t>method</a:t>
+            </a:r>
+          </a:p>
+          <a:p>
+            <a:pPr lvl="1"/>
+            <a:r>
+              <a:rPr lang="da-DK" sz="2800" smtClean="0"/>
+              <a:t>General syntax: </a:t>
+            </a:r>
+            <a:r>
+              <a:rPr lang="da-DK" sz="2800" i="1" smtClean="0"/>
+              <a:t>myArray.map(callBack)</a:t>
+            </a:r>
+          </a:p>
+          <a:p>
+            <a:pPr lvl="1"/>
+            <a:r>
+              <a:rPr lang="da-DK" sz="2800" i="1" smtClean="0"/>
+              <a:t>callBack: </a:t>
+            </a:r>
+            <a:r>
+              <a:rPr lang="da-DK" sz="2800" smtClean="0"/>
+              <a:t>A function which is called for each element in the array, taking the element itself as a parameter</a:t>
+            </a:r>
+          </a:p>
+          <a:p>
+            <a:pPr lvl="1"/>
+            <a:r>
+              <a:rPr lang="da-DK" sz="2800" b="1" smtClean="0"/>
+              <a:t>NB</a:t>
+            </a:r>
+            <a:r>
+              <a:rPr lang="da-DK" sz="2800" smtClean="0"/>
+              <a:t>: The result of invoking </a:t>
+            </a:r>
+            <a:r>
+              <a:rPr lang="da-DK" sz="2800" b="1" smtClean="0"/>
+              <a:t>map</a:t>
+            </a:r>
+            <a:r>
+              <a:rPr lang="da-DK" sz="2800" smtClean="0"/>
+              <a:t> will be a </a:t>
+            </a:r>
+            <a:r>
+              <a:rPr lang="da-DK" sz="2800" u="sng" smtClean="0"/>
+              <a:t>new</a:t>
+            </a:r>
+            <a:r>
+              <a:rPr lang="da-DK" sz="2800" smtClean="0"/>
+              <a:t> array, with the same number of elements as the original array.</a:t>
+            </a:r>
+          </a:p>
+          <a:p>
+            <a:pPr lvl="1"/>
+            <a:r>
+              <a:rPr lang="da-DK" sz="2800" smtClean="0"/>
+              <a:t>Callback is often an anonymous function (=&gt;)</a:t>
+            </a:r>
+            <a:endParaRPr lang="da-DK" sz="2400" smtClean="0"/>
+          </a:p>
+        </p:txBody>
+      </p:sp>
     </p:spTree>
     <p:extLst>
       <p:ext uri="{BB962C8B-B14F-4D97-AF65-F5344CB8AC3E}">
-        <p14:creationId xmlns:p14="http://schemas.microsoft.com/office/powerpoint/2010/main" val="3604013836"/>
+        <p14:creationId xmlns:p14="http://schemas.microsoft.com/office/powerpoint/2010/main" val="2796312166"/>
       </p:ext>
     </p:extLst>
   </p:cSld>
@@ -8373,7 +8949,7 @@
       </p:sp>
       <p:pic>
         <p:nvPicPr>
-          <p:cNvPr id="3" name="Billede 2"/>
+          <p:cNvPr id="4" name="Billede 3"/>
           <p:cNvPicPr>
             <a:picLocks noChangeAspect="1"/>
           </p:cNvPicPr>
@@ -8387,8 +8963,8 @@
         </p:blipFill>
         <p:spPr>
           <a:xfrm>
-            <a:off x="1456166" y="1853900"/>
-            <a:ext cx="8929327" cy="3836386"/>
+            <a:off x="2299257" y="1930999"/>
+            <a:ext cx="7316712" cy="3703681"/>
           </a:xfrm>
           <a:prstGeom prst="rect">
             <a:avLst/>
@@ -8398,7 +8974,7 @@
     </p:spTree>
     <p:extLst>
       <p:ext uri="{BB962C8B-B14F-4D97-AF65-F5344CB8AC3E}">
-        <p14:creationId xmlns:p14="http://schemas.microsoft.com/office/powerpoint/2010/main" val="2351645182"/>
+        <p14:creationId xmlns:p14="http://schemas.microsoft.com/office/powerpoint/2010/main" val="3604013836"/>
       </p:ext>
     </p:extLst>
   </p:cSld>
@@ -8455,124 +9031,34 @@
           </a:p>
         </p:txBody>
       </p:sp>
-      <p:sp>
-        <p:nvSpPr>
-          <p:cNvPr id="3" name="Pladsholder til indhold 2"/>
-          <p:cNvSpPr>
-            <a:spLocks noGrp="1"/>
-          </p:cNvSpPr>
-          <p:nvPr>
-            <p:ph idx="1"/>
-          </p:nvPr>
-        </p:nvSpPr>
-        <p:spPr>
-          <a:xfrm>
-            <a:off x="838200" y="1825625"/>
-            <a:ext cx="9312876" cy="4351338"/>
-          </a:xfrm>
-        </p:spPr>
-        <p:txBody>
-          <a:bodyPr>
-            <a:normAutofit/>
-          </a:bodyPr>
-          <a:lstStyle/>
-          <a:p>
-            <a:r>
-              <a:rPr lang="da-DK" sz="3200" smtClean="0"/>
-              <a:t>The </a:t>
-            </a:r>
-            <a:r>
-              <a:rPr lang="da-DK" sz="3200" b="1" smtClean="0"/>
-              <a:t>filter </a:t>
-            </a:r>
-            <a:r>
-              <a:rPr lang="da-DK" sz="3200" smtClean="0"/>
-              <a:t>method</a:t>
-            </a:r>
-          </a:p>
-          <a:p>
-            <a:pPr lvl="1"/>
-            <a:r>
-              <a:rPr lang="da-DK" sz="2800" smtClean="0"/>
-              <a:t>General syntax: </a:t>
-            </a:r>
-            <a:r>
-              <a:rPr lang="da-DK" sz="2800" i="1" smtClean="0"/>
-              <a:t>myArray.filter(callBack)</a:t>
-            </a:r>
-          </a:p>
-          <a:p>
-            <a:pPr lvl="1"/>
-            <a:r>
-              <a:rPr lang="da-DK" sz="2800" i="1" smtClean="0"/>
-              <a:t>callBack: </a:t>
-            </a:r>
-            <a:r>
-              <a:rPr lang="da-DK" sz="2800" smtClean="0"/>
-              <a:t>A function which is called for each element in the array, taking the element itself as a parameter. This callback </a:t>
-            </a:r>
-            <a:r>
-              <a:rPr lang="da-DK" sz="2800" u="sng" smtClean="0"/>
-              <a:t>must</a:t>
-            </a:r>
-            <a:r>
-              <a:rPr lang="da-DK" sz="2800" smtClean="0"/>
-              <a:t> return a </a:t>
-            </a:r>
-            <a:r>
-              <a:rPr lang="da-DK" sz="2800" i="1" smtClean="0"/>
-              <a:t>boolean</a:t>
-            </a:r>
-            <a:r>
-              <a:rPr lang="da-DK" sz="2800" smtClean="0"/>
-              <a:t> value.</a:t>
-            </a:r>
-          </a:p>
-          <a:p>
-            <a:pPr lvl="1"/>
-            <a:r>
-              <a:rPr lang="da-DK" sz="2800" b="1" smtClean="0"/>
-              <a:t>NB</a:t>
-            </a:r>
-            <a:r>
-              <a:rPr lang="da-DK" sz="2800" smtClean="0"/>
-              <a:t>: The result of invoking </a:t>
-            </a:r>
-            <a:r>
-              <a:rPr lang="da-DK" sz="2800" b="1" smtClean="0"/>
-              <a:t>filter</a:t>
-            </a:r>
-            <a:r>
-              <a:rPr lang="da-DK" sz="2800" smtClean="0"/>
-              <a:t> will be a </a:t>
-            </a:r>
-            <a:r>
-              <a:rPr lang="da-DK" sz="2800" u="sng" smtClean="0"/>
-              <a:t>new</a:t>
-            </a:r>
-            <a:r>
-              <a:rPr lang="da-DK" sz="2800" smtClean="0"/>
-              <a:t> array, only including the elements for which the callback returns </a:t>
-            </a:r>
-            <a:r>
-              <a:rPr lang="da-DK" sz="2800" b="1" smtClean="0"/>
-              <a:t>true</a:t>
-            </a:r>
-          </a:p>
-          <a:p>
-            <a:pPr lvl="1"/>
-            <a:r>
-              <a:rPr lang="da-DK" sz="2800" smtClean="0"/>
-              <a:t>Callback is often an anonymous function (=&gt;)</a:t>
-            </a:r>
-            <a:endParaRPr lang="da-DK" sz="2400" smtClean="0"/>
-          </a:p>
-        </p:txBody>
-      </p:sp>
+      <p:pic>
+        <p:nvPicPr>
+          <p:cNvPr id="3" name="Billede 2"/>
+          <p:cNvPicPr>
+            <a:picLocks noChangeAspect="1"/>
+          </p:cNvPicPr>
+          <p:nvPr/>
+        </p:nvPicPr>
+        <p:blipFill>
+          <a:blip r:embed="rId2"/>
+          <a:stretch>
+            <a:fillRect/>
+          </a:stretch>
+        </p:blipFill>
+        <p:spPr>
+          <a:xfrm>
+            <a:off x="1456166" y="1853900"/>
+            <a:ext cx="8929327" cy="3836386"/>
+          </a:xfrm>
+          <a:prstGeom prst="rect">
+            <a:avLst/>
+          </a:prstGeom>
+        </p:spPr>
+      </p:pic>
     </p:spTree>
     <p:extLst>
       <p:ext uri="{BB962C8B-B14F-4D97-AF65-F5344CB8AC3E}">
-        <p14:creationId xmlns:p14="http://schemas.microsoft.com/office/powerpoint/2010/main" val="1413412072"/>
+        <p14:creationId xmlns:p14="http://schemas.microsoft.com/office/powerpoint/2010/main" val="2351645182"/>
       </p:ext>
     </p:extLst>
   </p:cSld>
@@ -8629,34 +9115,124 @@
           </a:p>
         </p:txBody>
       </p:sp>
-      <p:pic>
-        <p:nvPicPr>
-          <p:cNvPr id="4" name="Billede 3"/>
-          <p:cNvPicPr>
-            <a:picLocks noChangeAspect="1"/>
-          </p:cNvPicPr>
-          <p:nvPr/>
-        </p:nvPicPr>
-        <p:blipFill>
-          <a:blip r:embed="rId2"/>
-          <a:stretch>
-            <a:fillRect/>
-          </a:stretch>
-        </p:blipFill>
-        <p:spPr>
-          <a:xfrm>
-            <a:off x="1785550" y="1617858"/>
-            <a:ext cx="7939989" cy="4475568"/>
-          </a:xfrm>
-          <a:prstGeom prst="rect">
-            <a:avLst/>
-          </a:prstGeom>
-        </p:spPr>
-      </p:pic>
+      <p:sp>
+        <p:nvSpPr>
+          <p:cNvPr id="3" name="Pladsholder til indhold 2"/>
+          <p:cNvSpPr>
+            <a:spLocks noGrp="1"/>
+          </p:cNvSpPr>
+          <p:nvPr>
+            <p:ph idx="1"/>
+          </p:nvPr>
+        </p:nvSpPr>
+        <p:spPr>
+          <a:xfrm>
+            <a:off x="838200" y="1825625"/>
+            <a:ext cx="9312876" cy="4351338"/>
+          </a:xfrm>
+        </p:spPr>
+        <p:txBody>
+          <a:bodyPr>
+            <a:normAutofit/>
+          </a:bodyPr>
+          <a:lstStyle/>
+          <a:p>
+            <a:r>
+              <a:rPr lang="da-DK" sz="3200" smtClean="0"/>
+              <a:t>The </a:t>
+            </a:r>
+            <a:r>
+              <a:rPr lang="da-DK" sz="3200" b="1" smtClean="0"/>
+              <a:t>filter </a:t>
+            </a:r>
+            <a:r>
+              <a:rPr lang="da-DK" sz="3200" smtClean="0"/>
+              <a:t>method</a:t>
+            </a:r>
+          </a:p>
+          <a:p>
+            <a:pPr lvl="1"/>
+            <a:r>
+              <a:rPr lang="da-DK" sz="2800" smtClean="0"/>
+              <a:t>General syntax: </a:t>
+            </a:r>
+            <a:r>
+              <a:rPr lang="da-DK" sz="2800" i="1" smtClean="0"/>
+              <a:t>myArray.filter(callBack)</a:t>
+            </a:r>
+          </a:p>
+          <a:p>
+            <a:pPr lvl="1"/>
+            <a:r>
+              <a:rPr lang="da-DK" sz="2800" i="1" smtClean="0"/>
+              <a:t>callBack: </a:t>
+            </a:r>
+            <a:r>
+              <a:rPr lang="da-DK" sz="2800" smtClean="0"/>
+              <a:t>A function which is called for each element in the array, taking the element itself as a parameter. This callback </a:t>
+            </a:r>
+            <a:r>
+              <a:rPr lang="da-DK" sz="2800" u="sng" smtClean="0"/>
+              <a:t>must</a:t>
+            </a:r>
+            <a:r>
+              <a:rPr lang="da-DK" sz="2800" smtClean="0"/>
+              <a:t> return a </a:t>
+            </a:r>
+            <a:r>
+              <a:rPr lang="da-DK" sz="2800" i="1" smtClean="0"/>
+              <a:t>boolean</a:t>
+            </a:r>
+            <a:r>
+              <a:rPr lang="da-DK" sz="2800" smtClean="0"/>
+              <a:t> value.</a:t>
+            </a:r>
+          </a:p>
+          <a:p>
+            <a:pPr lvl="1"/>
+            <a:r>
+              <a:rPr lang="da-DK" sz="2800" b="1" smtClean="0"/>
+              <a:t>NB</a:t>
+            </a:r>
+            <a:r>
+              <a:rPr lang="da-DK" sz="2800" smtClean="0"/>
+              <a:t>: The result of invoking </a:t>
+            </a:r>
+            <a:r>
+              <a:rPr lang="da-DK" sz="2800" b="1" smtClean="0"/>
+              <a:t>filter</a:t>
+            </a:r>
+            <a:r>
+              <a:rPr lang="da-DK" sz="2800" smtClean="0"/>
+              <a:t> will be a </a:t>
+            </a:r>
+            <a:r>
+              <a:rPr lang="da-DK" sz="2800" u="sng" smtClean="0"/>
+              <a:t>new</a:t>
+            </a:r>
+            <a:r>
+              <a:rPr lang="da-DK" sz="2800" smtClean="0"/>
+              <a:t> array, only including the elements for which the callback returns </a:t>
+            </a:r>
+            <a:r>
+              <a:rPr lang="da-DK" sz="2800" b="1" smtClean="0"/>
+              <a:t>true</a:t>
+            </a:r>
+          </a:p>
+          <a:p>
+            <a:pPr lvl="1"/>
+            <a:r>
+              <a:rPr lang="da-DK" sz="2800" smtClean="0"/>
+              <a:t>Callback is often an anonymous function (=&gt;)</a:t>
+            </a:r>
+            <a:endParaRPr lang="da-DK" sz="2400" smtClean="0"/>
+          </a:p>
+        </p:txBody>
+      </p:sp>
     </p:spTree>
     <p:extLst>
       <p:ext uri="{BB962C8B-B14F-4D97-AF65-F5344CB8AC3E}">
-        <p14:creationId xmlns:p14="http://schemas.microsoft.com/office/powerpoint/2010/main" val="1941430636"/>
+        <p14:creationId xmlns:p14="http://schemas.microsoft.com/office/powerpoint/2010/main" val="1413412072"/>
       </p:ext>
     </p:extLst>
   </p:cSld>
@@ -8852,146 +9428,34 @@
           </a:p>
         </p:txBody>
       </p:sp>
-      <p:sp>
-        <p:nvSpPr>
-          <p:cNvPr id="3" name="Pladsholder til indhold 2"/>
-          <p:cNvSpPr>
-            <a:spLocks noGrp="1"/>
-          </p:cNvSpPr>
-          <p:nvPr>
-            <p:ph idx="1"/>
-          </p:nvPr>
-        </p:nvSpPr>
-        <p:spPr>
-          <a:xfrm>
-            <a:off x="838200" y="1825625"/>
-            <a:ext cx="9498227" cy="4351338"/>
-          </a:xfrm>
-        </p:spPr>
-        <p:txBody>
-          <a:bodyPr>
-            <a:normAutofit/>
-          </a:bodyPr>
-          <a:lstStyle/>
-          <a:p>
-            <a:r>
-              <a:rPr lang="da-DK" sz="3200" b="1" smtClean="0"/>
-              <a:t>find</a:t>
-            </a:r>
-            <a:r>
-              <a:rPr lang="da-DK" sz="3200" smtClean="0"/>
-              <a:t>: returns the </a:t>
-            </a:r>
-            <a:r>
-              <a:rPr lang="da-DK" sz="3200" u="sng" smtClean="0"/>
-              <a:t>first</a:t>
-            </a:r>
-            <a:r>
-              <a:rPr lang="da-DK" sz="3200" smtClean="0"/>
-              <a:t> element for which the callback returns </a:t>
-            </a:r>
-            <a:r>
-              <a:rPr lang="da-DK" sz="3200" b="1" smtClean="0"/>
-              <a:t>true </a:t>
-            </a:r>
-            <a:r>
-              <a:rPr lang="da-DK" sz="3200" smtClean="0"/>
-              <a:t>(returns </a:t>
-            </a:r>
-            <a:r>
-              <a:rPr lang="da-DK" sz="3200" b="1" smtClean="0"/>
-              <a:t>undefined</a:t>
-            </a:r>
-            <a:r>
-              <a:rPr lang="da-DK" sz="3200" smtClean="0"/>
-              <a:t> if no element is found)</a:t>
-            </a:r>
-          </a:p>
-          <a:p>
-            <a:r>
-              <a:rPr lang="da-DK" sz="3200" b="1" smtClean="0"/>
-              <a:t>every</a:t>
-            </a:r>
-            <a:r>
-              <a:rPr lang="da-DK" sz="3200" smtClean="0"/>
-              <a:t>: returns </a:t>
-            </a:r>
-            <a:r>
-              <a:rPr lang="da-DK" sz="3200" b="1" smtClean="0"/>
-              <a:t>true</a:t>
-            </a:r>
-            <a:r>
-              <a:rPr lang="da-DK" sz="3200" smtClean="0"/>
-              <a:t> if the callback returns </a:t>
-            </a:r>
-            <a:r>
-              <a:rPr lang="da-DK" sz="3200" b="1" smtClean="0"/>
-              <a:t>true</a:t>
-            </a:r>
-            <a:r>
-              <a:rPr lang="da-DK" sz="3200" smtClean="0"/>
-              <a:t> for </a:t>
-            </a:r>
-            <a:r>
-              <a:rPr lang="da-DK" sz="3200" u="sng" smtClean="0"/>
-              <a:t>all</a:t>
-            </a:r>
-            <a:r>
-              <a:rPr lang="da-DK" sz="3200" smtClean="0"/>
-              <a:t> elements in the array.</a:t>
-            </a:r>
-          </a:p>
-          <a:p>
-            <a:r>
-              <a:rPr lang="da-DK" sz="3200" b="1" smtClean="0"/>
-              <a:t>some</a:t>
-            </a:r>
-            <a:r>
-              <a:rPr lang="da-DK" sz="3200" smtClean="0"/>
-              <a:t>: </a:t>
-            </a:r>
-            <a:r>
-              <a:rPr lang="da-DK" sz="3200"/>
-              <a:t>returns </a:t>
-            </a:r>
-            <a:r>
-              <a:rPr lang="da-DK" sz="3200" b="1"/>
-              <a:t>true</a:t>
-            </a:r>
-            <a:r>
-              <a:rPr lang="da-DK" sz="3200"/>
-              <a:t> if the callback returns </a:t>
-            </a:r>
-            <a:r>
-              <a:rPr lang="da-DK" sz="3200" b="1"/>
-              <a:t>true</a:t>
-            </a:r>
-            <a:r>
-              <a:rPr lang="da-DK" sz="3200"/>
-              <a:t> for </a:t>
-            </a:r>
-            <a:r>
-              <a:rPr lang="da-DK" sz="3200" u="sng" smtClean="0"/>
-              <a:t>at least one</a:t>
-            </a:r>
-            <a:r>
-              <a:rPr lang="da-DK" sz="3200" smtClean="0"/>
-              <a:t> element </a:t>
-            </a:r>
-            <a:r>
-              <a:rPr lang="da-DK" sz="3200"/>
-              <a:t>in the array.</a:t>
-            </a:r>
-          </a:p>
-          <a:p>
-            <a:endParaRPr lang="da-DK" sz="3200" smtClean="0"/>
-          </a:p>
-        </p:txBody>
-      </p:sp>
+      <p:pic>
+        <p:nvPicPr>
+          <p:cNvPr id="4" name="Billede 3"/>
+          <p:cNvPicPr>
+            <a:picLocks noChangeAspect="1"/>
+          </p:cNvPicPr>
+          <p:nvPr/>
+        </p:nvPicPr>
+        <p:blipFill>
+          <a:blip r:embed="rId2"/>
+          <a:stretch>
+            <a:fillRect/>
+          </a:stretch>
+        </p:blipFill>
+        <p:spPr>
+          <a:xfrm>
+            <a:off x="1785550" y="1617858"/>
+            <a:ext cx="7939989" cy="4475568"/>
+          </a:xfrm>
+          <a:prstGeom prst="rect">
+            <a:avLst/>
+          </a:prstGeom>
+        </p:spPr>
+      </p:pic>
     </p:spTree>
     <p:extLst>
       <p:ext uri="{BB962C8B-B14F-4D97-AF65-F5344CB8AC3E}">
-        <p14:creationId xmlns:p14="http://schemas.microsoft.com/office/powerpoint/2010/main" val="2297492747"/>
+        <p14:creationId xmlns:p14="http://schemas.microsoft.com/office/powerpoint/2010/main" val="1941430636"/>
       </p:ext>
     </p:extLst>
   </p:cSld>
@@ -9061,7 +9525,7 @@
         <p:spPr>
           <a:xfrm>
             <a:off x="838200" y="1825625"/>
-            <a:ext cx="9312876" cy="4351338"/>
+            <a:ext cx="9498227" cy="4351338"/>
           </a:xfrm>
         </p:spPr>
         <p:txBody>
@@ -9071,98 +9535,123 @@
           <a:lstStyle/>
           <a:p>
             <a:r>
+              <a:rPr lang="da-DK" sz="3200" b="1" smtClean="0"/>
+              <a:t>find</a:t>
+            </a:r>
+            <a:r>
               <a:rPr lang="da-DK" sz="3200" smtClean="0"/>
-              <a:t>The </a:t>
+              <a:t>: returns the </a:t>
+            </a:r>
+            <a:r>
+              <a:rPr lang="da-DK" sz="3200" u="sng" smtClean="0"/>
+              <a:t>first</a:t>
+            </a:r>
+            <a:r>
+              <a:rPr lang="da-DK" sz="3200" smtClean="0"/>
+              <a:t> element for which the callback returns </a:t>
             </a:r>
             <a:r>
               <a:rPr lang="da-DK" sz="3200" b="1" smtClean="0"/>
-              <a:t>reduce </a:t>
+              <a:t>true </a:t>
             </a:r>
             <a:r>
               <a:rPr lang="da-DK" sz="3200" smtClean="0"/>
-              <a:t>method</a:t>
-            </a:r>
-          </a:p>
-          <a:p>
-            <a:pPr lvl="1"/>
-            <a:r>
-              <a:rPr lang="da-DK" sz="2800" smtClean="0"/>
-              <a:t>General syntax: </a:t>
-            </a:r>
-            <a:r>
-              <a:rPr lang="da-DK" sz="2800" i="1" smtClean="0"/>
-              <a:t>myArray.reduce(reducerFunc, initialValue)</a:t>
-            </a:r>
-          </a:p>
-          <a:p>
-            <a:pPr lvl="1"/>
-            <a:r>
-              <a:rPr lang="da-DK" sz="2800" i="1"/>
-              <a:t>reducerFunc: </a:t>
-            </a:r>
-            <a:r>
-              <a:rPr lang="da-DK" sz="2800" smtClean="0"/>
-              <a:t>A function which is called for each element in the array, taking four parameters:</a:t>
-            </a:r>
-          </a:p>
-          <a:p>
-            <a:pPr lvl="2"/>
-            <a:r>
-              <a:rPr lang="da-DK" sz="2400" i="1" smtClean="0"/>
-              <a:t>accumulator</a:t>
-            </a:r>
-          </a:p>
-          <a:p>
-            <a:pPr lvl="2"/>
-            <a:r>
-              <a:rPr lang="da-DK" sz="2400" i="1" smtClean="0"/>
-              <a:t>currentValue</a:t>
-            </a:r>
-          </a:p>
-          <a:p>
-            <a:pPr lvl="2"/>
-            <a:r>
-              <a:rPr lang="da-DK" sz="2400" i="1" smtClean="0"/>
-              <a:t>currentIndex</a:t>
-            </a:r>
-          </a:p>
-          <a:p>
-            <a:pPr lvl="2"/>
-            <a:r>
-              <a:rPr lang="da-DK" sz="2400" i="1" smtClean="0"/>
-              <a:t>sourceArray</a:t>
-            </a:r>
-          </a:p>
-          <a:p>
-            <a:pPr lvl="1"/>
-            <a:r>
-              <a:rPr lang="da-DK" sz="2800" i="1" smtClean="0"/>
-              <a:t>initialValue</a:t>
-            </a:r>
-            <a:r>
-              <a:rPr lang="da-DK" sz="2800" smtClean="0"/>
-              <a:t>: The initial value to be used by the reducer function, i.e. </a:t>
-            </a:r>
-            <a:r>
-              <a:rPr lang="da-DK" sz="2800" i="1" smtClean="0"/>
-              <a:t>accumulator</a:t>
-            </a:r>
-            <a:r>
-              <a:rPr lang="da-DK" sz="2800" smtClean="0"/>
-              <a:t> is initially set to </a:t>
-            </a:r>
-            <a:r>
-              <a:rPr lang="da-DK" sz="2800" i="1" smtClean="0"/>
-              <a:t>initialValue.</a:t>
-            </a:r>
-            <a:endParaRPr lang="da-DK" sz="2800" smtClean="0"/>
+              <a:t>(returns </a:t>
+            </a:r>
+            <a:r>
+              <a:rPr lang="da-DK" sz="3200" b="1" smtClean="0"/>
+              <a:t>undefined</a:t>
+            </a:r>
+            <a:r>
+              <a:rPr lang="da-DK" sz="3200" smtClean="0"/>
+              <a:t> if no element is found)</a:t>
+            </a:r>
+          </a:p>
+          <a:p>
+            <a:r>
+              <a:rPr lang="da-DK" sz="3200" b="1" smtClean="0"/>
+              <a:t>every</a:t>
+            </a:r>
+            <a:r>
+              <a:rPr lang="da-DK" sz="3200" smtClean="0"/>
+              <a:t>: returns </a:t>
+            </a:r>
+            <a:r>
+              <a:rPr lang="da-DK" sz="3200" b="1" smtClean="0"/>
+              <a:t>true</a:t>
+            </a:r>
+            <a:r>
+              <a:rPr lang="da-DK" sz="3200" smtClean="0"/>
+              <a:t> if the callback returns </a:t>
+            </a:r>
+            <a:r>
+              <a:rPr lang="da-DK" sz="3200" b="1" smtClean="0"/>
+              <a:t>true</a:t>
+            </a:r>
+            <a:r>
+              <a:rPr lang="da-DK" sz="3200" smtClean="0"/>
+              <a:t> for </a:t>
+            </a:r>
+            <a:r>
+              <a:rPr lang="da-DK" sz="3200" u="sng" smtClean="0"/>
+              <a:t>all</a:t>
+            </a:r>
+            <a:r>
+              <a:rPr lang="da-DK" sz="3200" smtClean="0"/>
+              <a:t> elements in the array.</a:t>
+            </a:r>
+          </a:p>
+          <a:p>
+            <a:r>
+              <a:rPr lang="da-DK" sz="3200" b="1" smtClean="0"/>
+              <a:t>some</a:t>
+            </a:r>
+            <a:r>
+              <a:rPr lang="da-DK" sz="3200" smtClean="0"/>
+              <a:t>: </a:t>
+            </a:r>
+            <a:r>
+              <a:rPr lang="da-DK" sz="3200"/>
+              <a:t>returns </a:t>
+            </a:r>
+            <a:r>
+              <a:rPr lang="da-DK" sz="3200" b="1"/>
+              <a:t>true</a:t>
+            </a:r>
+            <a:r>
+              <a:rPr lang="da-DK" sz="3200"/>
+              <a:t> if the callback returns </a:t>
+            </a:r>
+            <a:r>
+              <a:rPr lang="da-DK" sz="3200" b="1"/>
+              <a:t>true</a:t>
+            </a:r>
+            <a:r>
+              <a:rPr lang="da-DK" sz="3200"/>
+              <a:t> for </a:t>
+            </a:r>
+            <a:r>
+              <a:rPr lang="da-DK" sz="3200" u="sng" smtClean="0"/>
+              <a:t>at least one</a:t>
+            </a:r>
+            <a:r>
+              <a:rPr lang="da-DK" sz="3200" smtClean="0"/>
+              <a:t> element </a:t>
+            </a:r>
+            <a:r>
+              <a:rPr lang="da-DK" sz="3200"/>
+              <a:t>in the array.</a:t>
+            </a:r>
+          </a:p>
+          <a:p>
+            <a:endParaRPr lang="da-DK" sz="3200" smtClean="0"/>
           </a:p>
         </p:txBody>
       </p:sp>
     </p:spTree>
     <p:extLst>
       <p:ext uri="{BB962C8B-B14F-4D97-AF65-F5344CB8AC3E}">
-        <p14:creationId xmlns:p14="http://schemas.microsoft.com/office/powerpoint/2010/main" val="4154715550"/>
+        <p14:creationId xmlns:p14="http://schemas.microsoft.com/office/powerpoint/2010/main" val="2297492747"/>
       </p:ext>
     </p:extLst>
   </p:cSld>
@@ -9232,7 +9721,7 @@
         <p:spPr>
           <a:xfrm>
             <a:off x="838200" y="1825625"/>
-            <a:ext cx="8960708" cy="4351338"/>
+            <a:ext cx="9312876" cy="4351338"/>
           </a:xfrm>
         </p:spPr>
         <p:txBody>
@@ -9257,61 +9746,83 @@
           <a:p>
             <a:pPr lvl="1"/>
             <a:r>
+              <a:rPr lang="da-DK" sz="2800" smtClean="0"/>
+              <a:t>General syntax: </a:t>
+            </a:r>
+            <a:r>
+              <a:rPr lang="da-DK" sz="2800" i="1" smtClean="0"/>
+              <a:t>myArray.reduce(reducerFunc, initialValue)</a:t>
+            </a:r>
+          </a:p>
+          <a:p>
+            <a:pPr lvl="1"/>
+            <a:r>
+              <a:rPr lang="da-DK" sz="2800" i="1"/>
+              <a:t>reducerFunc: </a:t>
+            </a:r>
+            <a:r>
+              <a:rPr lang="da-DK" sz="2800" smtClean="0"/>
+              <a:t>A function which is called for each element in the array, taking four parameters:</a:t>
+            </a:r>
+          </a:p>
+          <a:p>
+            <a:pPr lvl="2"/>
+            <a:r>
+              <a:rPr lang="da-DK" sz="2400" i="1" smtClean="0"/>
+              <a:t>accumulator</a:t>
+            </a:r>
+          </a:p>
+          <a:p>
+            <a:pPr lvl="2"/>
+            <a:r>
+              <a:rPr lang="da-DK" sz="2400" i="1" smtClean="0"/>
+              <a:t>currentValue</a:t>
+            </a:r>
+          </a:p>
+          <a:p>
+            <a:pPr lvl="2"/>
+            <a:r>
+              <a:rPr lang="da-DK" sz="2400" i="1" smtClean="0"/>
+              <a:t>currentIndex</a:t>
+            </a:r>
+          </a:p>
+          <a:p>
+            <a:pPr lvl="2"/>
+            <a:r>
+              <a:rPr lang="da-DK" sz="2400" i="1" smtClean="0"/>
+              <a:t>sourceArray</a:t>
+            </a:r>
+          </a:p>
+          <a:p>
+            <a:pPr lvl="1"/>
+            <a:r>
+              <a:rPr lang="da-DK" sz="2800" i="1" smtClean="0"/>
+              <a:t>initialValue</a:t>
+            </a:r>
+            <a:r>
+              <a:rPr lang="da-DK" sz="2800" smtClean="0"/>
+              <a:t>: The initial value to be used by the reducer function, i.e. </a:t>
+            </a:r>
+            <a:r>
               <a:rPr lang="da-DK" sz="2800" i="1" smtClean="0"/>
               <a:t>accumulator</a:t>
             </a:r>
             <a:r>
               <a:rPr lang="da-DK" sz="2800" smtClean="0"/>
-              <a:t>: the ”accumulated value” of applying the function so far (i.e. to the previous elements)</a:t>
-            </a:r>
-          </a:p>
-          <a:p>
-            <a:pPr lvl="1"/>
+              <a:t> is initially set to </a:t>
+            </a:r>
             <a:r>
               <a:rPr lang="da-DK" sz="2800" i="1" smtClean="0"/>
-              <a:t>currentValue</a:t>
-            </a:r>
-            <a:r>
-              <a:rPr lang="da-DK" sz="2800" smtClean="0"/>
-              <a:t>: value for the element being processed right now</a:t>
-            </a:r>
-          </a:p>
-          <a:p>
-            <a:pPr lvl="1"/>
-            <a:r>
-              <a:rPr lang="da-DK" sz="2800" i="1" smtClean="0"/>
-              <a:t>currentIndex</a:t>
-            </a:r>
-            <a:r>
-              <a:rPr lang="da-DK" sz="2800" smtClean="0"/>
-              <a:t>: index for the above element</a:t>
-            </a:r>
-          </a:p>
-          <a:p>
-            <a:pPr lvl="1"/>
-            <a:r>
-              <a:rPr lang="da-DK" sz="2800" i="1" smtClean="0"/>
-              <a:t>sourceArray</a:t>
-            </a:r>
-            <a:r>
-              <a:rPr lang="da-DK" sz="2800" smtClean="0"/>
-              <a:t>: reference to the array which we are invoking </a:t>
-            </a:r>
-            <a:r>
-              <a:rPr lang="da-DK" sz="2800" b="1" smtClean="0"/>
-              <a:t>reduce</a:t>
-            </a:r>
-            <a:r>
-              <a:rPr lang="da-DK" sz="2800" smtClean="0"/>
-              <a:t> on. </a:t>
-            </a:r>
+              <a:t>initialValue.</a:t>
+            </a:r>
+            <a:endParaRPr lang="da-DK" sz="2800" smtClean="0"/>
           </a:p>
         </p:txBody>
       </p:sp>
     </p:spTree>
     <p:extLst>
       <p:ext uri="{BB962C8B-B14F-4D97-AF65-F5344CB8AC3E}">
-        <p14:creationId xmlns:p14="http://schemas.microsoft.com/office/powerpoint/2010/main" val="201764373"/>
+        <p14:creationId xmlns:p14="http://schemas.microsoft.com/office/powerpoint/2010/main" val="4154715550"/>
       </p:ext>
     </p:extLst>
   </p:cSld>
@@ -9368,34 +9879,99 @@
           </a:p>
         </p:txBody>
       </p:sp>
-      <p:pic>
-        <p:nvPicPr>
-          <p:cNvPr id="3" name="Billede 2"/>
-          <p:cNvPicPr>
-            <a:picLocks noChangeAspect="1"/>
-          </p:cNvPicPr>
-          <p:nvPr/>
-        </p:nvPicPr>
-        <p:blipFill>
-          <a:blip r:embed="rId2"/>
-          <a:stretch>
-            <a:fillRect/>
-          </a:stretch>
-        </p:blipFill>
-        <p:spPr>
-          <a:xfrm>
-            <a:off x="1549228" y="1878998"/>
-            <a:ext cx="8867880" cy="3551795"/>
-          </a:xfrm>
-          <a:prstGeom prst="rect">
-            <a:avLst/>
-          </a:prstGeom>
-        </p:spPr>
-      </p:pic>
+      <p:sp>
+        <p:nvSpPr>
+          <p:cNvPr id="3" name="Pladsholder til indhold 2"/>
+          <p:cNvSpPr>
+            <a:spLocks noGrp="1"/>
+          </p:cNvSpPr>
+          <p:nvPr>
+            <p:ph idx="1"/>
+          </p:nvPr>
+        </p:nvSpPr>
+        <p:spPr>
+          <a:xfrm>
+            <a:off x="838200" y="1825625"/>
+            <a:ext cx="8960708" cy="4351338"/>
+          </a:xfrm>
+        </p:spPr>
+        <p:txBody>
+          <a:bodyPr>
+            <a:normAutofit/>
+          </a:bodyPr>
+          <a:lstStyle/>
+          <a:p>
+            <a:r>
+              <a:rPr lang="da-DK" sz="3200" smtClean="0"/>
+              <a:t>The </a:t>
+            </a:r>
+            <a:r>
+              <a:rPr lang="da-DK" sz="3200" b="1" smtClean="0"/>
+              <a:t>reduce </a:t>
+            </a:r>
+            <a:r>
+              <a:rPr lang="da-DK" sz="3200" smtClean="0"/>
+              <a:t>method</a:t>
+            </a:r>
+          </a:p>
+          <a:p>
+            <a:pPr lvl="1"/>
+            <a:r>
+              <a:rPr lang="da-DK" sz="2800" i="1" smtClean="0"/>
+              <a:t>accumulator</a:t>
+            </a:r>
+            <a:r>
+              <a:rPr lang="da-DK" sz="2800" smtClean="0"/>
+              <a:t>: the ”accumulated value” of applying the function so far (i.e. to the previous elements)</a:t>
+            </a:r>
+          </a:p>
+          <a:p>
+            <a:pPr lvl="1"/>
+            <a:r>
+              <a:rPr lang="da-DK" sz="2800" i="1" smtClean="0"/>
+              <a:t>currentValue</a:t>
+            </a:r>
+            <a:r>
+              <a:rPr lang="da-DK" sz="2800" smtClean="0"/>
+              <a:t>: value for the element being processed right now</a:t>
+            </a:r>
+          </a:p>
+          <a:p>
+            <a:pPr lvl="1"/>
+            <a:r>
+              <a:rPr lang="da-DK" sz="2800" i="1" smtClean="0"/>
+              <a:t>currentIndex</a:t>
+            </a:r>
+            <a:r>
+              <a:rPr lang="da-DK" sz="2800" smtClean="0"/>
+              <a:t>: index for the above element</a:t>
+            </a:r>
+          </a:p>
+          <a:p>
+            <a:pPr lvl="1"/>
+            <a:r>
+              <a:rPr lang="da-DK" sz="2800" i="1" smtClean="0"/>
+              <a:t>sourceArray</a:t>
+            </a:r>
+            <a:r>
+              <a:rPr lang="da-DK" sz="2800" smtClean="0"/>
+              <a:t>: reference to the array which we are invoking </a:t>
+            </a:r>
+            <a:r>
+              <a:rPr lang="da-DK" sz="2800" b="1" smtClean="0"/>
+              <a:t>reduce</a:t>
+            </a:r>
+            <a:r>
+              <a:rPr lang="da-DK" sz="2800" smtClean="0"/>
+              <a:t> on. </a:t>
+            </a:r>
+          </a:p>
+        </p:txBody>
+      </p:sp>
     </p:spTree>
     <p:extLst>
       <p:ext uri="{BB962C8B-B14F-4D97-AF65-F5344CB8AC3E}">
-        <p14:creationId xmlns:p14="http://schemas.microsoft.com/office/powerpoint/2010/main" val="1062084076"/>
+        <p14:creationId xmlns:p14="http://schemas.microsoft.com/office/powerpoint/2010/main" val="201764373"/>
       </p:ext>
     </p:extLst>
   </p:cSld>
@@ -9454,7 +10030,7 @@
       </p:sp>
       <p:pic>
         <p:nvPicPr>
-          <p:cNvPr id="4" name="Billede 3"/>
+          <p:cNvPr id="3" name="Billede 2"/>
           <p:cNvPicPr>
             <a:picLocks noChangeAspect="1"/>
           </p:cNvPicPr>
@@ -9468,8 +10044,8 @@
         </p:blipFill>
         <p:spPr>
           <a:xfrm>
-            <a:off x="1395540" y="2619504"/>
-            <a:ext cx="9645491" cy="1266697"/>
+            <a:off x="1549228" y="1878998"/>
+            <a:ext cx="8867880" cy="3551795"/>
           </a:xfrm>
           <a:prstGeom prst="rect">
             <a:avLst/>
@@ -9479,7 +10055,7 @@
     </p:spTree>
     <p:extLst>
       <p:ext uri="{BB962C8B-B14F-4D97-AF65-F5344CB8AC3E}">
-        <p14:creationId xmlns:p14="http://schemas.microsoft.com/office/powerpoint/2010/main" val="1619468774"/>
+        <p14:creationId xmlns:p14="http://schemas.microsoft.com/office/powerpoint/2010/main" val="1062084076"/>
       </p:ext>
     </p:extLst>
   </p:cSld>
@@ -9538,7 +10114,7 @@
       </p:sp>
       <p:pic>
         <p:nvPicPr>
-          <p:cNvPr id="3" name="Billede 2"/>
+          <p:cNvPr id="4" name="Billede 3"/>
           <p:cNvPicPr>
             <a:picLocks noChangeAspect="1"/>
           </p:cNvPicPr>
@@ -9552,32 +10128,8 @@
         </p:blipFill>
         <p:spPr>
           <a:xfrm>
-            <a:off x="838200" y="2050320"/>
-            <a:ext cx="4716162" cy="3273673"/>
-          </a:xfrm>
-          <a:prstGeom prst="rect">
-            <a:avLst/>
-          </a:prstGeom>
-        </p:spPr>
-      </p:pic>
-      <p:pic>
-        <p:nvPicPr>
-          <p:cNvPr id="5" name="Billede 4"/>
-          <p:cNvPicPr>
-            <a:picLocks noChangeAspect="1"/>
-          </p:cNvPicPr>
-          <p:nvPr/>
-        </p:nvPicPr>
-        <p:blipFill>
-          <a:blip r:embed="rId3"/>
-          <a:stretch>
-            <a:fillRect/>
-          </a:stretch>
-        </p:blipFill>
-        <p:spPr>
-          <a:xfrm>
-            <a:off x="6259212" y="2050320"/>
-            <a:ext cx="4888175" cy="2688496"/>
+            <a:off x="1395540" y="2619504"/>
+            <a:ext cx="9645491" cy="1266697"/>
           </a:xfrm>
           <a:prstGeom prst="rect">
             <a:avLst/>
@@ -9587,7 +10139,7 @@
     </p:spTree>
     <p:extLst>
       <p:ext uri="{BB962C8B-B14F-4D97-AF65-F5344CB8AC3E}">
-        <p14:creationId xmlns:p14="http://schemas.microsoft.com/office/powerpoint/2010/main" val="2822582870"/>
+        <p14:creationId xmlns:p14="http://schemas.microsoft.com/office/powerpoint/2010/main" val="1619468774"/>
       </p:ext>
     </p:extLst>
   </p:cSld>
@@ -9637,6 +10189,114 @@
           <a:lstStyle/>
           <a:p>
             <a:r>
+              <a:rPr lang="da-DK" b="1" smtClean="0"/>
+              <a:t>JS Advanced – Part 3</a:t>
+            </a:r>
+            <a:endParaRPr lang="da-DK" b="1"/>
+          </a:p>
+        </p:txBody>
+      </p:sp>
+      <p:pic>
+        <p:nvPicPr>
+          <p:cNvPr id="3" name="Billede 2"/>
+          <p:cNvPicPr>
+            <a:picLocks noChangeAspect="1"/>
+          </p:cNvPicPr>
+          <p:nvPr/>
+        </p:nvPicPr>
+        <p:blipFill>
+          <a:blip r:embed="rId2"/>
+          <a:stretch>
+            <a:fillRect/>
+          </a:stretch>
+        </p:blipFill>
+        <p:spPr>
+          <a:xfrm>
+            <a:off x="838200" y="2050320"/>
+            <a:ext cx="4716162" cy="3273673"/>
+          </a:xfrm>
+          <a:prstGeom prst="rect">
+            <a:avLst/>
+          </a:prstGeom>
+        </p:spPr>
+      </p:pic>
+      <p:pic>
+        <p:nvPicPr>
+          <p:cNvPr id="5" name="Billede 4"/>
+          <p:cNvPicPr>
+            <a:picLocks noChangeAspect="1"/>
+          </p:cNvPicPr>
+          <p:nvPr/>
+        </p:nvPicPr>
+        <p:blipFill>
+          <a:blip r:embed="rId3"/>
+          <a:stretch>
+            <a:fillRect/>
+          </a:stretch>
+        </p:blipFill>
+        <p:spPr>
+          <a:xfrm>
+            <a:off x="6259212" y="2050320"/>
+            <a:ext cx="4888175" cy="2688496"/>
+          </a:xfrm>
+          <a:prstGeom prst="rect">
+            <a:avLst/>
+          </a:prstGeom>
+        </p:spPr>
+      </p:pic>
+    </p:spTree>
+    <p:extLst>
+      <p:ext uri="{BB962C8B-B14F-4D97-AF65-F5344CB8AC3E}">
+        <p14:creationId xmlns:p14="http://schemas.microsoft.com/office/powerpoint/2010/main" val="2822582870"/>
+      </p:ext>
+    </p:extLst>
+  </p:cSld>
+  <p:clrMapOvr>
+    <a:masterClrMapping/>
+  </p:clrMapOvr>
+  <p:timing>
+    <p:tnLst>
+      <p:par>
+        <p:cTn id="1" dur="indefinite" restart="never" nodeType="tmRoot"/>
+      </p:par>
+    </p:tnLst>
+  </p:timing>
+</p:sld>
+</file>
+
+<file path=ppt/slides/slide47.xml><?xml version="1.0" encoding="utf-8"?>
+<p:sld xmlns:a="http://schemas.openxmlformats.org/drawingml/2006/main" xmlns:r="http://schemas.openxmlformats.org/officeDocument/2006/relationships" xmlns:p="http://schemas.openxmlformats.org/presentationml/2006/main">
+  <p:cSld>
+    <p:spTree>
+      <p:nvGrpSpPr>
+        <p:cNvPr id="1" name=""/>
+        <p:cNvGrpSpPr/>
+        <p:nvPr/>
+      </p:nvGrpSpPr>
+      <p:grpSpPr>
+        <a:xfrm>
+          <a:off x="0" y="0"/>
+          <a:ext cx="0" cy="0"/>
+          <a:chOff x="0" y="0"/>
+          <a:chExt cx="0" cy="0"/>
+        </a:xfrm>
+      </p:grpSpPr>
+      <p:sp>
+        <p:nvSpPr>
+          <p:cNvPr id="2" name="Titel 1"/>
+          <p:cNvSpPr>
+            <a:spLocks noGrp="1"/>
+          </p:cNvSpPr>
+          <p:nvPr>
+            <p:ph type="title"/>
+          </p:nvPr>
+        </p:nvSpPr>
+        <p:spPr/>
+        <p:txBody>
+          <a:bodyPr/>
+          <a:lstStyle/>
+          <a:p>
+            <a:r>
               <a:rPr lang="da-DK" b="1"/>
               <a:t>JS Advanced – Part 3</a:t>
             </a:r>
@@ -9667,13 +10327,7 @@
               <a:rPr lang="da-DK">
                 <a:hlinkClick r:id="rId2"/>
               </a:rPr>
-              <a:t>https</a:t>
-            </a:r>
-            <a:r>
-              <a:rPr lang="da-DK">
-                <a:hlinkClick r:id="rId2"/>
-              </a:rPr>
-              <a:t>://</a:t>
+              <a:t>https://</a:t>
             </a:r>
             <a:r>
               <a:rPr lang="da-DK" smtClean="0">
@@ -9695,6 +10349,13 @@
   <p:clrMapOvr>
     <a:masterClrMapping/>
   </p:clrMapOvr>
+  <p:timing>
+    <p:tnLst>
+      <p:par>
+        <p:cTn id="1" dur="indefinite" restart="never" nodeType="tmRoot"/>
+      </p:par>
+    </p:tnLst>
+  </p:timing>
 </p:sld>
 </file>
 
@@ -9895,6 +10556,13 @@
   <p:clrMapOvr>
     <a:masterClrMapping/>
   </p:clrMapOvr>
+  <p:timing>
+    <p:tnLst>
+      <p:par>
+        <p:cTn id="1" dur="indefinite" restart="never" nodeType="tmRoot"/>
+      </p:par>
+    </p:tnLst>
+  </p:timing>
 </p:sld>
 </file>
 
@@ -10190,6 +10858,25 @@
   <p:clrMapOvr>
     <a:masterClrMapping/>
   </p:clrMapOvr>
+  <mc:AlternateContent xmlns:mc="http://schemas.openxmlformats.org/markup-compatibility/2006">
+    <mc:Choice xmlns:p14="http://schemas.microsoft.com/office/powerpoint/2010/main" Requires="p14">
+      <p:transition spd="med" p14:dur="700">
+        <p:fade/>
+      </p:transition>
+    </mc:Choice>
+    <mc:Fallback>
+      <p:transition spd="med">
+        <p:fade/>
+      </p:transition>
+    </mc:Fallback>
+  </mc:AlternateContent>
+  <p:timing>
+    <p:tnLst>
+      <p:par>
+        <p:cTn id="1" dur="indefinite" restart="never" nodeType="tmRoot"/>
+      </p:par>
+    </p:tnLst>
+  </p:timing>
 </p:sld>
 </file>
 
@@ -10598,6 +11285,25 @@
   <p:clrMapOvr>
     <a:masterClrMapping/>
   </p:clrMapOvr>
+  <mc:AlternateContent xmlns:mc="http://schemas.openxmlformats.org/markup-compatibility/2006">
+    <mc:Choice xmlns:p14="http://schemas.microsoft.com/office/powerpoint/2010/main" Requires="p14">
+      <p:transition spd="med" p14:dur="700">
+        <p:fade/>
+      </p:transition>
+    </mc:Choice>
+    <mc:Fallback>
+      <p:transition spd="med">
+        <p:fade/>
+      </p:transition>
+    </mc:Fallback>
+  </mc:AlternateContent>
+  <p:timing>
+    <p:tnLst>
+      <p:par>
+        <p:cTn id="1" dur="indefinite" restart="never" nodeType="tmRoot"/>
+      </p:par>
+    </p:tnLst>
+  </p:timing>
 </p:sld>
 </file>
 
@@ -11119,6 +11825,25 @@
   <p:clrMapOvr>
     <a:masterClrMapping/>
   </p:clrMapOvr>
+  <mc:AlternateContent xmlns:mc="http://schemas.openxmlformats.org/markup-compatibility/2006">
+    <mc:Choice xmlns:p14="http://schemas.microsoft.com/office/powerpoint/2010/main" Requires="p14">
+      <p:transition spd="med" p14:dur="700">
+        <p:fade/>
+      </p:transition>
+    </mc:Choice>
+    <mc:Fallback>
+      <p:transition spd="med">
+        <p:fade/>
+      </p:transition>
+    </mc:Fallback>
+  </mc:AlternateContent>
+  <p:timing>
+    <p:tnLst>
+      <p:par>
+        <p:cTn id="1" dur="indefinite" restart="never" nodeType="tmRoot"/>
+      </p:par>
+    </p:tnLst>
+  </p:timing>
 </p:sld>
 </file>
 

</xml_diff>

<commit_message>
Added suggestions for solutions to 30_JavaScript
</commit_message>
<xml_diff>
--- a/30_JavaScript/JavaScriptAdvanced.pptx
+++ b/30_JavaScript/JavaScriptAdvanced.pptx
@@ -37,21 +37,22 @@
     <p:sldId id="290" r:id="rId31"/>
     <p:sldId id="289" r:id="rId32"/>
     <p:sldId id="291" r:id="rId33"/>
-    <p:sldId id="292" r:id="rId34"/>
-    <p:sldId id="293" r:id="rId35"/>
-    <p:sldId id="294" r:id="rId36"/>
-    <p:sldId id="295" r:id="rId37"/>
-    <p:sldId id="296" r:id="rId38"/>
-    <p:sldId id="297" r:id="rId39"/>
-    <p:sldId id="298" r:id="rId40"/>
-    <p:sldId id="299" r:id="rId41"/>
-    <p:sldId id="300" r:id="rId42"/>
-    <p:sldId id="301" r:id="rId43"/>
-    <p:sldId id="302" r:id="rId44"/>
-    <p:sldId id="303" r:id="rId45"/>
-    <p:sldId id="304" r:id="rId46"/>
-    <p:sldId id="305" r:id="rId47"/>
-    <p:sldId id="306" r:id="rId48"/>
+    <p:sldId id="308" r:id="rId34"/>
+    <p:sldId id="292" r:id="rId35"/>
+    <p:sldId id="293" r:id="rId36"/>
+    <p:sldId id="294" r:id="rId37"/>
+    <p:sldId id="295" r:id="rId38"/>
+    <p:sldId id="296" r:id="rId39"/>
+    <p:sldId id="297" r:id="rId40"/>
+    <p:sldId id="298" r:id="rId41"/>
+    <p:sldId id="299" r:id="rId42"/>
+    <p:sldId id="300" r:id="rId43"/>
+    <p:sldId id="301" r:id="rId44"/>
+    <p:sldId id="302" r:id="rId45"/>
+    <p:sldId id="303" r:id="rId46"/>
+    <p:sldId id="304" r:id="rId47"/>
+    <p:sldId id="305" r:id="rId48"/>
+    <p:sldId id="306" r:id="rId49"/>
   </p:sldIdLst>
   <p:sldSz cx="12192000" cy="6858000"/>
   <p:notesSz cx="6858000" cy="9144000"/>
@@ -289,7 +290,7 @@
           <a:p>
             <a:fld id="{04527E70-C461-477F-BF52-CFCF7D612977}" type="datetimeFigureOut">
               <a:rPr lang="da-DK" smtClean="0"/>
-              <a:t>20-02-2019</a:t>
+              <a:t>21-02-2019</a:t>
             </a:fld>
             <a:endParaRPr lang="da-DK"/>
           </a:p>
@@ -459,7 +460,7 @@
           <a:p>
             <a:fld id="{04527E70-C461-477F-BF52-CFCF7D612977}" type="datetimeFigureOut">
               <a:rPr lang="da-DK" smtClean="0"/>
-              <a:t>20-02-2019</a:t>
+              <a:t>21-02-2019</a:t>
             </a:fld>
             <a:endParaRPr lang="da-DK"/>
           </a:p>
@@ -639,7 +640,7 @@
           <a:p>
             <a:fld id="{04527E70-C461-477F-BF52-CFCF7D612977}" type="datetimeFigureOut">
               <a:rPr lang="da-DK" smtClean="0"/>
-              <a:t>20-02-2019</a:t>
+              <a:t>21-02-2019</a:t>
             </a:fld>
             <a:endParaRPr lang="da-DK"/>
           </a:p>
@@ -809,7 +810,7 @@
           <a:p>
             <a:fld id="{04527E70-C461-477F-BF52-CFCF7D612977}" type="datetimeFigureOut">
               <a:rPr lang="da-DK" smtClean="0"/>
-              <a:t>20-02-2019</a:t>
+              <a:t>21-02-2019</a:t>
             </a:fld>
             <a:endParaRPr lang="da-DK"/>
           </a:p>
@@ -1055,7 +1056,7 @@
           <a:p>
             <a:fld id="{04527E70-C461-477F-BF52-CFCF7D612977}" type="datetimeFigureOut">
               <a:rPr lang="da-DK" smtClean="0"/>
-              <a:t>20-02-2019</a:t>
+              <a:t>21-02-2019</a:t>
             </a:fld>
             <a:endParaRPr lang="da-DK"/>
           </a:p>
@@ -1287,7 +1288,7 @@
           <a:p>
             <a:fld id="{04527E70-C461-477F-BF52-CFCF7D612977}" type="datetimeFigureOut">
               <a:rPr lang="da-DK" smtClean="0"/>
-              <a:t>20-02-2019</a:t>
+              <a:t>21-02-2019</a:t>
             </a:fld>
             <a:endParaRPr lang="da-DK"/>
           </a:p>
@@ -1654,7 +1655,7 @@
           <a:p>
             <a:fld id="{04527E70-C461-477F-BF52-CFCF7D612977}" type="datetimeFigureOut">
               <a:rPr lang="da-DK" smtClean="0"/>
-              <a:t>20-02-2019</a:t>
+              <a:t>21-02-2019</a:t>
             </a:fld>
             <a:endParaRPr lang="da-DK"/>
           </a:p>
@@ -1772,7 +1773,7 @@
           <a:p>
             <a:fld id="{04527E70-C461-477F-BF52-CFCF7D612977}" type="datetimeFigureOut">
               <a:rPr lang="da-DK" smtClean="0"/>
-              <a:t>20-02-2019</a:t>
+              <a:t>21-02-2019</a:t>
             </a:fld>
             <a:endParaRPr lang="da-DK"/>
           </a:p>
@@ -1867,7 +1868,7 @@
           <a:p>
             <a:fld id="{04527E70-C461-477F-BF52-CFCF7D612977}" type="datetimeFigureOut">
               <a:rPr lang="da-DK" smtClean="0"/>
-              <a:t>20-02-2019</a:t>
+              <a:t>21-02-2019</a:t>
             </a:fld>
             <a:endParaRPr lang="da-DK"/>
           </a:p>
@@ -2144,7 +2145,7 @@
           <a:p>
             <a:fld id="{04527E70-C461-477F-BF52-CFCF7D612977}" type="datetimeFigureOut">
               <a:rPr lang="da-DK" smtClean="0"/>
-              <a:t>20-02-2019</a:t>
+              <a:t>21-02-2019</a:t>
             </a:fld>
             <a:endParaRPr lang="da-DK"/>
           </a:p>
@@ -2397,7 +2398,7 @@
           <a:p>
             <a:fld id="{04527E70-C461-477F-BF52-CFCF7D612977}" type="datetimeFigureOut">
               <a:rPr lang="da-DK" smtClean="0"/>
-              <a:t>20-02-2019</a:t>
+              <a:t>21-02-2019</a:t>
             </a:fld>
             <a:endParaRPr lang="da-DK"/>
           </a:p>
@@ -2610,7 +2611,7 @@
           <a:p>
             <a:fld id="{04527E70-C461-477F-BF52-CFCF7D612977}" type="datetimeFigureOut">
               <a:rPr lang="da-DK" smtClean="0"/>
-              <a:t>20-02-2019</a:t>
+              <a:t>21-02-2019</a:t>
             </a:fld>
             <a:endParaRPr lang="da-DK"/>
           </a:p>
@@ -3514,13 +3515,13 @@
   <p:clrMapOvr>
     <a:masterClrMapping/>
   </p:clrMapOvr>
-  <mc:AlternateContent xmlns:mc="http://schemas.openxmlformats.org/markup-compatibility/2006">
-    <mc:Choice xmlns:p14="http://schemas.microsoft.com/office/powerpoint/2010/main" Requires="p14">
+  <mc:AlternateContent xmlns:mc="http://schemas.openxmlformats.org/markup-compatibility/2006" xmlns:p14="http://schemas.microsoft.com/office/powerpoint/2010/main">
+    <mc:Choice Requires="p14">
       <p:transition spd="med" p14:dur="700">
         <p:fade/>
       </p:transition>
     </mc:Choice>
-    <mc:Fallback>
+    <mc:Fallback xmlns="">
       <p:transition spd="med">
         <p:fade/>
       </p:transition>
@@ -4836,13 +4837,13 @@
   <p:clrMapOvr>
     <a:masterClrMapping/>
   </p:clrMapOvr>
-  <mc:AlternateContent xmlns:mc="http://schemas.openxmlformats.org/markup-compatibility/2006">
-    <mc:Choice xmlns:p14="http://schemas.microsoft.com/office/powerpoint/2010/main" Requires="p14">
+  <mc:AlternateContent xmlns:mc="http://schemas.openxmlformats.org/markup-compatibility/2006" xmlns:p14="http://schemas.microsoft.com/office/powerpoint/2010/main">
+    <mc:Choice Requires="p14">
       <p:transition spd="med" p14:dur="700">
         <p:fade/>
       </p:transition>
     </mc:Choice>
-    <mc:Fallback>
+    <mc:Fallback xmlns="">
       <p:transition spd="med">
         <p:fade/>
       </p:transition>
@@ -5891,13 +5892,13 @@
   <p:clrMapOvr>
     <a:masterClrMapping/>
   </p:clrMapOvr>
-  <mc:AlternateContent xmlns:mc="http://schemas.openxmlformats.org/markup-compatibility/2006">
-    <mc:Choice xmlns:p14="http://schemas.microsoft.com/office/powerpoint/2010/main" Requires="p14">
+  <mc:AlternateContent xmlns:mc="http://schemas.openxmlformats.org/markup-compatibility/2006" xmlns:p14="http://schemas.microsoft.com/office/powerpoint/2010/main">
+    <mc:Choice Requires="p14">
       <p:transition spd="med" p14:dur="700">
         <p:fade/>
       </p:transition>
     </mc:Choice>
-    <mc:Fallback>
+    <mc:Fallback xmlns="">
       <p:transition spd="med">
         <p:fade/>
       </p:transition>
@@ -8394,7 +8395,7 @@
           <a:p>
             <a:r>
               <a:rPr lang="da-DK" b="1" smtClean="0"/>
-              <a:t>JS Advanced – Part 3</a:t>
+              <a:t>Typical base/derived class scenario</a:t>
             </a:r>
             <a:endParaRPr lang="da-DK" b="1"/>
           </a:p>
@@ -8423,70 +8424,81 @@
           <a:lstStyle/>
           <a:p>
             <a:r>
-              <a:rPr lang="da-DK" sz="3200" b="1" smtClean="0"/>
-              <a:t>Array helper/query methods</a:t>
-            </a:r>
-            <a:endParaRPr lang="da-DK" sz="3200" smtClean="0"/>
+              <a:rPr lang="da-DK" smtClean="0"/>
+              <a:t>Base class contains X properties… </a:t>
+            </a:r>
+          </a:p>
+          <a:p>
+            <a:r>
+              <a:rPr lang="da-DK" smtClean="0"/>
+              <a:t>…so base class constructor </a:t>
+            </a:r>
+            <a:r>
+              <a:rPr lang="da-DK" u="sng" smtClean="0"/>
+              <a:t>typically</a:t>
+            </a:r>
+            <a:r>
+              <a:rPr lang="da-DK" smtClean="0"/>
+              <a:t> takes X parameters, to initialise these X properties</a:t>
+            </a:r>
+          </a:p>
+          <a:p>
+            <a:r>
+              <a:rPr lang="da-DK" smtClean="0"/>
+              <a:t>Derived class contains Y properties…</a:t>
+            </a:r>
+          </a:p>
+          <a:p>
+            <a:r>
+              <a:rPr lang="da-DK" smtClean="0"/>
+              <a:t>…so derived class constructor </a:t>
+            </a:r>
+            <a:r>
+              <a:rPr lang="da-DK" u="sng" smtClean="0"/>
+              <a:t>typically</a:t>
+            </a:r>
+            <a:r>
+              <a:rPr lang="da-DK" smtClean="0"/>
+              <a:t> takes X + Y parameters, to initialise own </a:t>
+            </a:r>
+            <a:r>
+              <a:rPr lang="da-DK" u="sng" smtClean="0"/>
+              <a:t>and</a:t>
+            </a:r>
+            <a:r>
+              <a:rPr lang="da-DK" smtClean="0"/>
+              <a:t> base class properties, like this:</a:t>
+            </a:r>
           </a:p>
           <a:p>
             <a:pPr lvl="1"/>
             <a:r>
-              <a:rPr lang="da-DK" sz="2800" b="1" smtClean="0"/>
-              <a:t>forEach</a:t>
-            </a:r>
-            <a:endParaRPr lang="da-DK" sz="2800" smtClean="0"/>
+              <a:rPr lang="da-DK" smtClean="0"/>
+              <a:t>X of these parameters are used to call base class constructor! </a:t>
+            </a:r>
           </a:p>
           <a:p>
             <a:pPr lvl="1"/>
             <a:r>
-              <a:rPr lang="da-DK" sz="2800" b="1" smtClean="0"/>
-              <a:t>map </a:t>
-            </a:r>
-            <a:r>
-              <a:rPr lang="da-DK" sz="2800" smtClean="0"/>
-              <a:t>and </a:t>
-            </a:r>
-            <a:r>
-              <a:rPr lang="da-DK" sz="2800" b="1" smtClean="0"/>
-              <a:t>filter</a:t>
-            </a:r>
-          </a:p>
-          <a:p>
-            <a:pPr lvl="1"/>
-            <a:r>
-              <a:rPr lang="da-DK" sz="2800" b="1" smtClean="0"/>
-              <a:t>reduce</a:t>
-            </a:r>
-          </a:p>
-          <a:p>
-            <a:pPr lvl="1"/>
-            <a:r>
-              <a:rPr lang="da-DK" sz="2800" b="1" smtClean="0"/>
-              <a:t>find</a:t>
-            </a:r>
-            <a:r>
-              <a:rPr lang="da-DK" sz="2800" smtClean="0"/>
-              <a:t>, </a:t>
-            </a:r>
-            <a:r>
-              <a:rPr lang="da-DK" sz="2800" b="1" smtClean="0"/>
-              <a:t>some</a:t>
-            </a:r>
-            <a:r>
-              <a:rPr lang="da-DK" sz="2800" smtClean="0"/>
-              <a:t> and </a:t>
-            </a:r>
-            <a:r>
-              <a:rPr lang="da-DK" sz="2800" b="1" smtClean="0"/>
-              <a:t>every</a:t>
-            </a:r>
+              <a:rPr lang="da-DK" smtClean="0"/>
+              <a:t>Y </a:t>
+            </a:r>
+            <a:r>
+              <a:rPr lang="da-DK"/>
+              <a:t>of these parameters </a:t>
+            </a:r>
+            <a:r>
+              <a:rPr lang="da-DK" smtClean="0"/>
+              <a:t>are used for initialising derived class properties.</a:t>
+            </a:r>
+            <a:endParaRPr lang="da-DK" smtClean="0"/>
           </a:p>
         </p:txBody>
       </p:sp>
     </p:spTree>
     <p:extLst>
       <p:ext uri="{BB962C8B-B14F-4D97-AF65-F5344CB8AC3E}">
-        <p14:creationId xmlns:p14="http://schemas.microsoft.com/office/powerpoint/2010/main" val="1746028050"/>
+        <p14:creationId xmlns:p14="http://schemas.microsoft.com/office/powerpoint/2010/main" val="2660153383"/>
       </p:ext>
     </p:extLst>
   </p:cSld>
@@ -8556,7 +8568,7 @@
         <p:spPr>
           <a:xfrm>
             <a:off x="838200" y="1825625"/>
-            <a:ext cx="7578969" cy="4351338"/>
+            <a:ext cx="9868930" cy="4351338"/>
           </a:xfrm>
         </p:spPr>
         <p:txBody>
@@ -8566,85 +8578,62 @@
           <a:lstStyle/>
           <a:p>
             <a:r>
-              <a:rPr lang="da-DK" sz="3200" smtClean="0"/>
-              <a:t>The </a:t>
-            </a:r>
-            <a:r>
               <a:rPr lang="da-DK" sz="3200" b="1" smtClean="0"/>
-              <a:t>forEach </a:t>
-            </a:r>
-            <a:r>
-              <a:rPr lang="da-DK" sz="3200" smtClean="0"/>
-              <a:t>method</a:t>
-            </a:r>
+              <a:t>Array helper/query methods</a:t>
+            </a:r>
+            <a:endParaRPr lang="da-DK" sz="3200" smtClean="0"/>
           </a:p>
           <a:p>
             <a:pPr lvl="1"/>
             <a:r>
+              <a:rPr lang="da-DK" sz="2800" b="1" smtClean="0"/>
+              <a:t>forEach</a:t>
+            </a:r>
+            <a:endParaRPr lang="da-DK" sz="2800" smtClean="0"/>
+          </a:p>
+          <a:p>
+            <a:pPr lvl="1"/>
+            <a:r>
+              <a:rPr lang="da-DK" sz="2800" b="1" smtClean="0"/>
+              <a:t>map </a:t>
+            </a:r>
+            <a:r>
               <a:rPr lang="da-DK" sz="2800" smtClean="0"/>
-              <a:t>Is applied to an array</a:t>
+              <a:t>and </a:t>
+            </a:r>
+            <a:r>
+              <a:rPr lang="da-DK" sz="2800" b="1" smtClean="0"/>
+              <a:t>filter</a:t>
             </a:r>
           </a:p>
           <a:p>
             <a:pPr lvl="1"/>
             <a:r>
+              <a:rPr lang="da-DK" sz="2800" b="1" smtClean="0"/>
+              <a:t>reduce</a:t>
+            </a:r>
+          </a:p>
+          <a:p>
+            <a:pPr lvl="1"/>
+            <a:r>
+              <a:rPr lang="da-DK" sz="2800" b="1" smtClean="0"/>
+              <a:t>find</a:t>
+            </a:r>
+            <a:r>
               <a:rPr lang="da-DK" sz="2800" smtClean="0"/>
-              <a:t>General syntax: </a:t>
-            </a:r>
-            <a:r>
-              <a:rPr lang="da-DK" sz="2800" i="1" smtClean="0"/>
-              <a:t>myArray.forEach(callBack)</a:t>
-            </a:r>
-          </a:p>
-          <a:p>
-            <a:pPr lvl="1"/>
-            <a:r>
-              <a:rPr lang="da-DK" sz="2800" i="1" smtClean="0"/>
-              <a:t>callBack: </a:t>
+              <a:t>, </a:t>
+            </a:r>
+            <a:r>
+              <a:rPr lang="da-DK" sz="2800" b="1" smtClean="0"/>
+              <a:t>some</a:t>
             </a:r>
             <a:r>
               <a:rPr lang="da-DK" sz="2800" smtClean="0"/>
-              <a:t>A function which is called for each element in the array</a:t>
-            </a:r>
-          </a:p>
-          <a:p>
-            <a:pPr lvl="1"/>
-            <a:r>
-              <a:rPr lang="da-DK" sz="2800" smtClean="0"/>
-              <a:t>Callback takes three parameters:</a:t>
-            </a:r>
-          </a:p>
-          <a:p>
-            <a:pPr lvl="2"/>
-            <a:r>
-              <a:rPr lang="da-DK" sz="2400" i="1" smtClean="0"/>
-              <a:t>item</a:t>
-            </a:r>
-            <a:r>
-              <a:rPr lang="da-DK" sz="2400" smtClean="0"/>
-              <a:t>: the item currently being processed</a:t>
-            </a:r>
-          </a:p>
-          <a:p>
-            <a:pPr lvl="2"/>
-            <a:r>
-              <a:rPr lang="da-DK" sz="2400" i="1" smtClean="0"/>
-              <a:t>index</a:t>
-            </a:r>
-            <a:r>
-              <a:rPr lang="da-DK" sz="2400" smtClean="0"/>
-              <a:t>: the index of the above item</a:t>
-            </a:r>
-          </a:p>
-          <a:p>
-            <a:pPr lvl="2"/>
-            <a:r>
-              <a:rPr lang="da-DK" sz="2400" i="1" smtClean="0"/>
-              <a:t>array</a:t>
-            </a:r>
-            <a:r>
-              <a:rPr lang="da-DK" sz="2400" smtClean="0"/>
-              <a:t>: the array itself</a:t>
+              <a:t> and </a:t>
+            </a:r>
+            <a:r>
+              <a:rPr lang="da-DK" sz="2800" b="1" smtClean="0"/>
+              <a:t>every</a:t>
             </a:r>
           </a:p>
         </p:txBody>
@@ -8652,7 +8641,7 @@
     </p:spTree>
     <p:extLst>
       <p:ext uri="{BB962C8B-B14F-4D97-AF65-F5344CB8AC3E}">
-        <p14:creationId xmlns:p14="http://schemas.microsoft.com/office/powerpoint/2010/main" val="2045640818"/>
+        <p14:creationId xmlns:p14="http://schemas.microsoft.com/office/powerpoint/2010/main" val="1746028050"/>
       </p:ext>
     </p:extLst>
   </p:cSld>
@@ -8709,34 +8698,116 @@
           </a:p>
         </p:txBody>
       </p:sp>
-      <p:pic>
-        <p:nvPicPr>
-          <p:cNvPr id="3" name="Billede 2"/>
-          <p:cNvPicPr>
-            <a:picLocks noChangeAspect="1"/>
-          </p:cNvPicPr>
-          <p:nvPr/>
-        </p:nvPicPr>
-        <p:blipFill>
-          <a:blip r:embed="rId2"/>
-          <a:stretch>
-            <a:fillRect/>
-          </a:stretch>
-        </p:blipFill>
-        <p:spPr>
-          <a:xfrm>
-            <a:off x="2316892" y="1613498"/>
-            <a:ext cx="6263974" cy="4586503"/>
-          </a:xfrm>
-          <a:prstGeom prst="rect">
-            <a:avLst/>
-          </a:prstGeom>
-        </p:spPr>
-      </p:pic>
+      <p:sp>
+        <p:nvSpPr>
+          <p:cNvPr id="3" name="Pladsholder til indhold 2"/>
+          <p:cNvSpPr>
+            <a:spLocks noGrp="1"/>
+          </p:cNvSpPr>
+          <p:nvPr>
+            <p:ph idx="1"/>
+          </p:nvPr>
+        </p:nvSpPr>
+        <p:spPr>
+          <a:xfrm>
+            <a:off x="838200" y="1825625"/>
+            <a:ext cx="7578969" cy="4351338"/>
+          </a:xfrm>
+        </p:spPr>
+        <p:txBody>
+          <a:bodyPr>
+            <a:normAutofit/>
+          </a:bodyPr>
+          <a:lstStyle/>
+          <a:p>
+            <a:r>
+              <a:rPr lang="da-DK" sz="3200" smtClean="0"/>
+              <a:t>The </a:t>
+            </a:r>
+            <a:r>
+              <a:rPr lang="da-DK" sz="3200" b="1" smtClean="0"/>
+              <a:t>forEach </a:t>
+            </a:r>
+            <a:r>
+              <a:rPr lang="da-DK" sz="3200" smtClean="0"/>
+              <a:t>method</a:t>
+            </a:r>
+          </a:p>
+          <a:p>
+            <a:pPr lvl="1"/>
+            <a:r>
+              <a:rPr lang="da-DK" sz="2800" smtClean="0"/>
+              <a:t>Is applied to an array</a:t>
+            </a:r>
+          </a:p>
+          <a:p>
+            <a:pPr lvl="1"/>
+            <a:r>
+              <a:rPr lang="da-DK" sz="2800" smtClean="0"/>
+              <a:t>General syntax: </a:t>
+            </a:r>
+            <a:r>
+              <a:rPr lang="da-DK" sz="2800" i="1" smtClean="0"/>
+              <a:t>myArray.forEach(callBack)</a:t>
+            </a:r>
+          </a:p>
+          <a:p>
+            <a:pPr lvl="1"/>
+            <a:r>
+              <a:rPr lang="da-DK" sz="2800" i="1" smtClean="0"/>
+              <a:t>callBack: </a:t>
+            </a:r>
+            <a:r>
+              <a:rPr lang="da-DK" sz="2800" smtClean="0"/>
+              <a:t>A function which is called for each element in the array</a:t>
+            </a:r>
+          </a:p>
+          <a:p>
+            <a:pPr lvl="1"/>
+            <a:r>
+              <a:rPr lang="da-DK" sz="2800" smtClean="0"/>
+              <a:t>Callback takes three parameters:</a:t>
+            </a:r>
+          </a:p>
+          <a:p>
+            <a:pPr lvl="2"/>
+            <a:r>
+              <a:rPr lang="da-DK" sz="2400" i="1" smtClean="0"/>
+              <a:t>item</a:t>
+            </a:r>
+            <a:r>
+              <a:rPr lang="da-DK" sz="2400" smtClean="0"/>
+              <a:t>: the item currently being processed</a:t>
+            </a:r>
+          </a:p>
+          <a:p>
+            <a:pPr lvl="2"/>
+            <a:r>
+              <a:rPr lang="da-DK" sz="2400" i="1" smtClean="0"/>
+              <a:t>index</a:t>
+            </a:r>
+            <a:r>
+              <a:rPr lang="da-DK" sz="2400" smtClean="0"/>
+              <a:t>: the index of the above item</a:t>
+            </a:r>
+          </a:p>
+          <a:p>
+            <a:pPr lvl="2"/>
+            <a:r>
+              <a:rPr lang="da-DK" sz="2400" i="1" smtClean="0"/>
+              <a:t>array</a:t>
+            </a:r>
+            <a:r>
+              <a:rPr lang="da-DK" sz="2400" smtClean="0"/>
+              <a:t>: the array itself</a:t>
+            </a:r>
+          </a:p>
+        </p:txBody>
+      </p:sp>
     </p:spTree>
     <p:extLst>
       <p:ext uri="{BB962C8B-B14F-4D97-AF65-F5344CB8AC3E}">
-        <p14:creationId xmlns:p14="http://schemas.microsoft.com/office/powerpoint/2010/main" val="2238698190"/>
+        <p14:creationId xmlns:p14="http://schemas.microsoft.com/office/powerpoint/2010/main" val="2045640818"/>
       </p:ext>
     </p:extLst>
   </p:cSld>
@@ -8793,104 +8864,34 @@
           </a:p>
         </p:txBody>
       </p:sp>
-      <p:sp>
-        <p:nvSpPr>
-          <p:cNvPr id="3" name="Pladsholder til indhold 2"/>
-          <p:cNvSpPr>
-            <a:spLocks noGrp="1"/>
-          </p:cNvSpPr>
-          <p:nvPr>
-            <p:ph idx="1"/>
-          </p:nvPr>
-        </p:nvSpPr>
-        <p:spPr>
-          <a:xfrm>
-            <a:off x="838200" y="1825625"/>
-            <a:ext cx="9312876" cy="4351338"/>
-          </a:xfrm>
-        </p:spPr>
-        <p:txBody>
-          <a:bodyPr>
-            <a:normAutofit/>
-          </a:bodyPr>
-          <a:lstStyle/>
-          <a:p>
-            <a:r>
-              <a:rPr lang="da-DK" sz="3200" smtClean="0"/>
-              <a:t>The </a:t>
-            </a:r>
-            <a:r>
-              <a:rPr lang="da-DK" sz="3200" b="1" smtClean="0"/>
-              <a:t>map </a:t>
-            </a:r>
-            <a:r>
-              <a:rPr lang="da-DK" sz="3200" smtClean="0"/>
-              <a:t>method</a:t>
-            </a:r>
-          </a:p>
-          <a:p>
-            <a:pPr lvl="1"/>
-            <a:r>
-              <a:rPr lang="da-DK" sz="2800" smtClean="0"/>
-              <a:t>General syntax: </a:t>
-            </a:r>
-            <a:r>
-              <a:rPr lang="da-DK" sz="2800" i="1" smtClean="0"/>
-              <a:t>myArray.map(callBack)</a:t>
-            </a:r>
-          </a:p>
-          <a:p>
-            <a:pPr lvl="1"/>
-            <a:r>
-              <a:rPr lang="da-DK" sz="2800" i="1" smtClean="0"/>
-              <a:t>callBack: </a:t>
-            </a:r>
-            <a:r>
-              <a:rPr lang="da-DK" sz="2800" smtClean="0"/>
-              <a:t>A function which is called for each element in the array, taking the element itself as a parameter</a:t>
-            </a:r>
-          </a:p>
-          <a:p>
-            <a:pPr lvl="1"/>
-            <a:r>
-              <a:rPr lang="da-DK" sz="2800" b="1" smtClean="0"/>
-              <a:t>NB</a:t>
-            </a:r>
-            <a:r>
-              <a:rPr lang="da-DK" sz="2800" smtClean="0"/>
-              <a:t>: The result of invoking </a:t>
-            </a:r>
-            <a:r>
-              <a:rPr lang="da-DK" sz="2800" b="1" smtClean="0"/>
-              <a:t>map</a:t>
-            </a:r>
-            <a:r>
-              <a:rPr lang="da-DK" sz="2800" smtClean="0"/>
-              <a:t> will be a </a:t>
-            </a:r>
-            <a:r>
-              <a:rPr lang="da-DK" sz="2800" u="sng" smtClean="0"/>
-              <a:t>new</a:t>
-            </a:r>
-            <a:r>
-              <a:rPr lang="da-DK" sz="2800" smtClean="0"/>
-              <a:t> array, with the same number of elements as the original array.</a:t>
-            </a:r>
-          </a:p>
-          <a:p>
-            <a:pPr lvl="1"/>
-            <a:r>
-              <a:rPr lang="da-DK" sz="2800" smtClean="0"/>
-              <a:t>Callback is often an anonymous function (=&gt;)</a:t>
-            </a:r>
-            <a:endParaRPr lang="da-DK" sz="2400" smtClean="0"/>
-          </a:p>
-        </p:txBody>
-      </p:sp>
+      <p:pic>
+        <p:nvPicPr>
+          <p:cNvPr id="3" name="Billede 2"/>
+          <p:cNvPicPr>
+            <a:picLocks noChangeAspect="1"/>
+          </p:cNvPicPr>
+          <p:nvPr/>
+        </p:nvPicPr>
+        <p:blipFill>
+          <a:blip r:embed="rId2"/>
+          <a:stretch>
+            <a:fillRect/>
+          </a:stretch>
+        </p:blipFill>
+        <p:spPr>
+          <a:xfrm>
+            <a:off x="2316892" y="1613498"/>
+            <a:ext cx="6263974" cy="4586503"/>
+          </a:xfrm>
+          <a:prstGeom prst="rect">
+            <a:avLst/>
+          </a:prstGeom>
+        </p:spPr>
+      </p:pic>
     </p:spTree>
     <p:extLst>
       <p:ext uri="{BB962C8B-B14F-4D97-AF65-F5344CB8AC3E}">
-        <p14:creationId xmlns:p14="http://schemas.microsoft.com/office/powerpoint/2010/main" val="2796312166"/>
+        <p14:creationId xmlns:p14="http://schemas.microsoft.com/office/powerpoint/2010/main" val="2238698190"/>
       </p:ext>
     </p:extLst>
   </p:cSld>
@@ -8947,34 +8948,104 @@
           </a:p>
         </p:txBody>
       </p:sp>
-      <p:pic>
-        <p:nvPicPr>
-          <p:cNvPr id="4" name="Billede 3"/>
-          <p:cNvPicPr>
-            <a:picLocks noChangeAspect="1"/>
-          </p:cNvPicPr>
-          <p:nvPr/>
-        </p:nvPicPr>
-        <p:blipFill>
-          <a:blip r:embed="rId2"/>
-          <a:stretch>
-            <a:fillRect/>
-          </a:stretch>
-        </p:blipFill>
-        <p:spPr>
-          <a:xfrm>
-            <a:off x="2299257" y="1930999"/>
-            <a:ext cx="7316712" cy="3703681"/>
-          </a:xfrm>
-          <a:prstGeom prst="rect">
-            <a:avLst/>
-          </a:prstGeom>
-        </p:spPr>
-      </p:pic>
+      <p:sp>
+        <p:nvSpPr>
+          <p:cNvPr id="3" name="Pladsholder til indhold 2"/>
+          <p:cNvSpPr>
+            <a:spLocks noGrp="1"/>
+          </p:cNvSpPr>
+          <p:nvPr>
+            <p:ph idx="1"/>
+          </p:nvPr>
+        </p:nvSpPr>
+        <p:spPr>
+          <a:xfrm>
+            <a:off x="838200" y="1825625"/>
+            <a:ext cx="9312876" cy="4351338"/>
+          </a:xfrm>
+        </p:spPr>
+        <p:txBody>
+          <a:bodyPr>
+            <a:normAutofit/>
+          </a:bodyPr>
+          <a:lstStyle/>
+          <a:p>
+            <a:r>
+              <a:rPr lang="da-DK" sz="3200" smtClean="0"/>
+              <a:t>The </a:t>
+            </a:r>
+            <a:r>
+              <a:rPr lang="da-DK" sz="3200" b="1" smtClean="0"/>
+              <a:t>map </a:t>
+            </a:r>
+            <a:r>
+              <a:rPr lang="da-DK" sz="3200" smtClean="0"/>
+              <a:t>method</a:t>
+            </a:r>
+          </a:p>
+          <a:p>
+            <a:pPr lvl="1"/>
+            <a:r>
+              <a:rPr lang="da-DK" sz="2800" smtClean="0"/>
+              <a:t>General syntax: </a:t>
+            </a:r>
+            <a:r>
+              <a:rPr lang="da-DK" sz="2800" i="1" smtClean="0"/>
+              <a:t>myArray.map(callBack)</a:t>
+            </a:r>
+          </a:p>
+          <a:p>
+            <a:pPr lvl="1"/>
+            <a:r>
+              <a:rPr lang="da-DK" sz="2800" i="1" smtClean="0"/>
+              <a:t>callBack: </a:t>
+            </a:r>
+            <a:r>
+              <a:rPr lang="da-DK" sz="2800" smtClean="0"/>
+              <a:t>A function which is called for each element in the array, taking the element itself as a parameter</a:t>
+            </a:r>
+          </a:p>
+          <a:p>
+            <a:pPr lvl="1"/>
+            <a:r>
+              <a:rPr lang="da-DK" sz="2800" b="1" smtClean="0"/>
+              <a:t>NB</a:t>
+            </a:r>
+            <a:r>
+              <a:rPr lang="da-DK" sz="2800" smtClean="0"/>
+              <a:t>: The result of invoking </a:t>
+            </a:r>
+            <a:r>
+              <a:rPr lang="da-DK" sz="2800" b="1" smtClean="0"/>
+              <a:t>map</a:t>
+            </a:r>
+            <a:r>
+              <a:rPr lang="da-DK" sz="2800" smtClean="0"/>
+              <a:t> will be a </a:t>
+            </a:r>
+            <a:r>
+              <a:rPr lang="da-DK" sz="2800" u="sng" smtClean="0"/>
+              <a:t>new</a:t>
+            </a:r>
+            <a:r>
+              <a:rPr lang="da-DK" sz="2800" smtClean="0"/>
+              <a:t> array, with the same number of elements as the original array.</a:t>
+            </a:r>
+          </a:p>
+          <a:p>
+            <a:pPr lvl="1"/>
+            <a:r>
+              <a:rPr lang="da-DK" sz="2800" smtClean="0"/>
+              <a:t>Callback is often an anonymous function (=&gt;)</a:t>
+            </a:r>
+            <a:endParaRPr lang="da-DK" sz="2400" smtClean="0"/>
+          </a:p>
+        </p:txBody>
+      </p:sp>
     </p:spTree>
     <p:extLst>
       <p:ext uri="{BB962C8B-B14F-4D97-AF65-F5344CB8AC3E}">
-        <p14:creationId xmlns:p14="http://schemas.microsoft.com/office/powerpoint/2010/main" val="3604013836"/>
+        <p14:creationId xmlns:p14="http://schemas.microsoft.com/office/powerpoint/2010/main" val="2796312166"/>
       </p:ext>
     </p:extLst>
   </p:cSld>
@@ -9033,7 +9104,7 @@
       </p:sp>
       <p:pic>
         <p:nvPicPr>
-          <p:cNvPr id="3" name="Billede 2"/>
+          <p:cNvPr id="4" name="Billede 3"/>
           <p:cNvPicPr>
             <a:picLocks noChangeAspect="1"/>
           </p:cNvPicPr>
@@ -9047,8 +9118,8 @@
         </p:blipFill>
         <p:spPr>
           <a:xfrm>
-            <a:off x="1456166" y="1853900"/>
-            <a:ext cx="8929327" cy="3836386"/>
+            <a:off x="2299257" y="1930999"/>
+            <a:ext cx="7316712" cy="3703681"/>
           </a:xfrm>
           <a:prstGeom prst="rect">
             <a:avLst/>
@@ -9058,7 +9129,7 @@
     </p:spTree>
     <p:extLst>
       <p:ext uri="{BB962C8B-B14F-4D97-AF65-F5344CB8AC3E}">
-        <p14:creationId xmlns:p14="http://schemas.microsoft.com/office/powerpoint/2010/main" val="2351645182"/>
+        <p14:creationId xmlns:p14="http://schemas.microsoft.com/office/powerpoint/2010/main" val="3604013836"/>
       </p:ext>
     </p:extLst>
   </p:cSld>
@@ -9115,124 +9186,34 @@
           </a:p>
         </p:txBody>
       </p:sp>
-      <p:sp>
-        <p:nvSpPr>
-          <p:cNvPr id="3" name="Pladsholder til indhold 2"/>
-          <p:cNvSpPr>
-            <a:spLocks noGrp="1"/>
-          </p:cNvSpPr>
-          <p:nvPr>
-            <p:ph idx="1"/>
-          </p:nvPr>
-        </p:nvSpPr>
-        <p:spPr>
-          <a:xfrm>
-            <a:off x="838200" y="1825625"/>
-            <a:ext cx="9312876" cy="4351338"/>
-          </a:xfrm>
-        </p:spPr>
-        <p:txBody>
-          <a:bodyPr>
-            <a:normAutofit/>
-          </a:bodyPr>
-          <a:lstStyle/>
-          <a:p>
-            <a:r>
-              <a:rPr lang="da-DK" sz="3200" smtClean="0"/>
-              <a:t>The </a:t>
-            </a:r>
-            <a:r>
-              <a:rPr lang="da-DK" sz="3200" b="1" smtClean="0"/>
-              <a:t>filter </a:t>
-            </a:r>
-            <a:r>
-              <a:rPr lang="da-DK" sz="3200" smtClean="0"/>
-              <a:t>method</a:t>
-            </a:r>
-          </a:p>
-          <a:p>
-            <a:pPr lvl="1"/>
-            <a:r>
-              <a:rPr lang="da-DK" sz="2800" smtClean="0"/>
-              <a:t>General syntax: </a:t>
-            </a:r>
-            <a:r>
-              <a:rPr lang="da-DK" sz="2800" i="1" smtClean="0"/>
-              <a:t>myArray.filter(callBack)</a:t>
-            </a:r>
-          </a:p>
-          <a:p>
-            <a:pPr lvl="1"/>
-            <a:r>
-              <a:rPr lang="da-DK" sz="2800" i="1" smtClean="0"/>
-              <a:t>callBack: </a:t>
-            </a:r>
-            <a:r>
-              <a:rPr lang="da-DK" sz="2800" smtClean="0"/>
-              <a:t>A function which is called for each element in the array, taking the element itself as a parameter. This callback </a:t>
-            </a:r>
-            <a:r>
-              <a:rPr lang="da-DK" sz="2800" u="sng" smtClean="0"/>
-              <a:t>must</a:t>
-            </a:r>
-            <a:r>
-              <a:rPr lang="da-DK" sz="2800" smtClean="0"/>
-              <a:t> return a </a:t>
-            </a:r>
-            <a:r>
-              <a:rPr lang="da-DK" sz="2800" i="1" smtClean="0"/>
-              <a:t>boolean</a:t>
-            </a:r>
-            <a:r>
-              <a:rPr lang="da-DK" sz="2800" smtClean="0"/>
-              <a:t> value.</a:t>
-            </a:r>
-          </a:p>
-          <a:p>
-            <a:pPr lvl="1"/>
-            <a:r>
-              <a:rPr lang="da-DK" sz="2800" b="1" smtClean="0"/>
-              <a:t>NB</a:t>
-            </a:r>
-            <a:r>
-              <a:rPr lang="da-DK" sz="2800" smtClean="0"/>
-              <a:t>: The result of invoking </a:t>
-            </a:r>
-            <a:r>
-              <a:rPr lang="da-DK" sz="2800" b="1" smtClean="0"/>
-              <a:t>filter</a:t>
-            </a:r>
-            <a:r>
-              <a:rPr lang="da-DK" sz="2800" smtClean="0"/>
-              <a:t> will be a </a:t>
-            </a:r>
-            <a:r>
-              <a:rPr lang="da-DK" sz="2800" u="sng" smtClean="0"/>
-              <a:t>new</a:t>
-            </a:r>
-            <a:r>
-              <a:rPr lang="da-DK" sz="2800" smtClean="0"/>
-              <a:t> array, only including the elements for which the callback returns </a:t>
-            </a:r>
-            <a:r>
-              <a:rPr lang="da-DK" sz="2800" b="1" smtClean="0"/>
-              <a:t>true</a:t>
-            </a:r>
-          </a:p>
-          <a:p>
-            <a:pPr lvl="1"/>
-            <a:r>
-              <a:rPr lang="da-DK" sz="2800" smtClean="0"/>
-              <a:t>Callback is often an anonymous function (=&gt;)</a:t>
-            </a:r>
-            <a:endParaRPr lang="da-DK" sz="2400" smtClean="0"/>
-          </a:p>
-        </p:txBody>
-      </p:sp>
+      <p:pic>
+        <p:nvPicPr>
+          <p:cNvPr id="3" name="Billede 2"/>
+          <p:cNvPicPr>
+            <a:picLocks noChangeAspect="1"/>
+          </p:cNvPicPr>
+          <p:nvPr/>
+        </p:nvPicPr>
+        <p:blipFill>
+          <a:blip r:embed="rId2"/>
+          <a:stretch>
+            <a:fillRect/>
+          </a:stretch>
+        </p:blipFill>
+        <p:spPr>
+          <a:xfrm>
+            <a:off x="1456166" y="1853900"/>
+            <a:ext cx="8929327" cy="3836386"/>
+          </a:xfrm>
+          <a:prstGeom prst="rect">
+            <a:avLst/>
+          </a:prstGeom>
+        </p:spPr>
+      </p:pic>
     </p:spTree>
     <p:extLst>
       <p:ext uri="{BB962C8B-B14F-4D97-AF65-F5344CB8AC3E}">
-        <p14:creationId xmlns:p14="http://schemas.microsoft.com/office/powerpoint/2010/main" val="1413412072"/>
+        <p14:creationId xmlns:p14="http://schemas.microsoft.com/office/powerpoint/2010/main" val="2351645182"/>
       </p:ext>
     </p:extLst>
   </p:cSld>
@@ -9428,34 +9409,124 @@
           </a:p>
         </p:txBody>
       </p:sp>
-      <p:pic>
-        <p:nvPicPr>
-          <p:cNvPr id="4" name="Billede 3"/>
-          <p:cNvPicPr>
-            <a:picLocks noChangeAspect="1"/>
-          </p:cNvPicPr>
-          <p:nvPr/>
-        </p:nvPicPr>
-        <p:blipFill>
-          <a:blip r:embed="rId2"/>
-          <a:stretch>
-            <a:fillRect/>
-          </a:stretch>
-        </p:blipFill>
-        <p:spPr>
-          <a:xfrm>
-            <a:off x="1785550" y="1617858"/>
-            <a:ext cx="7939989" cy="4475568"/>
-          </a:xfrm>
-          <a:prstGeom prst="rect">
-            <a:avLst/>
-          </a:prstGeom>
-        </p:spPr>
-      </p:pic>
+      <p:sp>
+        <p:nvSpPr>
+          <p:cNvPr id="3" name="Pladsholder til indhold 2"/>
+          <p:cNvSpPr>
+            <a:spLocks noGrp="1"/>
+          </p:cNvSpPr>
+          <p:nvPr>
+            <p:ph idx="1"/>
+          </p:nvPr>
+        </p:nvSpPr>
+        <p:spPr>
+          <a:xfrm>
+            <a:off x="838200" y="1825625"/>
+            <a:ext cx="9312876" cy="4351338"/>
+          </a:xfrm>
+        </p:spPr>
+        <p:txBody>
+          <a:bodyPr>
+            <a:normAutofit/>
+          </a:bodyPr>
+          <a:lstStyle/>
+          <a:p>
+            <a:r>
+              <a:rPr lang="da-DK" sz="3200" smtClean="0"/>
+              <a:t>The </a:t>
+            </a:r>
+            <a:r>
+              <a:rPr lang="da-DK" sz="3200" b="1" smtClean="0"/>
+              <a:t>filter </a:t>
+            </a:r>
+            <a:r>
+              <a:rPr lang="da-DK" sz="3200" smtClean="0"/>
+              <a:t>method</a:t>
+            </a:r>
+          </a:p>
+          <a:p>
+            <a:pPr lvl="1"/>
+            <a:r>
+              <a:rPr lang="da-DK" sz="2800" smtClean="0"/>
+              <a:t>General syntax: </a:t>
+            </a:r>
+            <a:r>
+              <a:rPr lang="da-DK" sz="2800" i="1" smtClean="0"/>
+              <a:t>myArray.filter(callBack)</a:t>
+            </a:r>
+          </a:p>
+          <a:p>
+            <a:pPr lvl="1"/>
+            <a:r>
+              <a:rPr lang="da-DK" sz="2800" i="1" smtClean="0"/>
+              <a:t>callBack: </a:t>
+            </a:r>
+            <a:r>
+              <a:rPr lang="da-DK" sz="2800" smtClean="0"/>
+              <a:t>A function which is called for each element in the array, taking the element itself as a parameter. This callback </a:t>
+            </a:r>
+            <a:r>
+              <a:rPr lang="da-DK" sz="2800" u="sng" smtClean="0"/>
+              <a:t>must</a:t>
+            </a:r>
+            <a:r>
+              <a:rPr lang="da-DK" sz="2800" smtClean="0"/>
+              <a:t> return a </a:t>
+            </a:r>
+            <a:r>
+              <a:rPr lang="da-DK" sz="2800" i="1" smtClean="0"/>
+              <a:t>boolean</a:t>
+            </a:r>
+            <a:r>
+              <a:rPr lang="da-DK" sz="2800" smtClean="0"/>
+              <a:t> value.</a:t>
+            </a:r>
+          </a:p>
+          <a:p>
+            <a:pPr lvl="1"/>
+            <a:r>
+              <a:rPr lang="da-DK" sz="2800" b="1" smtClean="0"/>
+              <a:t>NB</a:t>
+            </a:r>
+            <a:r>
+              <a:rPr lang="da-DK" sz="2800" smtClean="0"/>
+              <a:t>: The result of invoking </a:t>
+            </a:r>
+            <a:r>
+              <a:rPr lang="da-DK" sz="2800" b="1" smtClean="0"/>
+              <a:t>filter</a:t>
+            </a:r>
+            <a:r>
+              <a:rPr lang="da-DK" sz="2800" smtClean="0"/>
+              <a:t> will be a </a:t>
+            </a:r>
+            <a:r>
+              <a:rPr lang="da-DK" sz="2800" u="sng" smtClean="0"/>
+              <a:t>new</a:t>
+            </a:r>
+            <a:r>
+              <a:rPr lang="da-DK" sz="2800" smtClean="0"/>
+              <a:t> array, only including the elements for which the callback returns </a:t>
+            </a:r>
+            <a:r>
+              <a:rPr lang="da-DK" sz="2800" b="1" smtClean="0"/>
+              <a:t>true</a:t>
+            </a:r>
+          </a:p>
+          <a:p>
+            <a:pPr lvl="1"/>
+            <a:r>
+              <a:rPr lang="da-DK" sz="2800" smtClean="0"/>
+              <a:t>Callback is often an anonymous function (=&gt;)</a:t>
+            </a:r>
+            <a:endParaRPr lang="da-DK" sz="2400" smtClean="0"/>
+          </a:p>
+        </p:txBody>
+      </p:sp>
     </p:spTree>
     <p:extLst>
       <p:ext uri="{BB962C8B-B14F-4D97-AF65-F5344CB8AC3E}">
-        <p14:creationId xmlns:p14="http://schemas.microsoft.com/office/powerpoint/2010/main" val="1941430636"/>
+        <p14:creationId xmlns:p14="http://schemas.microsoft.com/office/powerpoint/2010/main" val="1413412072"/>
       </p:ext>
     </p:extLst>
   </p:cSld>
@@ -9512,146 +9583,34 @@
           </a:p>
         </p:txBody>
       </p:sp>
-      <p:sp>
-        <p:nvSpPr>
-          <p:cNvPr id="3" name="Pladsholder til indhold 2"/>
-          <p:cNvSpPr>
-            <a:spLocks noGrp="1"/>
-          </p:cNvSpPr>
-          <p:nvPr>
-            <p:ph idx="1"/>
-          </p:nvPr>
-        </p:nvSpPr>
-        <p:spPr>
-          <a:xfrm>
-            <a:off x="838200" y="1825625"/>
-            <a:ext cx="9498227" cy="4351338"/>
-          </a:xfrm>
-        </p:spPr>
-        <p:txBody>
-          <a:bodyPr>
-            <a:normAutofit/>
-          </a:bodyPr>
-          <a:lstStyle/>
-          <a:p>
-            <a:r>
-              <a:rPr lang="da-DK" sz="3200" b="1" smtClean="0"/>
-              <a:t>find</a:t>
-            </a:r>
-            <a:r>
-              <a:rPr lang="da-DK" sz="3200" smtClean="0"/>
-              <a:t>: returns the </a:t>
-            </a:r>
-            <a:r>
-              <a:rPr lang="da-DK" sz="3200" u="sng" smtClean="0"/>
-              <a:t>first</a:t>
-            </a:r>
-            <a:r>
-              <a:rPr lang="da-DK" sz="3200" smtClean="0"/>
-              <a:t> element for which the callback returns </a:t>
-            </a:r>
-            <a:r>
-              <a:rPr lang="da-DK" sz="3200" b="1" smtClean="0"/>
-              <a:t>true </a:t>
-            </a:r>
-            <a:r>
-              <a:rPr lang="da-DK" sz="3200" smtClean="0"/>
-              <a:t>(returns </a:t>
-            </a:r>
-            <a:r>
-              <a:rPr lang="da-DK" sz="3200" b="1" smtClean="0"/>
-              <a:t>undefined</a:t>
-            </a:r>
-            <a:r>
-              <a:rPr lang="da-DK" sz="3200" smtClean="0"/>
-              <a:t> if no element is found)</a:t>
-            </a:r>
-          </a:p>
-          <a:p>
-            <a:r>
-              <a:rPr lang="da-DK" sz="3200" b="1" smtClean="0"/>
-              <a:t>every</a:t>
-            </a:r>
-            <a:r>
-              <a:rPr lang="da-DK" sz="3200" smtClean="0"/>
-              <a:t>: returns </a:t>
-            </a:r>
-            <a:r>
-              <a:rPr lang="da-DK" sz="3200" b="1" smtClean="0"/>
-              <a:t>true</a:t>
-            </a:r>
-            <a:r>
-              <a:rPr lang="da-DK" sz="3200" smtClean="0"/>
-              <a:t> if the callback returns </a:t>
-            </a:r>
-            <a:r>
-              <a:rPr lang="da-DK" sz="3200" b="1" smtClean="0"/>
-              <a:t>true</a:t>
-            </a:r>
-            <a:r>
-              <a:rPr lang="da-DK" sz="3200" smtClean="0"/>
-              <a:t> for </a:t>
-            </a:r>
-            <a:r>
-              <a:rPr lang="da-DK" sz="3200" u="sng" smtClean="0"/>
-              <a:t>all</a:t>
-            </a:r>
-            <a:r>
-              <a:rPr lang="da-DK" sz="3200" smtClean="0"/>
-              <a:t> elements in the array.</a:t>
-            </a:r>
-          </a:p>
-          <a:p>
-            <a:r>
-              <a:rPr lang="da-DK" sz="3200" b="1" smtClean="0"/>
-              <a:t>some</a:t>
-            </a:r>
-            <a:r>
-              <a:rPr lang="da-DK" sz="3200" smtClean="0"/>
-              <a:t>: </a:t>
-            </a:r>
-            <a:r>
-              <a:rPr lang="da-DK" sz="3200"/>
-              <a:t>returns </a:t>
-            </a:r>
-            <a:r>
-              <a:rPr lang="da-DK" sz="3200" b="1"/>
-              <a:t>true</a:t>
-            </a:r>
-            <a:r>
-              <a:rPr lang="da-DK" sz="3200"/>
-              <a:t> if the callback returns </a:t>
-            </a:r>
-            <a:r>
-              <a:rPr lang="da-DK" sz="3200" b="1"/>
-              <a:t>true</a:t>
-            </a:r>
-            <a:r>
-              <a:rPr lang="da-DK" sz="3200"/>
-              <a:t> for </a:t>
-            </a:r>
-            <a:r>
-              <a:rPr lang="da-DK" sz="3200" u="sng" smtClean="0"/>
-              <a:t>at least one</a:t>
-            </a:r>
-            <a:r>
-              <a:rPr lang="da-DK" sz="3200" smtClean="0"/>
-              <a:t> element </a:t>
-            </a:r>
-            <a:r>
-              <a:rPr lang="da-DK" sz="3200"/>
-              <a:t>in the array.</a:t>
-            </a:r>
-          </a:p>
-          <a:p>
-            <a:endParaRPr lang="da-DK" sz="3200" smtClean="0"/>
-          </a:p>
-        </p:txBody>
-      </p:sp>
+      <p:pic>
+        <p:nvPicPr>
+          <p:cNvPr id="4" name="Billede 3"/>
+          <p:cNvPicPr>
+            <a:picLocks noChangeAspect="1"/>
+          </p:cNvPicPr>
+          <p:nvPr/>
+        </p:nvPicPr>
+        <p:blipFill>
+          <a:blip r:embed="rId2"/>
+          <a:stretch>
+            <a:fillRect/>
+          </a:stretch>
+        </p:blipFill>
+        <p:spPr>
+          <a:xfrm>
+            <a:off x="1785550" y="1617858"/>
+            <a:ext cx="7939989" cy="4475568"/>
+          </a:xfrm>
+          <a:prstGeom prst="rect">
+            <a:avLst/>
+          </a:prstGeom>
+        </p:spPr>
+      </p:pic>
     </p:spTree>
     <p:extLst>
       <p:ext uri="{BB962C8B-B14F-4D97-AF65-F5344CB8AC3E}">
-        <p14:creationId xmlns:p14="http://schemas.microsoft.com/office/powerpoint/2010/main" val="2297492747"/>
+        <p14:creationId xmlns:p14="http://schemas.microsoft.com/office/powerpoint/2010/main" val="1941430636"/>
       </p:ext>
     </p:extLst>
   </p:cSld>
@@ -9721,7 +9680,7 @@
         <p:spPr>
           <a:xfrm>
             <a:off x="838200" y="1825625"/>
-            <a:ext cx="9312876" cy="4351338"/>
+            <a:ext cx="9498227" cy="4351338"/>
           </a:xfrm>
         </p:spPr>
         <p:txBody>
@@ -9731,98 +9690,123 @@
           <a:lstStyle/>
           <a:p>
             <a:r>
+              <a:rPr lang="da-DK" sz="3200" b="1" smtClean="0"/>
+              <a:t>find</a:t>
+            </a:r>
+            <a:r>
               <a:rPr lang="da-DK" sz="3200" smtClean="0"/>
-              <a:t>The </a:t>
+              <a:t>: returns the </a:t>
+            </a:r>
+            <a:r>
+              <a:rPr lang="da-DK" sz="3200" u="sng" smtClean="0"/>
+              <a:t>first</a:t>
+            </a:r>
+            <a:r>
+              <a:rPr lang="da-DK" sz="3200" smtClean="0"/>
+              <a:t> element for which the callback returns </a:t>
             </a:r>
             <a:r>
               <a:rPr lang="da-DK" sz="3200" b="1" smtClean="0"/>
-              <a:t>reduce </a:t>
+              <a:t>true </a:t>
             </a:r>
             <a:r>
               <a:rPr lang="da-DK" sz="3200" smtClean="0"/>
-              <a:t>method</a:t>
-            </a:r>
-          </a:p>
-          <a:p>
-            <a:pPr lvl="1"/>
-            <a:r>
-              <a:rPr lang="da-DK" sz="2800" smtClean="0"/>
-              <a:t>General syntax: </a:t>
-            </a:r>
-            <a:r>
-              <a:rPr lang="da-DK" sz="2800" i="1" smtClean="0"/>
-              <a:t>myArray.reduce(reducerFunc, initialValue)</a:t>
-            </a:r>
-          </a:p>
-          <a:p>
-            <a:pPr lvl="1"/>
-            <a:r>
-              <a:rPr lang="da-DK" sz="2800" i="1"/>
-              <a:t>reducerFunc: </a:t>
-            </a:r>
-            <a:r>
-              <a:rPr lang="da-DK" sz="2800" smtClean="0"/>
-              <a:t>A function which is called for each element in the array, taking four parameters:</a:t>
-            </a:r>
-          </a:p>
-          <a:p>
-            <a:pPr lvl="2"/>
-            <a:r>
-              <a:rPr lang="da-DK" sz="2400" i="1" smtClean="0"/>
-              <a:t>accumulator</a:t>
-            </a:r>
-          </a:p>
-          <a:p>
-            <a:pPr lvl="2"/>
-            <a:r>
-              <a:rPr lang="da-DK" sz="2400" i="1" smtClean="0"/>
-              <a:t>currentValue</a:t>
-            </a:r>
-          </a:p>
-          <a:p>
-            <a:pPr lvl="2"/>
-            <a:r>
-              <a:rPr lang="da-DK" sz="2400" i="1" smtClean="0"/>
-              <a:t>currentIndex</a:t>
-            </a:r>
-          </a:p>
-          <a:p>
-            <a:pPr lvl="2"/>
-            <a:r>
-              <a:rPr lang="da-DK" sz="2400" i="1" smtClean="0"/>
-              <a:t>sourceArray</a:t>
-            </a:r>
-          </a:p>
-          <a:p>
-            <a:pPr lvl="1"/>
-            <a:r>
-              <a:rPr lang="da-DK" sz="2800" i="1" smtClean="0"/>
-              <a:t>initialValue</a:t>
-            </a:r>
-            <a:r>
-              <a:rPr lang="da-DK" sz="2800" smtClean="0"/>
-              <a:t>: The initial value to be used by the reducer function, i.e. </a:t>
-            </a:r>
-            <a:r>
-              <a:rPr lang="da-DK" sz="2800" i="1" smtClean="0"/>
-              <a:t>accumulator</a:t>
-            </a:r>
-            <a:r>
-              <a:rPr lang="da-DK" sz="2800" smtClean="0"/>
-              <a:t> is initially set to </a:t>
-            </a:r>
-            <a:r>
-              <a:rPr lang="da-DK" sz="2800" i="1" smtClean="0"/>
-              <a:t>initialValue.</a:t>
-            </a:r>
-            <a:endParaRPr lang="da-DK" sz="2800" smtClean="0"/>
+              <a:t>(returns </a:t>
+            </a:r>
+            <a:r>
+              <a:rPr lang="da-DK" sz="3200" b="1" smtClean="0"/>
+              <a:t>undefined</a:t>
+            </a:r>
+            <a:r>
+              <a:rPr lang="da-DK" sz="3200" smtClean="0"/>
+              <a:t> if no element is found)</a:t>
+            </a:r>
+          </a:p>
+          <a:p>
+            <a:r>
+              <a:rPr lang="da-DK" sz="3200" b="1" smtClean="0"/>
+              <a:t>every</a:t>
+            </a:r>
+            <a:r>
+              <a:rPr lang="da-DK" sz="3200" smtClean="0"/>
+              <a:t>: returns </a:t>
+            </a:r>
+            <a:r>
+              <a:rPr lang="da-DK" sz="3200" b="1" smtClean="0"/>
+              <a:t>true</a:t>
+            </a:r>
+            <a:r>
+              <a:rPr lang="da-DK" sz="3200" smtClean="0"/>
+              <a:t> if the callback returns </a:t>
+            </a:r>
+            <a:r>
+              <a:rPr lang="da-DK" sz="3200" b="1" smtClean="0"/>
+              <a:t>true</a:t>
+            </a:r>
+            <a:r>
+              <a:rPr lang="da-DK" sz="3200" smtClean="0"/>
+              <a:t> for </a:t>
+            </a:r>
+            <a:r>
+              <a:rPr lang="da-DK" sz="3200" u="sng" smtClean="0"/>
+              <a:t>all</a:t>
+            </a:r>
+            <a:r>
+              <a:rPr lang="da-DK" sz="3200" smtClean="0"/>
+              <a:t> elements in the array.</a:t>
+            </a:r>
+          </a:p>
+          <a:p>
+            <a:r>
+              <a:rPr lang="da-DK" sz="3200" b="1" smtClean="0"/>
+              <a:t>some</a:t>
+            </a:r>
+            <a:r>
+              <a:rPr lang="da-DK" sz="3200" smtClean="0"/>
+              <a:t>: </a:t>
+            </a:r>
+            <a:r>
+              <a:rPr lang="da-DK" sz="3200"/>
+              <a:t>returns </a:t>
+            </a:r>
+            <a:r>
+              <a:rPr lang="da-DK" sz="3200" b="1"/>
+              <a:t>true</a:t>
+            </a:r>
+            <a:r>
+              <a:rPr lang="da-DK" sz="3200"/>
+              <a:t> if the callback returns </a:t>
+            </a:r>
+            <a:r>
+              <a:rPr lang="da-DK" sz="3200" b="1"/>
+              <a:t>true</a:t>
+            </a:r>
+            <a:r>
+              <a:rPr lang="da-DK" sz="3200"/>
+              <a:t> for </a:t>
+            </a:r>
+            <a:r>
+              <a:rPr lang="da-DK" sz="3200" u="sng" smtClean="0"/>
+              <a:t>at least one</a:t>
+            </a:r>
+            <a:r>
+              <a:rPr lang="da-DK" sz="3200" smtClean="0"/>
+              <a:t> element </a:t>
+            </a:r>
+            <a:r>
+              <a:rPr lang="da-DK" sz="3200"/>
+              <a:t>in the array.</a:t>
+            </a:r>
+          </a:p>
+          <a:p>
+            <a:endParaRPr lang="da-DK" sz="3200" smtClean="0"/>
           </a:p>
         </p:txBody>
       </p:sp>
     </p:spTree>
     <p:extLst>
       <p:ext uri="{BB962C8B-B14F-4D97-AF65-F5344CB8AC3E}">
-        <p14:creationId xmlns:p14="http://schemas.microsoft.com/office/powerpoint/2010/main" val="4154715550"/>
+        <p14:creationId xmlns:p14="http://schemas.microsoft.com/office/powerpoint/2010/main" val="2297492747"/>
       </p:ext>
     </p:extLst>
   </p:cSld>
@@ -9892,7 +9876,7 @@
         <p:spPr>
           <a:xfrm>
             <a:off x="838200" y="1825625"/>
-            <a:ext cx="8960708" cy="4351338"/>
+            <a:ext cx="9312876" cy="4351338"/>
           </a:xfrm>
         </p:spPr>
         <p:txBody>
@@ -9917,61 +9901,83 @@
           <a:p>
             <a:pPr lvl="1"/>
             <a:r>
+              <a:rPr lang="da-DK" sz="2800" smtClean="0"/>
+              <a:t>General syntax: </a:t>
+            </a:r>
+            <a:r>
+              <a:rPr lang="da-DK" sz="2800" i="1" smtClean="0"/>
+              <a:t>myArray.reduce(reducerFunc, initialValue)</a:t>
+            </a:r>
+          </a:p>
+          <a:p>
+            <a:pPr lvl="1"/>
+            <a:r>
+              <a:rPr lang="da-DK" sz="2800" i="1"/>
+              <a:t>reducerFunc: </a:t>
+            </a:r>
+            <a:r>
+              <a:rPr lang="da-DK" sz="2800" smtClean="0"/>
+              <a:t>A function which is called for each element in the array, taking four parameters:</a:t>
+            </a:r>
+          </a:p>
+          <a:p>
+            <a:pPr lvl="2"/>
+            <a:r>
+              <a:rPr lang="da-DK" sz="2400" i="1" smtClean="0"/>
+              <a:t>accumulator</a:t>
+            </a:r>
+          </a:p>
+          <a:p>
+            <a:pPr lvl="2"/>
+            <a:r>
+              <a:rPr lang="da-DK" sz="2400" i="1" smtClean="0"/>
+              <a:t>currentValue</a:t>
+            </a:r>
+          </a:p>
+          <a:p>
+            <a:pPr lvl="2"/>
+            <a:r>
+              <a:rPr lang="da-DK" sz="2400" i="1" smtClean="0"/>
+              <a:t>currentIndex</a:t>
+            </a:r>
+          </a:p>
+          <a:p>
+            <a:pPr lvl="2"/>
+            <a:r>
+              <a:rPr lang="da-DK" sz="2400" i="1" smtClean="0"/>
+              <a:t>sourceArray</a:t>
+            </a:r>
+          </a:p>
+          <a:p>
+            <a:pPr lvl="1"/>
+            <a:r>
+              <a:rPr lang="da-DK" sz="2800" i="1" smtClean="0"/>
+              <a:t>initialValue</a:t>
+            </a:r>
+            <a:r>
+              <a:rPr lang="da-DK" sz="2800" smtClean="0"/>
+              <a:t>: The initial value to be used by the reducer function, i.e. </a:t>
+            </a:r>
+            <a:r>
               <a:rPr lang="da-DK" sz="2800" i="1" smtClean="0"/>
               <a:t>accumulator</a:t>
             </a:r>
             <a:r>
               <a:rPr lang="da-DK" sz="2800" smtClean="0"/>
-              <a:t>: the ”accumulated value” of applying the function so far (i.e. to the previous elements)</a:t>
-            </a:r>
-          </a:p>
-          <a:p>
-            <a:pPr lvl="1"/>
+              <a:t> is initially set to </a:t>
+            </a:r>
             <a:r>
               <a:rPr lang="da-DK" sz="2800" i="1" smtClean="0"/>
-              <a:t>currentValue</a:t>
-            </a:r>
-            <a:r>
-              <a:rPr lang="da-DK" sz="2800" smtClean="0"/>
-              <a:t>: value for the element being processed right now</a:t>
-            </a:r>
-          </a:p>
-          <a:p>
-            <a:pPr lvl="1"/>
-            <a:r>
-              <a:rPr lang="da-DK" sz="2800" i="1" smtClean="0"/>
-              <a:t>currentIndex</a:t>
-            </a:r>
-            <a:r>
-              <a:rPr lang="da-DK" sz="2800" smtClean="0"/>
-              <a:t>: index for the above element</a:t>
-            </a:r>
-          </a:p>
-          <a:p>
-            <a:pPr lvl="1"/>
-            <a:r>
-              <a:rPr lang="da-DK" sz="2800" i="1" smtClean="0"/>
-              <a:t>sourceArray</a:t>
-            </a:r>
-            <a:r>
-              <a:rPr lang="da-DK" sz="2800" smtClean="0"/>
-              <a:t>: reference to the array which we are invoking </a:t>
-            </a:r>
-            <a:r>
-              <a:rPr lang="da-DK" sz="2800" b="1" smtClean="0"/>
-              <a:t>reduce</a:t>
-            </a:r>
-            <a:r>
-              <a:rPr lang="da-DK" sz="2800" smtClean="0"/>
-              <a:t> on. </a:t>
-            </a:r>
+              <a:t>initialValue.</a:t>
+            </a:r>
+            <a:endParaRPr lang="da-DK" sz="2800" smtClean="0"/>
           </a:p>
         </p:txBody>
       </p:sp>
     </p:spTree>
     <p:extLst>
       <p:ext uri="{BB962C8B-B14F-4D97-AF65-F5344CB8AC3E}">
-        <p14:creationId xmlns:p14="http://schemas.microsoft.com/office/powerpoint/2010/main" val="201764373"/>
+        <p14:creationId xmlns:p14="http://schemas.microsoft.com/office/powerpoint/2010/main" val="4154715550"/>
       </p:ext>
     </p:extLst>
   </p:cSld>
@@ -10028,34 +10034,99 @@
           </a:p>
         </p:txBody>
       </p:sp>
-      <p:pic>
-        <p:nvPicPr>
-          <p:cNvPr id="3" name="Billede 2"/>
-          <p:cNvPicPr>
-            <a:picLocks noChangeAspect="1"/>
-          </p:cNvPicPr>
-          <p:nvPr/>
-        </p:nvPicPr>
-        <p:blipFill>
-          <a:blip r:embed="rId2"/>
-          <a:stretch>
-            <a:fillRect/>
-          </a:stretch>
-        </p:blipFill>
-        <p:spPr>
-          <a:xfrm>
-            <a:off x="1549228" y="1878998"/>
-            <a:ext cx="8867880" cy="3551795"/>
-          </a:xfrm>
-          <a:prstGeom prst="rect">
-            <a:avLst/>
-          </a:prstGeom>
-        </p:spPr>
-      </p:pic>
+      <p:sp>
+        <p:nvSpPr>
+          <p:cNvPr id="3" name="Pladsholder til indhold 2"/>
+          <p:cNvSpPr>
+            <a:spLocks noGrp="1"/>
+          </p:cNvSpPr>
+          <p:nvPr>
+            <p:ph idx="1"/>
+          </p:nvPr>
+        </p:nvSpPr>
+        <p:spPr>
+          <a:xfrm>
+            <a:off x="838200" y="1825625"/>
+            <a:ext cx="8960708" cy="4351338"/>
+          </a:xfrm>
+        </p:spPr>
+        <p:txBody>
+          <a:bodyPr>
+            <a:normAutofit/>
+          </a:bodyPr>
+          <a:lstStyle/>
+          <a:p>
+            <a:r>
+              <a:rPr lang="da-DK" sz="3200" smtClean="0"/>
+              <a:t>The </a:t>
+            </a:r>
+            <a:r>
+              <a:rPr lang="da-DK" sz="3200" b="1" smtClean="0"/>
+              <a:t>reduce </a:t>
+            </a:r>
+            <a:r>
+              <a:rPr lang="da-DK" sz="3200" smtClean="0"/>
+              <a:t>method</a:t>
+            </a:r>
+          </a:p>
+          <a:p>
+            <a:pPr lvl="1"/>
+            <a:r>
+              <a:rPr lang="da-DK" sz="2800" i="1" smtClean="0"/>
+              <a:t>accumulator</a:t>
+            </a:r>
+            <a:r>
+              <a:rPr lang="da-DK" sz="2800" smtClean="0"/>
+              <a:t>: the ”accumulated value” of applying the function so far (i.e. to the previous elements)</a:t>
+            </a:r>
+          </a:p>
+          <a:p>
+            <a:pPr lvl="1"/>
+            <a:r>
+              <a:rPr lang="da-DK" sz="2800" i="1" smtClean="0"/>
+              <a:t>currentValue</a:t>
+            </a:r>
+            <a:r>
+              <a:rPr lang="da-DK" sz="2800" smtClean="0"/>
+              <a:t>: value for the element being processed right now</a:t>
+            </a:r>
+          </a:p>
+          <a:p>
+            <a:pPr lvl="1"/>
+            <a:r>
+              <a:rPr lang="da-DK" sz="2800" i="1" smtClean="0"/>
+              <a:t>currentIndex</a:t>
+            </a:r>
+            <a:r>
+              <a:rPr lang="da-DK" sz="2800" smtClean="0"/>
+              <a:t>: index for the above element</a:t>
+            </a:r>
+          </a:p>
+          <a:p>
+            <a:pPr lvl="1"/>
+            <a:r>
+              <a:rPr lang="da-DK" sz="2800" i="1" smtClean="0"/>
+              <a:t>sourceArray</a:t>
+            </a:r>
+            <a:r>
+              <a:rPr lang="da-DK" sz="2800" smtClean="0"/>
+              <a:t>: reference to the array which we are invoking </a:t>
+            </a:r>
+            <a:r>
+              <a:rPr lang="da-DK" sz="2800" b="1" smtClean="0"/>
+              <a:t>reduce</a:t>
+            </a:r>
+            <a:r>
+              <a:rPr lang="da-DK" sz="2800" smtClean="0"/>
+              <a:t> on. </a:t>
+            </a:r>
+          </a:p>
+        </p:txBody>
+      </p:sp>
     </p:spTree>
     <p:extLst>
       <p:ext uri="{BB962C8B-B14F-4D97-AF65-F5344CB8AC3E}">
-        <p14:creationId xmlns:p14="http://schemas.microsoft.com/office/powerpoint/2010/main" val="1062084076"/>
+        <p14:creationId xmlns:p14="http://schemas.microsoft.com/office/powerpoint/2010/main" val="201764373"/>
       </p:ext>
     </p:extLst>
   </p:cSld>
@@ -10114,7 +10185,7 @@
       </p:sp>
       <p:pic>
         <p:nvPicPr>
-          <p:cNvPr id="4" name="Billede 3"/>
+          <p:cNvPr id="3" name="Billede 2"/>
           <p:cNvPicPr>
             <a:picLocks noChangeAspect="1"/>
           </p:cNvPicPr>
@@ -10128,8 +10199,8 @@
         </p:blipFill>
         <p:spPr>
           <a:xfrm>
-            <a:off x="1395540" y="2619504"/>
-            <a:ext cx="9645491" cy="1266697"/>
+            <a:off x="1549228" y="1878998"/>
+            <a:ext cx="8867880" cy="3551795"/>
           </a:xfrm>
           <a:prstGeom prst="rect">
             <a:avLst/>
@@ -10139,7 +10210,7 @@
     </p:spTree>
     <p:extLst>
       <p:ext uri="{BB962C8B-B14F-4D97-AF65-F5344CB8AC3E}">
-        <p14:creationId xmlns:p14="http://schemas.microsoft.com/office/powerpoint/2010/main" val="1619468774"/>
+        <p14:creationId xmlns:p14="http://schemas.microsoft.com/office/powerpoint/2010/main" val="1062084076"/>
       </p:ext>
     </p:extLst>
   </p:cSld>
@@ -10198,6 +10269,90 @@
       </p:sp>
       <p:pic>
         <p:nvPicPr>
+          <p:cNvPr id="4" name="Billede 3"/>
+          <p:cNvPicPr>
+            <a:picLocks noChangeAspect="1"/>
+          </p:cNvPicPr>
+          <p:nvPr/>
+        </p:nvPicPr>
+        <p:blipFill>
+          <a:blip r:embed="rId2"/>
+          <a:stretch>
+            <a:fillRect/>
+          </a:stretch>
+        </p:blipFill>
+        <p:spPr>
+          <a:xfrm>
+            <a:off x="1395540" y="2619504"/>
+            <a:ext cx="9645491" cy="1266697"/>
+          </a:xfrm>
+          <a:prstGeom prst="rect">
+            <a:avLst/>
+          </a:prstGeom>
+        </p:spPr>
+      </p:pic>
+    </p:spTree>
+    <p:extLst>
+      <p:ext uri="{BB962C8B-B14F-4D97-AF65-F5344CB8AC3E}">
+        <p14:creationId xmlns:p14="http://schemas.microsoft.com/office/powerpoint/2010/main" val="1619468774"/>
+      </p:ext>
+    </p:extLst>
+  </p:cSld>
+  <p:clrMapOvr>
+    <a:masterClrMapping/>
+  </p:clrMapOvr>
+  <p:timing>
+    <p:tnLst>
+      <p:par>
+        <p:cTn id="1" dur="indefinite" restart="never" nodeType="tmRoot"/>
+      </p:par>
+    </p:tnLst>
+  </p:timing>
+</p:sld>
+</file>
+
+<file path=ppt/slides/slide47.xml><?xml version="1.0" encoding="utf-8"?>
+<p:sld xmlns:a="http://schemas.openxmlformats.org/drawingml/2006/main" xmlns:r="http://schemas.openxmlformats.org/officeDocument/2006/relationships" xmlns:p="http://schemas.openxmlformats.org/presentationml/2006/main">
+  <p:cSld>
+    <p:spTree>
+      <p:nvGrpSpPr>
+        <p:cNvPr id="1" name=""/>
+        <p:cNvGrpSpPr/>
+        <p:nvPr/>
+      </p:nvGrpSpPr>
+      <p:grpSpPr>
+        <a:xfrm>
+          <a:off x="0" y="0"/>
+          <a:ext cx="0" cy="0"/>
+          <a:chOff x="0" y="0"/>
+          <a:chExt cx="0" cy="0"/>
+        </a:xfrm>
+      </p:grpSpPr>
+      <p:sp>
+        <p:nvSpPr>
+          <p:cNvPr id="2" name="Titel 1"/>
+          <p:cNvSpPr>
+            <a:spLocks noGrp="1"/>
+          </p:cNvSpPr>
+          <p:nvPr>
+            <p:ph type="title"/>
+          </p:nvPr>
+        </p:nvSpPr>
+        <p:spPr/>
+        <p:txBody>
+          <a:bodyPr/>
+          <a:lstStyle/>
+          <a:p>
+            <a:r>
+              <a:rPr lang="da-DK" b="1" smtClean="0"/>
+              <a:t>JS Advanced – Part 3</a:t>
+            </a:r>
+            <a:endParaRPr lang="da-DK" b="1"/>
+          </a:p>
+        </p:txBody>
+      </p:sp>
+      <p:pic>
+        <p:nvPicPr>
           <p:cNvPr id="3" name="Billede 2"/>
           <p:cNvPicPr>
             <a:picLocks noChangeAspect="1"/>
@@ -10264,7 +10419,7 @@
 </p:sld>
 </file>
 
-<file path=ppt/slides/slide47.xml><?xml version="1.0" encoding="utf-8"?>
+<file path=ppt/slides/slide48.xml><?xml version="1.0" encoding="utf-8"?>
 <p:sld xmlns:a="http://schemas.openxmlformats.org/drawingml/2006/main" xmlns:r="http://schemas.openxmlformats.org/officeDocument/2006/relationships" xmlns:p="http://schemas.openxmlformats.org/presentationml/2006/main">
   <p:cSld>
     <p:spTree>
@@ -10858,13 +11013,13 @@
   <p:clrMapOvr>
     <a:masterClrMapping/>
   </p:clrMapOvr>
-  <mc:AlternateContent xmlns:mc="http://schemas.openxmlformats.org/markup-compatibility/2006">
-    <mc:Choice xmlns:p14="http://schemas.microsoft.com/office/powerpoint/2010/main" Requires="p14">
+  <mc:AlternateContent xmlns:mc="http://schemas.openxmlformats.org/markup-compatibility/2006" xmlns:p14="http://schemas.microsoft.com/office/powerpoint/2010/main">
+    <mc:Choice Requires="p14">
       <p:transition spd="med" p14:dur="700">
         <p:fade/>
       </p:transition>
     </mc:Choice>
-    <mc:Fallback>
+    <mc:Fallback xmlns="">
       <p:transition spd="med">
         <p:fade/>
       </p:transition>
@@ -11285,13 +11440,13 @@
   <p:clrMapOvr>
     <a:masterClrMapping/>
   </p:clrMapOvr>
-  <mc:AlternateContent xmlns:mc="http://schemas.openxmlformats.org/markup-compatibility/2006">
-    <mc:Choice xmlns:p14="http://schemas.microsoft.com/office/powerpoint/2010/main" Requires="p14">
+  <mc:AlternateContent xmlns:mc="http://schemas.openxmlformats.org/markup-compatibility/2006" xmlns:p14="http://schemas.microsoft.com/office/powerpoint/2010/main">
+    <mc:Choice Requires="p14">
       <p:transition spd="med" p14:dur="700">
         <p:fade/>
       </p:transition>
     </mc:Choice>
-    <mc:Fallback>
+    <mc:Fallback xmlns="">
       <p:transition spd="med">
         <p:fade/>
       </p:transition>
@@ -11825,13 +11980,13 @@
   <p:clrMapOvr>
     <a:masterClrMapping/>
   </p:clrMapOvr>
-  <mc:AlternateContent xmlns:mc="http://schemas.openxmlformats.org/markup-compatibility/2006">
-    <mc:Choice xmlns:p14="http://schemas.microsoft.com/office/powerpoint/2010/main" Requires="p14">
+  <mc:AlternateContent xmlns:mc="http://schemas.openxmlformats.org/markup-compatibility/2006" xmlns:p14="http://schemas.microsoft.com/office/powerpoint/2010/main">
+    <mc:Choice Requires="p14">
       <p:transition spd="med" p14:dur="700">
         <p:fade/>
       </p:transition>
     </mc:Choice>
-    <mc:Fallback>
+    <mc:Fallback xmlns="">
       <p:transition spd="med">
         <p:fade/>
       </p:transition>

</xml_diff>